<commit_message>
merge yizhou's commit about formating
</commit_message>
<xml_diff>
--- a/2023-09-03.pptx
+++ b/2023-09-03.pptx
@@ -3307,7 +3307,7 @@
                 <a:spcPts val="5200"/>
               </a:lnSpc>
               <a:spcBef>
-                <a:spcPts val="24"/>
+                <a:spcPts val="1200"/>
               </a:spcBef>
               <a:spcAft>
                 <a:spcPts val="0"/>
@@ -3315,7 +3315,7 @@
             </a:pPr>
             <a:r>
               <a:rPr sz="4400" b="1">
-                <a:latin typeface="FZKai-Z03S"/>
+                <a:latin typeface="方正楷体简体"/>
               </a:rPr>
               <a:t>为暑期出行的弟兄姊妹的脚步代祷，不论在哪里都可以经历　神的信实。</a:t>
             </a:r>
@@ -3357,7 +3357,7 @@
             </a:pPr>
             <a:r>
               <a:rPr sz="2400" b="1">
-                <a:latin typeface="FZKai-Z03S"/>
+                <a:latin typeface="方正楷体简体"/>
               </a:rPr>
               <a:t>代祷事项</a:t>
             </a:r>
@@ -3409,7 +3409,7 @@
                 <a:spcPts val="5200"/>
               </a:lnSpc>
               <a:spcBef>
-                <a:spcPts val="0"/>
+                <a:spcPts val="1200"/>
               </a:spcBef>
               <a:spcAft>
                 <a:spcPts val="0"/>
@@ -3417,7 +3417,7 @@
             </a:pPr>
             <a:r>
               <a:rPr sz="4400" b="1" i="1">
-                <a:latin typeface="FZKai-Z03S"/>
+                <a:latin typeface="方正楷体简体"/>
               </a:rPr>
               <a:t>总结：</a:t>
             </a:r>
@@ -3428,7 +3428,7 @@
                 <a:spcPts val="5200"/>
               </a:lnSpc>
               <a:spcBef>
-                <a:spcPts val="0"/>
+                <a:spcPts val="1200"/>
               </a:spcBef>
               <a:spcAft>
                 <a:spcPts val="0"/>
@@ -3436,7 +3436,7 @@
             </a:pPr>
             <a:r>
               <a:rPr sz="4400" b="1" i="1">
-                <a:latin typeface="FZKai-Z03S"/>
+                <a:latin typeface="方正楷体简体"/>
               </a:rPr>
               <a:t>在我们的神的眼中，我是一个善良的仆人，可以接受托付，可以为他作工，可以作得更好吗？</a:t>
             </a:r>
@@ -3478,7 +3478,7 @@
             </a:pPr>
             <a:r>
               <a:rPr sz="2400" b="1">
-                <a:latin typeface="FZKai-Z03S"/>
+                <a:latin typeface="方正楷体简体"/>
               </a:rPr>
               <a:t>善仆与恶仆（路19:11-28）</a:t>
             </a:r>
@@ -3530,7 +3530,7 @@
                 <a:spcPts val="5200"/>
               </a:lnSpc>
               <a:spcBef>
-                <a:spcPts val="0"/>
+                <a:spcPts val="1200"/>
               </a:spcBef>
               <a:spcAft>
                 <a:spcPts val="0"/>
@@ -3538,7 +3538,7 @@
             </a:pPr>
             <a:r>
               <a:rPr sz="4400" b="1" i="1">
-                <a:latin typeface="FZKai-Z03S"/>
+                <a:latin typeface="方正楷体简体"/>
               </a:rPr>
               <a:t>总结：</a:t>
             </a:r>
@@ -3549,7 +3549,7 @@
                 <a:spcPts val="5200"/>
               </a:lnSpc>
               <a:spcBef>
-                <a:spcPts val="0"/>
+                <a:spcPts val="1200"/>
               </a:spcBef>
               <a:spcAft>
                 <a:spcPts val="0"/>
@@ -3557,7 +3557,7 @@
             </a:pPr>
             <a:r>
               <a:rPr sz="4400" b="1" i="1">
-                <a:latin typeface="FZKai-Z03S"/>
+                <a:latin typeface="方正楷体简体"/>
               </a:rPr>
               <a:t>在我们的神的眼中，我是一个善良的仆人，可以接受托付，可以为他作工，可以作得更好吗？</a:t>
             </a:r>
@@ -3568,7 +3568,7 @@
                 <a:spcPts val="5200"/>
               </a:lnSpc>
               <a:spcBef>
-                <a:spcPts val="0"/>
+                <a:spcPts val="1200"/>
               </a:spcBef>
               <a:spcAft>
                 <a:spcPts val="0"/>
@@ -3576,7 +3576,7 @@
             </a:pPr>
             <a:r>
               <a:rPr sz="4400" b="1" i="1">
-                <a:latin typeface="FZKai-Z03S"/>
+                <a:latin typeface="方正楷体简体"/>
               </a:rPr>
               <a:t>主人回来之前的时间还有很多吗？</a:t>
             </a:r>
@@ -3618,7 +3618,7 @@
             </a:pPr>
             <a:r>
               <a:rPr sz="2400" b="1">
-                <a:latin typeface="FZKai-Z03S"/>
+                <a:latin typeface="方正楷体简体"/>
               </a:rPr>
               <a:t>善仆与恶仆（路19:11-28）</a:t>
             </a:r>
@@ -3670,7 +3670,7 @@
                 <a:spcPts val="5200"/>
               </a:lnSpc>
               <a:spcBef>
-                <a:spcPts val="0"/>
+                <a:spcPts val="1200"/>
               </a:spcBef>
               <a:spcAft>
                 <a:spcPts val="0"/>
@@ -3678,7 +3678,7 @@
             </a:pPr>
             <a:r>
               <a:rPr sz="4400" b="1" i="1">
-                <a:latin typeface="FZKai-Z03S"/>
+                <a:latin typeface="方正楷体简体"/>
               </a:rPr>
               <a:t>总结：</a:t>
             </a:r>
@@ -3689,7 +3689,7 @@
                 <a:spcPts val="5200"/>
               </a:lnSpc>
               <a:spcBef>
-                <a:spcPts val="0"/>
+                <a:spcPts val="1200"/>
               </a:spcBef>
               <a:spcAft>
                 <a:spcPts val="0"/>
@@ -3697,7 +3697,7 @@
             </a:pPr>
             <a:r>
               <a:rPr sz="4400" b="1" i="1">
-                <a:latin typeface="FZKai-Z03S"/>
+                <a:latin typeface="方正楷体简体"/>
               </a:rPr>
               <a:t>在我们的神的眼中，我是一个善良的仆人，可以接受托付，可以为他作工，可以作得更好吗？</a:t>
             </a:r>
@@ -3708,7 +3708,7 @@
                 <a:spcPts val="5200"/>
               </a:lnSpc>
               <a:spcBef>
-                <a:spcPts val="0"/>
+                <a:spcPts val="1200"/>
               </a:spcBef>
               <a:spcAft>
                 <a:spcPts val="0"/>
@@ -3716,7 +3716,7 @@
             </a:pPr>
             <a:r>
               <a:rPr sz="4400" b="1" i="1">
-                <a:latin typeface="FZKai-Z03S"/>
+                <a:latin typeface="方正楷体简体"/>
               </a:rPr>
               <a:t>主人回来之前的时间还有很多吗？</a:t>
             </a:r>
@@ -3727,7 +3727,7 @@
                 <a:spcPts val="5200"/>
               </a:lnSpc>
               <a:spcBef>
-                <a:spcPts val="0"/>
+                <a:spcPts val="1200"/>
               </a:spcBef>
               <a:spcAft>
                 <a:spcPts val="0"/>
@@ -3735,7 +3735,7 @@
             </a:pPr>
             <a:r>
               <a:rPr sz="4400" b="1" i="1">
-                <a:latin typeface="FZKai-Z03S"/>
+                <a:latin typeface="方正楷体简体"/>
               </a:rPr>
               <a:t>主人回来的时候，我可以面对他而不羞愧吗？</a:t>
             </a:r>
@@ -3777,7 +3777,7 @@
             </a:pPr>
             <a:r>
               <a:rPr sz="2400" b="1">
-                <a:latin typeface="FZKai-Z03S"/>
+                <a:latin typeface="方正楷体简体"/>
               </a:rPr>
               <a:t>善仆与恶仆（路19:11-28）</a:t>
             </a:r>
@@ -3921,7 +3921,7 @@
             </a:pPr>
             <a:r>
               <a:rPr sz="4000" b="1">
-                <a:latin typeface="FZKai-Z03S"/>
+                <a:latin typeface="方正楷体简体"/>
               </a:rPr>
               <a:t>回应诗歌</a:t>
             </a:r>
@@ -4023,7 +4023,7 @@
             </a:pPr>
             <a:r>
               <a:rPr sz="4800" b="0">
-                <a:latin typeface="FZZhunYuan-M02S"/>
+                <a:latin typeface="方正准圆简体"/>
               </a:rPr>
               <a:t>我将祢的话语</a:t>
             </a:r>
@@ -4042,7 +4042,7 @@
             </a:pPr>
             <a:r>
               <a:rPr sz="4800" b="0">
-                <a:latin typeface="FZZhunYuan-M02S"/>
+                <a:latin typeface="方正准圆简体"/>
               </a:rPr>
               <a:t>深藏在我心</a:t>
             </a:r>
@@ -4061,7 +4061,7 @@
             </a:pPr>
             <a:r>
               <a:rPr sz="4800" b="0">
-                <a:latin typeface="FZZhunYuan-M02S"/>
+                <a:latin typeface="方正准圆简体"/>
               </a:rPr>
               <a:t>免得我得罪祢</a:t>
             </a:r>
@@ -4080,7 +4080,7 @@
             </a:pPr>
             <a:r>
               <a:rPr sz="4800" b="0">
-                <a:latin typeface="FZZhunYuan-M02S"/>
+                <a:latin typeface="方正准圆简体"/>
               </a:rPr>
               <a:t>免得我远离</a:t>
             </a:r>
@@ -4099,7 +4099,7 @@
             </a:pPr>
             <a:r>
               <a:rPr sz="4800" b="0">
-                <a:latin typeface="FZZhunYuan-M02S"/>
+                <a:latin typeface="方正准圆简体"/>
               </a:rPr>
               <a:t>哦 主啊 与我亲近</a:t>
             </a:r>
@@ -4141,7 +4141,7 @@
             </a:pPr>
             <a:r>
               <a:rPr sz="2400" b="0">
-                <a:latin typeface="FZKai-Z03S"/>
+                <a:latin typeface="方正楷体简体"/>
               </a:rPr>
               <a:t>你的话1/7</a:t>
             </a:r>
@@ -4201,7 +4201,7 @@
             </a:pPr>
             <a:r>
               <a:rPr sz="4800" b="0">
-                <a:latin typeface="FZZhunYuan-M02S"/>
+                <a:latin typeface="方正准圆简体"/>
               </a:rPr>
               <a:t>我爱祢声音</a:t>
             </a:r>
@@ -4220,7 +4220,7 @@
             </a:pPr>
             <a:r>
               <a:rPr sz="4800" b="0">
-                <a:latin typeface="FZZhunYuan-M02S"/>
+                <a:latin typeface="方正准圆简体"/>
               </a:rPr>
               <a:t>作我脚前的灯</a:t>
             </a:r>
@@ -4239,7 +4239,7 @@
             </a:pPr>
             <a:r>
               <a:rPr sz="4800" b="0">
-                <a:latin typeface="FZZhunYuan-M02S"/>
+                <a:latin typeface="方正准圆简体"/>
               </a:rPr>
               <a:t>作我路上的光</a:t>
             </a:r>
@@ -4258,7 +4258,7 @@
             </a:pPr>
             <a:r>
               <a:rPr sz="4800" b="0">
-                <a:latin typeface="FZZhunYuan-M02S"/>
+                <a:latin typeface="方正准圆简体"/>
               </a:rPr>
               <a:t>天地将要过去</a:t>
             </a:r>
@@ -4277,7 +4277,7 @@
             </a:pPr>
             <a:r>
               <a:rPr sz="4800" b="0">
-                <a:latin typeface="FZZhunYuan-M02S"/>
+                <a:latin typeface="方正准圆简体"/>
               </a:rPr>
               <a:t>祢的话却长存</a:t>
             </a:r>
@@ -4319,7 +4319,7 @@
             </a:pPr>
             <a:r>
               <a:rPr sz="2400" b="0">
-                <a:latin typeface="FZKai-Z03S"/>
+                <a:latin typeface="方正楷体简体"/>
               </a:rPr>
               <a:t>你的话2/7</a:t>
             </a:r>
@@ -4379,7 +4379,7 @@
             </a:pPr>
             <a:r>
               <a:rPr sz="4800" b="0">
-                <a:latin typeface="FZZhunYuan-M02S"/>
+                <a:latin typeface="方正准圆简体"/>
               </a:rPr>
               <a:t>天地将毁坏</a:t>
             </a:r>
@@ -4398,7 +4398,7 @@
             </a:pPr>
             <a:r>
               <a:rPr sz="4800" b="0">
-                <a:latin typeface="FZZhunYuan-M02S"/>
+                <a:latin typeface="方正准圆简体"/>
               </a:rPr>
               <a:t>祢的话却长新</a:t>
             </a:r>
@@ -4417,7 +4417,7 @@
             </a:pPr>
             <a:r>
               <a:rPr sz="4800" b="0">
-                <a:latin typeface="FZZhunYuan-M02S"/>
+                <a:latin typeface="方正准圆简体"/>
               </a:rPr>
               <a:t>我将祢的话语</a:t>
             </a:r>
@@ -4436,7 +4436,7 @@
             </a:pPr>
             <a:r>
               <a:rPr sz="4800" b="0">
-                <a:latin typeface="FZZhunYuan-M02S"/>
+                <a:latin typeface="方正准圆简体"/>
               </a:rPr>
               <a:t>深藏在我心</a:t>
             </a:r>
@@ -4455,7 +4455,7 @@
             </a:pPr>
             <a:r>
               <a:rPr sz="4800" b="0">
-                <a:latin typeface="FZZhunYuan-M02S"/>
+                <a:latin typeface="方正准圆简体"/>
               </a:rPr>
               <a:t>免得我得罪祢</a:t>
             </a:r>
@@ -4497,7 +4497,7 @@
             </a:pPr>
             <a:r>
               <a:rPr sz="2400" b="0">
-                <a:latin typeface="FZKai-Z03S"/>
+                <a:latin typeface="方正楷体简体"/>
               </a:rPr>
               <a:t>你的话3/7</a:t>
             </a:r>
@@ -4557,7 +4557,7 @@
             </a:pPr>
             <a:r>
               <a:rPr sz="4800" b="0">
-                <a:latin typeface="FZZhunYuan-M02S"/>
+                <a:latin typeface="方正准圆简体"/>
               </a:rPr>
               <a:t>免得我远离</a:t>
             </a:r>
@@ -4576,7 +4576,7 @@
             </a:pPr>
             <a:r>
               <a:rPr sz="4800" b="0">
-                <a:latin typeface="FZZhunYuan-M02S"/>
+                <a:latin typeface="方正准圆简体"/>
               </a:rPr>
               <a:t>哦 主啊 与我亲近</a:t>
             </a:r>
@@ -4595,7 +4595,7 @@
             </a:pPr>
             <a:r>
               <a:rPr sz="4800" b="0">
-                <a:latin typeface="FZZhunYuan-M02S"/>
+                <a:latin typeface="方正准圆简体"/>
               </a:rPr>
               <a:t>我爱祢声音</a:t>
             </a:r>
@@ -4614,7 +4614,7 @@
             </a:pPr>
             <a:r>
               <a:rPr sz="4800" b="0">
-                <a:latin typeface="FZZhunYuan-M02S"/>
+                <a:latin typeface="方正准圆简体"/>
               </a:rPr>
               <a:t>作我脚前的灯</a:t>
             </a:r>
@@ -4633,7 +4633,7 @@
             </a:pPr>
             <a:r>
               <a:rPr sz="4800" b="0">
-                <a:latin typeface="FZZhunYuan-M02S"/>
+                <a:latin typeface="方正准圆简体"/>
               </a:rPr>
               <a:t>作我路上的光</a:t>
             </a:r>
@@ -4675,7 +4675,7 @@
             </a:pPr>
             <a:r>
               <a:rPr sz="2400" b="0">
-                <a:latin typeface="FZKai-Z03S"/>
+                <a:latin typeface="方正楷体简体"/>
               </a:rPr>
               <a:t>你的话4/7</a:t>
             </a:r>
@@ -4735,7 +4735,7 @@
             </a:pPr>
             <a:r>
               <a:rPr sz="4800" b="0">
-                <a:latin typeface="FZZhunYuan-M02S"/>
+                <a:latin typeface="方正准圆简体"/>
               </a:rPr>
               <a:t>天地将要过去</a:t>
             </a:r>
@@ -4754,7 +4754,7 @@
             </a:pPr>
             <a:r>
               <a:rPr sz="4800" b="0">
-                <a:latin typeface="FZZhunYuan-M02S"/>
+                <a:latin typeface="方正准圆简体"/>
               </a:rPr>
               <a:t>祢的话却长存</a:t>
             </a:r>
@@ -4773,7 +4773,7 @@
             </a:pPr>
             <a:r>
               <a:rPr sz="4800" b="0">
-                <a:latin typeface="FZZhunYuan-M02S"/>
+                <a:latin typeface="方正准圆简体"/>
               </a:rPr>
               <a:t>天地将毁坏</a:t>
             </a:r>
@@ -4792,7 +4792,7 @@
             </a:pPr>
             <a:r>
               <a:rPr sz="4800" b="0">
-                <a:latin typeface="FZZhunYuan-M02S"/>
+                <a:latin typeface="方正准圆简体"/>
               </a:rPr>
               <a:t>祢的话却长新</a:t>
             </a:r>
@@ -4811,7 +4811,7 @@
             </a:pPr>
             <a:r>
               <a:rPr sz="4800" b="0">
-                <a:latin typeface="FZZhunYuan-M02S"/>
+                <a:latin typeface="方正准圆简体"/>
               </a:rPr>
               <a:t>我将祢的话语</a:t>
             </a:r>
@@ -4853,7 +4853,7 @@
             </a:pPr>
             <a:r>
               <a:rPr sz="2400" b="0">
-                <a:latin typeface="FZKai-Z03S"/>
+                <a:latin typeface="方正楷体简体"/>
               </a:rPr>
               <a:t>你的话5/7</a:t>
             </a:r>
@@ -4905,7 +4905,7 @@
                 <a:spcPts val="5200"/>
               </a:lnSpc>
               <a:spcBef>
-                <a:spcPts val="24"/>
+                <a:spcPts val="1200"/>
               </a:spcBef>
               <a:spcAft>
                 <a:spcPts val="0"/>
@@ -4913,7 +4913,7 @@
             </a:pPr>
             <a:r>
               <a:rPr sz="4400" b="1">
-                <a:latin typeface="FZKai-Z03S"/>
+                <a:latin typeface="方正楷体简体"/>
               </a:rPr>
               <a:t>慕尼黑信义华人教会(München)</a:t>
             </a:r>
@@ -4924,7 +4924,7 @@
                 <a:spcPts val="5200"/>
               </a:lnSpc>
               <a:spcBef>
-                <a:spcPts val="24"/>
+                <a:spcPts val="1200"/>
               </a:spcBef>
               <a:spcAft>
                 <a:spcPts val="0"/>
@@ -4932,7 +4932,7 @@
             </a:pPr>
             <a:r>
               <a:rPr sz="4400" b="1">
-                <a:latin typeface="FZKai-Z03S"/>
+                <a:latin typeface="方正楷体简体"/>
               </a:rPr>
               <a:t>全年平均聚会人数：80人</a:t>
             </a:r>
@@ -4943,7 +4943,7 @@
                 <a:spcPts val="5200"/>
               </a:lnSpc>
               <a:spcBef>
-                <a:spcPts val="24"/>
+                <a:spcPts val="1200"/>
               </a:spcBef>
               <a:spcAft>
                 <a:spcPts val="0"/>
@@ -4951,7 +4951,7 @@
             </a:pPr>
             <a:r>
               <a:rPr sz="4400" b="1">
-                <a:latin typeface="FZKai-Z03S"/>
+                <a:latin typeface="方正楷体简体"/>
               </a:rPr>
               <a:t>1.感谢主，2022年6月的圣灵降临节有多位成人和小朋友受洗，求圣灵保守他们一生认识跟从主！</a:t>
             </a:r>
@@ -4993,7 +4993,7 @@
             </a:pPr>
             <a:r>
               <a:rPr sz="2400" b="1">
-                <a:latin typeface="FZKai-Z03S"/>
+                <a:latin typeface="方正楷体简体"/>
               </a:rPr>
               <a:t>代祷事项</a:t>
             </a:r>
@@ -5053,7 +5053,7 @@
             </a:pPr>
             <a:r>
               <a:rPr sz="4800" b="0">
-                <a:latin typeface="FZZhunYuan-M02S"/>
+                <a:latin typeface="方正准圆简体"/>
               </a:rPr>
               <a:t>深藏在我心</a:t>
             </a:r>
@@ -5072,7 +5072,7 @@
             </a:pPr>
             <a:r>
               <a:rPr sz="4800" b="0">
-                <a:latin typeface="FZZhunYuan-M02S"/>
+                <a:latin typeface="方正准圆简体"/>
               </a:rPr>
               <a:t>免得我得罪祢</a:t>
             </a:r>
@@ -5091,7 +5091,7 @@
             </a:pPr>
             <a:r>
               <a:rPr sz="4800" b="0">
-                <a:latin typeface="FZZhunYuan-M02S"/>
+                <a:latin typeface="方正准圆简体"/>
               </a:rPr>
               <a:t>免得我远离</a:t>
             </a:r>
@@ -5110,7 +5110,7 @@
             </a:pPr>
             <a:r>
               <a:rPr sz="4800" b="0">
-                <a:latin typeface="FZZhunYuan-M02S"/>
+                <a:latin typeface="方正准圆简体"/>
               </a:rPr>
               <a:t>哦 主啊 与我亲近</a:t>
             </a:r>
@@ -5129,7 +5129,7 @@
             </a:pPr>
             <a:r>
               <a:rPr sz="4800" b="0">
-                <a:latin typeface="FZZhunYuan-M02S"/>
+                <a:latin typeface="方正准圆简体"/>
               </a:rPr>
               <a:t>我爱祢声音</a:t>
             </a:r>
@@ -5171,7 +5171,7 @@
             </a:pPr>
             <a:r>
               <a:rPr sz="2400" b="0">
-                <a:latin typeface="FZKai-Z03S"/>
+                <a:latin typeface="方正楷体简体"/>
               </a:rPr>
               <a:t>你的话6/7</a:t>
             </a:r>
@@ -5231,7 +5231,7 @@
             </a:pPr>
             <a:r>
               <a:rPr sz="4800" b="0">
-                <a:latin typeface="FZZhunYuan-M02S"/>
+                <a:latin typeface="方正准圆简体"/>
               </a:rPr>
               <a:t>作我脚前的灯</a:t>
             </a:r>
@@ -5250,7 +5250,7 @@
             </a:pPr>
             <a:r>
               <a:rPr sz="4800" b="0">
-                <a:latin typeface="FZZhunYuan-M02S"/>
+                <a:latin typeface="方正准圆简体"/>
               </a:rPr>
               <a:t>作我路上的光</a:t>
             </a:r>
@@ -5292,7 +5292,7 @@
             </a:pPr>
             <a:r>
               <a:rPr sz="2400" b="0">
-                <a:latin typeface="FZKai-Z03S"/>
+                <a:latin typeface="方正楷体简体"/>
               </a:rPr>
               <a:t>你的话7/7</a:t>
             </a:r>
@@ -5632,7 +5632,7 @@
                 <a:spcPts val="5200"/>
               </a:lnSpc>
               <a:spcBef>
-                <a:spcPts val="24"/>
+                <a:spcPts val="1200"/>
               </a:spcBef>
               <a:spcAft>
                 <a:spcPts val="0"/>
@@ -5640,7 +5640,7 @@
             </a:pPr>
             <a:r>
               <a:rPr sz="4400" b="1">
-                <a:latin typeface="FZKai-Z03S"/>
+                <a:latin typeface="方正楷体简体"/>
               </a:rPr>
               <a:t>2.随着教会人数增加，我们从2022年7月开始实行小组计划，愿加强弟兄姊妹之间彼此建造，同心追求成长。</a:t>
             </a:r>
@@ -5682,7 +5682,7 @@
             </a:pPr>
             <a:r>
               <a:rPr sz="2400" b="1">
-                <a:latin typeface="FZKai-Z03S"/>
+                <a:latin typeface="方正楷体简体"/>
               </a:rPr>
               <a:t>代祷事项</a:t>
             </a:r>
@@ -5734,7 +5734,7 @@
                 <a:spcPts val="5200"/>
               </a:lnSpc>
               <a:spcBef>
-                <a:spcPts val="0"/>
+                <a:spcPts val="1200"/>
               </a:spcBef>
               <a:spcAft>
                 <a:spcPts val="0"/>
@@ -5836,7 +5836,7 @@
                 <a:spcPts val="5200"/>
               </a:lnSpc>
               <a:spcBef>
-                <a:spcPts val="0"/>
+                <a:spcPts val="1200"/>
               </a:spcBef>
               <a:spcAft>
                 <a:spcPts val="0"/>
@@ -5855,7 +5855,7 @@
                 <a:spcPts val="5200"/>
               </a:lnSpc>
               <a:spcBef>
-                <a:spcPts val="0"/>
+                <a:spcPts val="1200"/>
               </a:spcBef>
               <a:spcAft>
                 <a:spcPts val="0"/>
@@ -5957,7 +5957,7 @@
                 <a:spcPts val="5200"/>
               </a:lnSpc>
               <a:spcBef>
-                <a:spcPts val="0"/>
+                <a:spcPts val="1200"/>
               </a:spcBef>
               <a:spcAft>
                 <a:spcPts val="0"/>
@@ -6059,7 +6059,7 @@
                 <a:spcPts val="5200"/>
               </a:lnSpc>
               <a:spcBef>
-                <a:spcPts val="0"/>
+                <a:spcPts val="1200"/>
               </a:spcBef>
               <a:spcAft>
                 <a:spcPts val="0"/>
@@ -6161,7 +6161,7 @@
                 <a:spcPts val="5200"/>
               </a:lnSpc>
               <a:spcBef>
-                <a:spcPts val="0"/>
+                <a:spcPts val="1200"/>
               </a:spcBef>
               <a:spcAft>
                 <a:spcPts val="0"/>
@@ -6263,7 +6263,7 @@
                 <a:spcPts val="5200"/>
               </a:lnSpc>
               <a:spcBef>
-                <a:spcPts val="0"/>
+                <a:spcPts val="1200"/>
               </a:spcBef>
               <a:spcAft>
                 <a:spcPts val="0"/>
@@ -6457,13 +6457,13 @@
             </a:pPr>
             <a:r>
               <a:rPr sz="3200" b="1">
-                <a:latin typeface="FZKai-Z03S"/>
+                <a:latin typeface="方正楷体简体"/>
               </a:rPr>
               <a:t>主题：约拿在鱼腹中的祷告</a:t>
             </a:r>
             <a:r>
               <a:rPr sz="2400" b="1">
-                <a:latin typeface="FZKai-Z03S"/>
+                <a:latin typeface="方正楷体简体"/>
               </a:rPr>
               <a:t>拿2</a:t>
             </a:r>
@@ -6482,7 +6482,7 @@
             </a:pPr>
             <a:r>
               <a:rPr sz="3200" b="1">
-                <a:latin typeface="FZKai-Z03S"/>
+                <a:latin typeface="方正楷体简体"/>
               </a:rPr>
               <a:t>证道：吴振忠牧师</a:t>
             </a:r>
@@ -6501,7 +6501,7 @@
             </a:pPr>
             <a:r>
               <a:rPr sz="3200" b="1">
-                <a:latin typeface="FZKai-Z03S"/>
+                <a:latin typeface="方正楷体简体"/>
               </a:rPr>
               <a:t>司会：刘芸竺姊妹</a:t>
             </a:r>
@@ -6520,7 +6520,7 @@
             </a:pPr>
             <a:r>
               <a:rPr sz="3200" b="1">
-                <a:latin typeface="FZKai-Z03S"/>
+                <a:latin typeface="方正楷体简体"/>
               </a:rPr>
               <a:t>司琴：李　帆弟兄</a:t>
             </a:r>
@@ -6539,7 +6539,7 @@
             </a:pPr>
             <a:r>
               <a:rPr sz="3200" b="1">
-                <a:latin typeface="FZKai-Z03S"/>
+                <a:latin typeface="方正楷体简体"/>
               </a:rPr>
               <a:t>领唱：莊雅玲姊妹、王　进弟兄</a:t>
             </a:r>
@@ -6558,7 +6558,7 @@
             </a:pPr>
             <a:r>
               <a:rPr sz="3200" b="1">
-                <a:latin typeface="FZKai-Z03S"/>
+                <a:latin typeface="方正楷体简体"/>
               </a:rPr>
               <a:t>主领执事：王泽宇弟兄</a:t>
             </a:r>
@@ -6577,7 +6577,7 @@
             </a:pPr>
             <a:r>
               <a:rPr sz="3200" b="1">
-                <a:latin typeface="FZKai-Z03S"/>
+                <a:latin typeface="方正楷体简体"/>
               </a:rPr>
               <a:t>少年主日学：马内利弟兄</a:t>
             </a:r>
@@ -6596,7 +6596,7 @@
             </a:pPr>
             <a:r>
               <a:rPr sz="3200" b="1">
-                <a:latin typeface="FZKai-Z03S"/>
+                <a:latin typeface="方正楷体简体"/>
               </a:rPr>
               <a:t>少儿主日学：刘朗朗弟兄、周向荣姊妹</a:t>
             </a:r>
@@ -6615,7 +6615,7 @@
             </a:pPr>
             <a:r>
               <a:rPr sz="3200" b="1">
-                <a:latin typeface="FZKai-Z03S"/>
+                <a:latin typeface="方正楷体简体"/>
               </a:rPr>
               <a:t>幼儿主日学：蔡文彦姊妹、苑　辉弟兄</a:t>
             </a:r>
@@ -6634,7 +6634,7 @@
             </a:pPr>
             <a:r>
               <a:rPr sz="3200" b="1">
-                <a:latin typeface="FZKai-Z03S"/>
+                <a:latin typeface="方正楷体简体"/>
               </a:rPr>
               <a:t>PPT制作播放：邱奕洲弟兄、周　斌弟兄</a:t>
             </a:r>
@@ -6676,7 +6676,7 @@
             </a:pPr>
             <a:r>
               <a:rPr sz="2400" b="1">
-                <a:latin typeface="FZKai-Z03S"/>
+                <a:latin typeface="方正楷体简体"/>
               </a:rPr>
               <a:t>2023 年 08 月 23 日主日服事表</a:t>
             </a:r>
@@ -6746,7 +6746,7 @@
                 <a:spcPts val="5200"/>
               </a:lnSpc>
               <a:spcBef>
-                <a:spcPts val="24"/>
+                <a:spcPts val="1200"/>
               </a:spcBef>
               <a:spcAft>
                 <a:spcPts val="0"/>
@@ -6754,7 +6754,7 @@
             </a:pPr>
             <a:r>
               <a:rPr sz="4400" b="1">
-                <a:latin typeface="FZKai-Z03S"/>
+                <a:latin typeface="方正楷体简体"/>
               </a:rPr>
               <a:t>3.感谢主，我们于2022年7月17日与慕尼黑华人教会联合崇拜，特别举行第一次的宣教主日。愿主复兴我们爱神爱人的心，同受着圣灵的感动来回应神的呼召和心意！</a:t>
             </a:r>
@@ -6796,7 +6796,7 @@
             </a:pPr>
             <a:r>
               <a:rPr sz="2400" b="1">
-                <a:latin typeface="FZKai-Z03S"/>
+                <a:latin typeface="方正楷体简体"/>
               </a:rPr>
               <a:t>代祷事项</a:t>
             </a:r>
@@ -7268,7 +7268,7 @@
                 <a:spcPts val="5200"/>
               </a:lnSpc>
               <a:spcBef>
-                <a:spcPts val="24"/>
+                <a:spcPts val="1200"/>
               </a:spcBef>
               <a:spcAft>
                 <a:spcPts val="0"/>
@@ -7276,7 +7276,7 @@
             </a:pPr>
             <a:r>
               <a:rPr sz="4400" b="1">
-                <a:latin typeface="FZKai-Z03S"/>
+                <a:latin typeface="方正楷体简体"/>
               </a:rPr>
               <a:t>纽伦堡华人基督教会(Nürnberg)</a:t>
             </a:r>
@@ -7287,7 +7287,7 @@
                 <a:spcPts val="5200"/>
               </a:lnSpc>
               <a:spcBef>
-                <a:spcPts val="24"/>
+                <a:spcPts val="1200"/>
               </a:spcBef>
               <a:spcAft>
                 <a:spcPts val="0"/>
@@ -7295,7 +7295,7 @@
             </a:pPr>
             <a:r>
               <a:rPr sz="4400" b="1">
-                <a:latin typeface="FZKai-Z03S"/>
+                <a:latin typeface="方正楷体简体"/>
               </a:rPr>
               <a:t>全年平均聚会人数：130人</a:t>
             </a:r>
@@ -7306,7 +7306,7 @@
                 <a:spcPts val="5200"/>
               </a:lnSpc>
               <a:spcBef>
-                <a:spcPts val="24"/>
+                <a:spcPts val="1200"/>
               </a:spcBef>
               <a:spcAft>
                 <a:spcPts val="0"/>
@@ -7314,7 +7314,7 @@
             </a:pPr>
             <a:r>
               <a:rPr sz="4400" b="1">
-                <a:latin typeface="FZKai-Z03S"/>
+                <a:latin typeface="方正楷体简体"/>
               </a:rPr>
               <a:t>1.为纽伦堡教会的爱兰根团契、拜罗伊特团契、班贝格团契、纽伦堡学生团契祷告；求主继续祝福、使用各个团契，让更多的人能听到福音、让弟兄姊妹饥渴慕义神的话、让神的爱在弟兄姊妹中见证、显明出来。</a:t>
             </a:r>
@@ -7356,7 +7356,7 @@
             </a:pPr>
             <a:r>
               <a:rPr sz="2400" b="1">
-                <a:latin typeface="FZKai-Z03S"/>
+                <a:latin typeface="方正楷体简体"/>
               </a:rPr>
               <a:t>代祷事项</a:t>
             </a:r>
@@ -7828,7 +7828,7 @@
                 <a:spcPts val="5200"/>
               </a:lnSpc>
               <a:spcBef>
-                <a:spcPts val="24"/>
+                <a:spcPts val="1200"/>
               </a:spcBef>
               <a:spcAft>
                 <a:spcPts val="0"/>
@@ -7836,7 +7836,7 @@
             </a:pPr>
             <a:r>
               <a:rPr sz="4400" b="1">
-                <a:latin typeface="FZKai-Z03S"/>
+                <a:latin typeface="方正楷体简体"/>
               </a:rPr>
               <a:t>2.为德国所有的主的教会祷告、为纽伦堡教会祷告，成为一个传福音的教会、彼此相爱的、教导神话语的教会。</a:t>
             </a:r>
@@ -7847,7 +7847,7 @@
                 <a:spcPts val="5200"/>
               </a:lnSpc>
               <a:spcBef>
-                <a:spcPts val="24"/>
+                <a:spcPts val="1200"/>
               </a:spcBef>
               <a:spcAft>
                 <a:spcPts val="0"/>
@@ -7855,7 +7855,7 @@
             </a:pPr>
             <a:r>
               <a:rPr sz="4400" b="1">
-                <a:latin typeface="FZKai-Z03S"/>
+                <a:latin typeface="方正楷体简体"/>
               </a:rPr>
               <a:t>3.求主兴起你自己的工人，传福音的工人，传讲神话语的工人，为主摆上的工人</a:t>
             </a:r>
@@ -7897,7 +7897,7 @@
             </a:pPr>
             <a:r>
               <a:rPr sz="2400" b="1">
-                <a:latin typeface="FZKai-Z03S"/>
+                <a:latin typeface="方正楷体简体"/>
               </a:rPr>
               <a:t>代祷事项</a:t>
             </a:r>
@@ -8083,13 +8083,13 @@
             </a:pPr>
             <a:r>
               <a:rPr sz="3200" b="1">
-                <a:latin typeface="FZKai-Z03S"/>
+                <a:latin typeface="方正楷体简体"/>
               </a:rPr>
               <a:t>主题：善仆与恶仆</a:t>
             </a:r>
             <a:r>
               <a:rPr sz="2400" b="1">
-                <a:latin typeface="FZKai-Z03S"/>
+                <a:latin typeface="方正楷体简体"/>
               </a:rPr>
               <a:t>路19:11-28</a:t>
             </a:r>
@@ -8108,7 +8108,7 @@
             </a:pPr>
             <a:r>
               <a:rPr sz="3200" b="1">
-                <a:latin typeface="FZKai-Z03S"/>
+                <a:latin typeface="方正楷体简体"/>
               </a:rPr>
               <a:t>证道：吴振忠牧师</a:t>
             </a:r>
@@ -8127,7 +8127,7 @@
             </a:pPr>
             <a:r>
               <a:rPr sz="3200" b="1">
-                <a:latin typeface="FZKai-Z03S"/>
+                <a:latin typeface="方正楷体简体"/>
               </a:rPr>
               <a:t>司会：马内利弟兄</a:t>
             </a:r>
@@ -8146,7 +8146,7 @@
             </a:pPr>
             <a:r>
               <a:rPr sz="3200" b="1">
-                <a:latin typeface="FZKai-Z03S"/>
+                <a:latin typeface="方正楷体简体"/>
               </a:rPr>
               <a:t>司琴：郑美灵姊妹</a:t>
             </a:r>
@@ -8165,7 +8165,7 @@
             </a:pPr>
             <a:r>
               <a:rPr sz="3200" b="1">
-                <a:latin typeface="FZKai-Z03S"/>
+                <a:latin typeface="方正楷体简体"/>
               </a:rPr>
               <a:t>领唱：牟晓昀姊妹、刘朗朗弟兄</a:t>
             </a:r>
@@ -8184,7 +8184,7 @@
             </a:pPr>
             <a:r>
               <a:rPr sz="3200" b="1">
-                <a:latin typeface="FZKai-Z03S"/>
+                <a:latin typeface="方正楷体简体"/>
               </a:rPr>
               <a:t>主领执事：李　帆弟兄</a:t>
             </a:r>
@@ -8203,7 +8203,7 @@
             </a:pPr>
             <a:r>
               <a:rPr sz="3200" b="1">
-                <a:latin typeface="FZKai-Z03S"/>
+                <a:latin typeface="方正楷体简体"/>
               </a:rPr>
               <a:t>少年主日学：刘芸竺姊妹</a:t>
             </a:r>
@@ -8222,7 +8222,7 @@
             </a:pPr>
             <a:r>
               <a:rPr sz="3200" b="1">
-                <a:latin typeface="FZKai-Z03S"/>
+                <a:latin typeface="方正楷体简体"/>
               </a:rPr>
               <a:t>少儿主日学：徐　慧姊妹、鲍　晓姊妹</a:t>
             </a:r>
@@ -8241,7 +8241,7 @@
             </a:pPr>
             <a:r>
               <a:rPr sz="3200" b="1">
-                <a:latin typeface="FZKai-Z03S"/>
+                <a:latin typeface="方正楷体简体"/>
               </a:rPr>
               <a:t>幼儿主日学：李如颖姊妹、陈慧雯姊妹</a:t>
             </a:r>
@@ -8260,7 +8260,7 @@
             </a:pPr>
             <a:r>
               <a:rPr sz="3200" b="1">
-                <a:latin typeface="FZKai-Z03S"/>
+                <a:latin typeface="方正楷体简体"/>
               </a:rPr>
               <a:t>PPT制作播放：郑　炜弟兄、丘灿荣弟兄</a:t>
             </a:r>
@@ -8302,7 +8302,7 @@
             </a:pPr>
             <a:r>
               <a:rPr sz="2400" b="1">
-                <a:latin typeface="FZKai-Z03S"/>
+                <a:latin typeface="方正楷体简体"/>
               </a:rPr>
               <a:t>2023 年 08 月 16 日主日服事表</a:t>
             </a:r>
@@ -8428,7 +8428,7 @@
             </a:pPr>
             <a:r>
               <a:rPr sz="3300" b="1">
-                <a:latin typeface="FZKai-Z03S"/>
+                <a:latin typeface="方正楷体简体"/>
               </a:rPr>
               <a:t>2023 年 09 月 03 日</a:t>
             </a:r>
@@ -8504,7 +8504,7 @@
                 <a:spcPts val="4200"/>
               </a:lnSpc>
               <a:spcBef>
-                <a:spcPts val="24"/>
+                <a:spcPts val="1200"/>
               </a:spcBef>
               <a:spcAft>
                 <a:spcPts val="0"/>
@@ -8512,7 +8512,7 @@
             </a:pPr>
             <a:r>
               <a:rPr sz="3600" b="1">
-                <a:latin typeface="FZKai-Z03S"/>
+                <a:latin typeface="方正楷体简体"/>
               </a:rPr>
               <a:t>2023 年 09 月 03 日</a:t>
             </a:r>
@@ -8741,7 +8741,7 @@
             </a:pPr>
             <a:r>
               <a:rPr sz="4000" b="1">
-                <a:latin typeface="FZKai-Z03S"/>
+                <a:latin typeface="方正楷体简体"/>
               </a:rPr>
               <a:t>宣  召</a:t>
             </a:r>
@@ -8793,7 +8793,7 @@
                 <a:spcPts val="5200"/>
               </a:lnSpc>
               <a:spcBef>
-                <a:spcPts val="0"/>
+                <a:spcPts val="1200"/>
               </a:spcBef>
               <a:spcAft>
                 <a:spcPts val="0"/>
@@ -8818,7 +8818,7 @@
                 <a:spcPts val="5200"/>
               </a:lnSpc>
               <a:spcBef>
-                <a:spcPts val="0"/>
+                <a:spcPts val="1200"/>
               </a:spcBef>
               <a:spcAft>
                 <a:spcPts val="0"/>
@@ -8926,7 +8926,7 @@
                 <a:spcPts val="5200"/>
               </a:lnSpc>
               <a:spcBef>
-                <a:spcPts val="0"/>
+                <a:spcPts val="1200"/>
               </a:spcBef>
               <a:spcAft>
                 <a:spcPts val="0"/>
@@ -8951,7 +8951,7 @@
                 <a:spcPts val="5200"/>
               </a:lnSpc>
               <a:spcBef>
-                <a:spcPts val="0"/>
+                <a:spcPts val="1200"/>
               </a:spcBef>
               <a:spcAft>
                 <a:spcPts val="0"/>
@@ -8976,7 +8976,7 @@
                 <a:spcPts val="5200"/>
               </a:lnSpc>
               <a:spcBef>
-                <a:spcPts val="0"/>
+                <a:spcPts val="1200"/>
               </a:spcBef>
               <a:spcAft>
                 <a:spcPts val="0"/>
@@ -9084,7 +9084,7 @@
                 <a:spcPts val="5200"/>
               </a:lnSpc>
               <a:spcBef>
-                <a:spcPts val="0"/>
+                <a:spcPts val="1200"/>
               </a:spcBef>
               <a:spcAft>
                 <a:spcPts val="0"/>
@@ -9109,7 +9109,7 @@
                 <a:spcPts val="5200"/>
               </a:lnSpc>
               <a:spcBef>
-                <a:spcPts val="0"/>
+                <a:spcPts val="1200"/>
               </a:spcBef>
               <a:spcAft>
                 <a:spcPts val="0"/>
@@ -9217,7 +9217,7 @@
                 <a:spcPts val="5200"/>
               </a:lnSpc>
               <a:spcBef>
-                <a:spcPts val="0"/>
+                <a:spcPts val="1200"/>
               </a:spcBef>
               <a:spcAft>
                 <a:spcPts val="0"/>
@@ -9242,7 +9242,7 @@
                 <a:spcPts val="5200"/>
               </a:lnSpc>
               <a:spcBef>
-                <a:spcPts val="0"/>
+                <a:spcPts val="1200"/>
               </a:spcBef>
               <a:spcAft>
                 <a:spcPts val="0"/>
@@ -9350,7 +9350,7 @@
                 <a:spcPts val="5200"/>
               </a:lnSpc>
               <a:spcBef>
-                <a:spcPts val="0"/>
+                <a:spcPts val="1200"/>
               </a:spcBef>
               <a:spcAft>
                 <a:spcPts val="0"/>
@@ -9375,7 +9375,7 @@
                 <a:spcPts val="5200"/>
               </a:lnSpc>
               <a:spcBef>
-                <a:spcPts val="0"/>
+                <a:spcPts val="1200"/>
               </a:spcBef>
               <a:spcAft>
                 <a:spcPts val="0"/>
@@ -9400,7 +9400,7 @@
                 <a:spcPts val="5200"/>
               </a:lnSpc>
               <a:spcBef>
-                <a:spcPts val="0"/>
+                <a:spcPts val="1200"/>
               </a:spcBef>
               <a:spcAft>
                 <a:spcPts val="0"/>
@@ -9508,7 +9508,7 @@
                 <a:spcPts val="5200"/>
               </a:lnSpc>
               <a:spcBef>
-                <a:spcPts val="0"/>
+                <a:spcPts val="1200"/>
               </a:spcBef>
               <a:spcAft>
                 <a:spcPts val="0"/>
@@ -9533,7 +9533,7 @@
                 <a:spcPts val="5200"/>
               </a:lnSpc>
               <a:spcBef>
-                <a:spcPts val="0"/>
+                <a:spcPts val="1200"/>
               </a:spcBef>
               <a:spcAft>
                 <a:spcPts val="0"/>
@@ -9558,7 +9558,7 @@
                 <a:spcPts val="5200"/>
               </a:lnSpc>
               <a:spcBef>
-                <a:spcPts val="0"/>
+                <a:spcPts val="1200"/>
               </a:spcBef>
               <a:spcAft>
                 <a:spcPts val="0"/>
@@ -9666,7 +9666,7 @@
                 <a:spcPts val="5200"/>
               </a:lnSpc>
               <a:spcBef>
-                <a:spcPts val="0"/>
+                <a:spcPts val="1200"/>
               </a:spcBef>
               <a:spcAft>
                 <a:spcPts val="0"/>
@@ -9691,7 +9691,7 @@
                 <a:spcPts val="5200"/>
               </a:lnSpc>
               <a:spcBef>
-                <a:spcPts val="0"/>
+                <a:spcPts val="1200"/>
               </a:spcBef>
               <a:spcAft>
                 <a:spcPts val="0"/>
@@ -9799,7 +9799,7 @@
                 <a:spcPts val="5200"/>
               </a:lnSpc>
               <a:spcBef>
-                <a:spcPts val="24"/>
+                <a:spcPts val="1200"/>
               </a:spcBef>
               <a:spcAft>
                 <a:spcPts val="0"/>
@@ -9807,7 +9807,7 @@
             </a:pPr>
             <a:r>
               <a:rPr sz="4400" b="1">
-                <a:latin typeface="FZKai-Z03S"/>
+                <a:latin typeface="方正楷体简体"/>
               </a:rPr>
               <a:t>为中国及其他国家的政府领导人祷告，求主赐给他们公正和智慧，让他们能够管理好国家的事务，并保障人民的权益。走在　神的心意里面。</a:t>
             </a:r>
@@ -9849,7 +9849,7 @@
             </a:pPr>
             <a:r>
               <a:rPr sz="2400" b="1">
-                <a:latin typeface="FZKai-Z03S"/>
+                <a:latin typeface="方正楷体简体"/>
               </a:rPr>
               <a:t>代祷事项</a:t>
             </a:r>
@@ -10031,7 +10031,7 @@
             </a:pPr>
             <a:r>
               <a:rPr sz="4000" b="1">
-                <a:latin typeface="FZKai-Z03S"/>
+                <a:latin typeface="方正楷体简体"/>
               </a:rPr>
               <a:t>诗歌赞美</a:t>
             </a:r>
@@ -10091,7 +10091,7 @@
             </a:pPr>
             <a:r>
               <a:rPr sz="8000" b="1">
-                <a:latin typeface="FZZhunYuan-M02S"/>
+                <a:latin typeface="方正准圆简体"/>
               </a:rPr>
               <a:t>住在你里面</a:t>
             </a:r>
@@ -10193,7 +10193,7 @@
             </a:pPr>
             <a:r>
               <a:rPr sz="4800" b="0">
-                <a:latin typeface="FZZhunYuan-M02S"/>
+                <a:latin typeface="方正准圆简体"/>
               </a:rPr>
               <a:t>在干旱无水之地我渴慕祢</a:t>
             </a:r>
@@ -10212,7 +10212,7 @@
             </a:pPr>
             <a:r>
               <a:rPr sz="4800" b="0">
-                <a:latin typeface="FZZhunYuan-M02S"/>
+                <a:latin typeface="方正准圆简体"/>
               </a:rPr>
               <a:t>在旷野无人之处我寻求祢</a:t>
             </a:r>
@@ -10231,7 +10231,7 @@
             </a:pPr>
             <a:r>
               <a:rPr sz="4800" b="0">
-                <a:latin typeface="FZZhunYuan-M02S"/>
+                <a:latin typeface="方正准圆简体"/>
               </a:rPr>
               <a:t>得救在乎归回安息</a:t>
             </a:r>
@@ -10250,7 +10250,7 @@
             </a:pPr>
             <a:r>
               <a:rPr sz="4800" b="0">
-                <a:latin typeface="FZZhunYuan-M02S"/>
+                <a:latin typeface="方正准圆简体"/>
               </a:rPr>
               <a:t>得力在乎平静安稳</a:t>
             </a:r>
@@ -10292,7 +10292,7 @@
             </a:pPr>
             <a:r>
               <a:rPr sz="2400" b="0">
-                <a:latin typeface="FZKai-Z03S"/>
+                <a:latin typeface="方正楷体简体"/>
               </a:rPr>
               <a:t>住在你里面1/7</a:t>
             </a:r>
@@ -10352,7 +10352,7 @@
             </a:pPr>
             <a:r>
               <a:rPr sz="4800" b="0">
-                <a:latin typeface="FZZhunYuan-M02S"/>
+                <a:latin typeface="方正准圆简体"/>
               </a:rPr>
               <a:t>我等候祢 如鹰展翅上腾</a:t>
             </a:r>
@@ -10371,7 +10371,7 @@
             </a:pPr>
             <a:r>
               <a:rPr sz="4800" b="0">
-                <a:latin typeface="FZZhunYuan-M02S"/>
+                <a:latin typeface="方正准圆简体"/>
               </a:rPr>
               <a:t>在干旱无水之地我渴慕祢</a:t>
             </a:r>
@@ -10390,7 +10390,7 @@
             </a:pPr>
             <a:r>
               <a:rPr sz="4800" b="0">
-                <a:latin typeface="FZZhunYuan-M02S"/>
+                <a:latin typeface="方正准圆简体"/>
               </a:rPr>
               <a:t>在旷野无人之处我寻求祢</a:t>
             </a:r>
@@ -10409,7 +10409,7 @@
             </a:pPr>
             <a:r>
               <a:rPr sz="4800" b="0">
-                <a:latin typeface="FZZhunYuan-M02S"/>
+                <a:latin typeface="方正准圆简体"/>
               </a:rPr>
               <a:t>得救在乎归回安息</a:t>
             </a:r>
@@ -10451,7 +10451,7 @@
             </a:pPr>
             <a:r>
               <a:rPr sz="2400" b="0">
-                <a:latin typeface="FZKai-Z03S"/>
+                <a:latin typeface="方正楷体简体"/>
               </a:rPr>
               <a:t>住在你里面2/7</a:t>
             </a:r>
@@ -10511,7 +10511,7 @@
             </a:pPr>
             <a:r>
               <a:rPr sz="4800" b="0">
-                <a:latin typeface="FZZhunYuan-M02S"/>
+                <a:latin typeface="方正准圆简体"/>
               </a:rPr>
               <a:t>得力在乎平静安稳</a:t>
             </a:r>
@@ -10530,7 +10530,7 @@
             </a:pPr>
             <a:r>
               <a:rPr sz="4800" b="0">
-                <a:latin typeface="FZZhunYuan-M02S"/>
+                <a:latin typeface="方正准圆简体"/>
               </a:rPr>
               <a:t>我等候祢 如鹰展翅上腾</a:t>
             </a:r>
@@ -10549,7 +10549,7 @@
             </a:pPr>
             <a:r>
               <a:rPr sz="4800" b="0">
-                <a:latin typeface="FZZhunYuan-M02S"/>
+                <a:latin typeface="方正准圆简体"/>
               </a:rPr>
               <a:t>住在祢里面 住在祢里面</a:t>
             </a:r>
@@ -10568,7 +10568,7 @@
             </a:pPr>
             <a:r>
               <a:rPr sz="4800" b="0">
-                <a:latin typeface="FZZhunYuan-M02S"/>
+                <a:latin typeface="方正准圆简体"/>
               </a:rPr>
               <a:t>如同枝子与葡萄树紧紧相连</a:t>
             </a:r>
@@ -10610,7 +10610,7 @@
             </a:pPr>
             <a:r>
               <a:rPr sz="2400" b="0">
-                <a:latin typeface="FZKai-Z03S"/>
+                <a:latin typeface="方正楷体简体"/>
               </a:rPr>
               <a:t>住在你里面3/7</a:t>
             </a:r>
@@ -10670,7 +10670,7 @@
             </a:pPr>
             <a:r>
               <a:rPr sz="4800" b="0">
-                <a:latin typeface="FZZhunYuan-M02S"/>
+                <a:latin typeface="方正准圆简体"/>
               </a:rPr>
               <a:t>住在祢里面 住在祢里面</a:t>
             </a:r>
@@ -10689,7 +10689,7 @@
             </a:pPr>
             <a:r>
               <a:rPr sz="4800" b="0">
-                <a:latin typeface="FZZhunYuan-M02S"/>
+                <a:latin typeface="方正准圆简体"/>
               </a:rPr>
               <a:t>领受生命活水泉源永不枯竭</a:t>
             </a:r>
@@ -10731,7 +10731,7 @@
             </a:pPr>
             <a:r>
               <a:rPr sz="2400" b="0">
-                <a:latin typeface="FZKai-Z03S"/>
+                <a:latin typeface="方正楷体简体"/>
               </a:rPr>
               <a:t>住在你里面4/7</a:t>
             </a:r>
@@ -10791,7 +10791,7 @@
             </a:pPr>
             <a:r>
               <a:rPr sz="4800" b="0">
-                <a:latin typeface="FZZhunYuan-M02S"/>
+                <a:latin typeface="方正准圆简体"/>
               </a:rPr>
               <a:t>住在祢里面 住在祢里面</a:t>
             </a:r>
@@ -10810,7 +10810,7 @@
             </a:pPr>
             <a:r>
               <a:rPr sz="4800" b="0">
-                <a:latin typeface="FZZhunYuan-M02S"/>
+                <a:latin typeface="方正准圆简体"/>
               </a:rPr>
               <a:t>如同枝子与葡萄树紧紧相连</a:t>
             </a:r>
@@ -10829,7 +10829,7 @@
             </a:pPr>
             <a:r>
               <a:rPr sz="4800" b="0">
-                <a:latin typeface="FZZhunYuan-M02S"/>
+                <a:latin typeface="方正准圆简体"/>
               </a:rPr>
               <a:t>住在祢里面 住在祢里面</a:t>
             </a:r>
@@ -10848,7 +10848,7 @@
             </a:pPr>
             <a:r>
               <a:rPr sz="4800" b="0">
-                <a:latin typeface="FZZhunYuan-M02S"/>
+                <a:latin typeface="方正准圆简体"/>
               </a:rPr>
               <a:t>领受生命活水泉源永不枯竭</a:t>
             </a:r>
@@ -10890,7 +10890,7 @@
             </a:pPr>
             <a:r>
               <a:rPr sz="2400" b="0">
-                <a:latin typeface="FZKai-Z03S"/>
+                <a:latin typeface="方正楷体简体"/>
               </a:rPr>
               <a:t>住在你里面5/7</a:t>
             </a:r>
@@ -10950,7 +10950,7 @@
             </a:pPr>
             <a:r>
               <a:rPr sz="4800" b="0">
-                <a:latin typeface="FZZhunYuan-M02S"/>
+                <a:latin typeface="方正准圆简体"/>
               </a:rPr>
               <a:t>住在祢里面 住在祢里面</a:t>
             </a:r>
@@ -10969,7 +10969,7 @@
             </a:pPr>
             <a:r>
               <a:rPr sz="4800" b="0">
-                <a:latin typeface="FZZhunYuan-M02S"/>
+                <a:latin typeface="方正准圆简体"/>
               </a:rPr>
               <a:t>如同枝子与葡萄树紧紧相连</a:t>
             </a:r>
@@ -10988,7 +10988,7 @@
             </a:pPr>
             <a:r>
               <a:rPr sz="4800" b="0">
-                <a:latin typeface="FZZhunYuan-M02S"/>
+                <a:latin typeface="方正准圆简体"/>
               </a:rPr>
               <a:t>住在祢里面 住在祢里面</a:t>
             </a:r>
@@ -11007,7 +11007,7 @@
             </a:pPr>
             <a:r>
               <a:rPr sz="4800" b="0">
-                <a:latin typeface="FZZhunYuan-M02S"/>
+                <a:latin typeface="方正准圆简体"/>
               </a:rPr>
               <a:t>领受生命活水泉源永不枯竭</a:t>
             </a:r>
@@ -11049,7 +11049,7 @@
             </a:pPr>
             <a:r>
               <a:rPr sz="2400" b="0">
-                <a:latin typeface="FZKai-Z03S"/>
+                <a:latin typeface="方正楷体简体"/>
               </a:rPr>
               <a:t>住在你里面6/7</a:t>
             </a:r>
@@ -11109,7 +11109,7 @@
             </a:pPr>
             <a:r>
               <a:rPr sz="4800" b="0">
-                <a:latin typeface="FZZhunYuan-M02S"/>
+                <a:latin typeface="方正准圆简体"/>
               </a:rPr>
               <a:t>住在祢里面 住在祢里面</a:t>
             </a:r>
@@ -11128,7 +11128,7 @@
             </a:pPr>
             <a:r>
               <a:rPr sz="4800" b="0">
-                <a:latin typeface="FZZhunYuan-M02S"/>
+                <a:latin typeface="方正准圆简体"/>
               </a:rPr>
               <a:t>领受生命活水泉源永不枯竭</a:t>
             </a:r>
@@ -11170,7 +11170,7 @@
             </a:pPr>
             <a:r>
               <a:rPr sz="2400" b="0">
-                <a:latin typeface="FZKai-Z03S"/>
+                <a:latin typeface="方正楷体简体"/>
               </a:rPr>
               <a:t>住在你里面7/7</a:t>
             </a:r>
@@ -11222,7 +11222,7 @@
                 <a:spcPts val="5200"/>
               </a:lnSpc>
               <a:spcBef>
-                <a:spcPts val="24"/>
+                <a:spcPts val="1200"/>
               </a:spcBef>
               <a:spcAft>
                 <a:spcPts val="0"/>
@@ -11230,7 +11230,7 @@
             </a:pPr>
             <a:r>
               <a:rPr sz="4400" b="1">
-                <a:latin typeface="FZKai-Z03S"/>
+                <a:latin typeface="方正楷体简体"/>
               </a:rPr>
               <a:t>为同工营的顺利进行和圣灵大大运行在营会中祈求，让参与的弟兄姊妹们被圣灵带领，生命里外更新。</a:t>
             </a:r>
@@ -11272,7 +11272,7 @@
             </a:pPr>
             <a:r>
               <a:rPr sz="2400" b="1">
-                <a:latin typeface="FZKai-Z03S"/>
+                <a:latin typeface="方正楷体简体"/>
               </a:rPr>
               <a:t>代祷事项</a:t>
             </a:r>
@@ -11350,7 +11350,7 @@
             </a:pPr>
             <a:r>
               <a:rPr sz="8000" b="1">
-                <a:latin typeface="FZZhunYuan-M02S"/>
+                <a:latin typeface="方正准圆简体"/>
               </a:rPr>
               <a:t>夜间的歌曲</a:t>
             </a:r>
@@ -11452,7 +11452,7 @@
             </a:pPr>
             <a:r>
               <a:rPr sz="4800" b="0">
-                <a:latin typeface="FZZhunYuan-M02S"/>
+                <a:latin typeface="方正准圆简体"/>
               </a:rPr>
               <a:t>患难之日我寻求主</a:t>
             </a:r>
@@ -11471,7 +11471,7 @@
             </a:pPr>
             <a:r>
               <a:rPr sz="4800" b="0">
-                <a:latin typeface="FZZhunYuan-M02S"/>
+                <a:latin typeface="方正准圆简体"/>
               </a:rPr>
               <a:t>烦躁的心不受安慰</a:t>
             </a:r>
@@ -11490,7 +11490,7 @@
             </a:pPr>
             <a:r>
               <a:rPr sz="4800" b="0">
-                <a:latin typeface="FZZhunYuan-M02S"/>
+                <a:latin typeface="方正准圆简体"/>
               </a:rPr>
               <a:t>悲哀之年我要发声呼求</a:t>
             </a:r>
@@ -11509,7 +11509,7 @@
             </a:pPr>
             <a:r>
               <a:rPr sz="4800" b="0">
-                <a:latin typeface="FZZhunYuan-M02S"/>
+                <a:latin typeface="方正准圆简体"/>
               </a:rPr>
               <a:t>举手祷告</a:t>
             </a:r>
@@ -11551,7 +11551,7 @@
             </a:pPr>
             <a:r>
               <a:rPr sz="2400" b="0">
-                <a:latin typeface="FZKai-Z03S"/>
+                <a:latin typeface="方正楷体简体"/>
               </a:rPr>
               <a:t>夜间的歌曲1/11</a:t>
             </a:r>
@@ -11611,7 +11611,7 @@
             </a:pPr>
             <a:r>
               <a:rPr sz="4800" b="0">
-                <a:latin typeface="FZZhunYuan-M02S"/>
+                <a:latin typeface="方正准圆简体"/>
               </a:rPr>
               <a:t>沉吟悲伤内心发昏</a:t>
             </a:r>
@@ -11630,7 +11630,7 @@
             </a:pPr>
             <a:r>
               <a:rPr sz="4800" b="0">
-                <a:latin typeface="FZZhunYuan-M02S"/>
+                <a:latin typeface="方正准圆简体"/>
               </a:rPr>
               <a:t>难道主要永远丢弃</a:t>
             </a:r>
@@ -11649,7 +11649,7 @@
             </a:pPr>
             <a:r>
               <a:rPr sz="4800" b="0">
-                <a:latin typeface="FZZhunYuan-M02S"/>
+                <a:latin typeface="方正准圆简体"/>
               </a:rPr>
               <a:t>不再施恩 应许废弃</a:t>
             </a:r>
@@ -11668,7 +11668,7 @@
             </a:pPr>
             <a:r>
               <a:rPr sz="4800" b="0">
-                <a:latin typeface="FZZhunYuan-M02S"/>
+                <a:latin typeface="方正准圆简体"/>
               </a:rPr>
               <a:t>难道他的慈爱永远穷尽</a:t>
             </a:r>
@@ -11710,7 +11710,7 @@
             </a:pPr>
             <a:r>
               <a:rPr sz="2400" b="0">
-                <a:latin typeface="FZKai-Z03S"/>
+                <a:latin typeface="方正楷体简体"/>
               </a:rPr>
               <a:t>夜间的歌曲2/11</a:t>
             </a:r>
@@ -11770,7 +11770,7 @@
             </a:pPr>
             <a:r>
               <a:rPr sz="4800" b="0">
-                <a:latin typeface="FZZhunYuan-M02S"/>
+                <a:latin typeface="方正准圆简体"/>
               </a:rPr>
               <a:t>忘记施恩</a:t>
             </a:r>
@@ -11789,7 +11789,7 @@
             </a:pPr>
             <a:r>
               <a:rPr sz="4800" b="0">
-                <a:latin typeface="FZZhunYuan-M02S"/>
+                <a:latin typeface="方正准圆简体"/>
               </a:rPr>
               <a:t>因发怒止住他怜悯</a:t>
             </a:r>
@@ -11808,7 +11808,7 @@
             </a:pPr>
             <a:r>
               <a:rPr sz="4800" b="0">
-                <a:latin typeface="FZZhunYuan-M02S"/>
+                <a:latin typeface="方正准圆简体"/>
               </a:rPr>
               <a:t>难道主要永远丢弃</a:t>
             </a:r>
@@ -11827,7 +11827,7 @@
             </a:pPr>
             <a:r>
               <a:rPr sz="4800" b="0">
-                <a:latin typeface="FZZhunYuan-M02S"/>
+                <a:latin typeface="方正准圆简体"/>
               </a:rPr>
               <a:t>不再施恩 应许废弃</a:t>
             </a:r>
@@ -11846,7 +11846,7 @@
             </a:pPr>
             <a:r>
               <a:rPr sz="4800" b="0">
-                <a:latin typeface="FZZhunYuan-M02S"/>
+                <a:latin typeface="方正准圆简体"/>
               </a:rPr>
               <a:t>难道他的慈爱永远穷尽</a:t>
             </a:r>
@@ -11888,7 +11888,7 @@
             </a:pPr>
             <a:r>
               <a:rPr sz="2400" b="0">
-                <a:latin typeface="FZKai-Z03S"/>
+                <a:latin typeface="方正楷体简体"/>
               </a:rPr>
               <a:t>夜间的歌曲3/11</a:t>
             </a:r>
@@ -11948,7 +11948,7 @@
             </a:pPr>
             <a:r>
               <a:rPr sz="4800" b="0">
-                <a:latin typeface="FZZhunYuan-M02S"/>
+                <a:latin typeface="方正准圆简体"/>
               </a:rPr>
               <a:t>忘记施恩</a:t>
             </a:r>
@@ -11967,7 +11967,7 @@
             </a:pPr>
             <a:r>
               <a:rPr sz="4800" b="0">
-                <a:latin typeface="FZZhunYuan-M02S"/>
+                <a:latin typeface="方正准圆简体"/>
               </a:rPr>
               <a:t>因发怒止住他怜悯</a:t>
             </a:r>
@@ -11986,7 +11986,7 @@
             </a:pPr>
             <a:r>
               <a:rPr sz="4800" b="0">
-                <a:latin typeface="FZZhunYuan-M02S"/>
+                <a:latin typeface="方正准圆简体"/>
               </a:rPr>
               <a:t>赐我夜间的歌曲</a:t>
             </a:r>
@@ -12005,7 +12005,7 @@
             </a:pPr>
             <a:r>
               <a:rPr sz="4800" b="0">
-                <a:latin typeface="FZZhunYuan-M02S"/>
+                <a:latin typeface="方正准圆简体"/>
               </a:rPr>
               <a:t>追念主的能力</a:t>
             </a:r>
@@ -12047,7 +12047,7 @@
             </a:pPr>
             <a:r>
               <a:rPr sz="2400" b="0">
-                <a:latin typeface="FZKai-Z03S"/>
+                <a:latin typeface="方正楷体简体"/>
               </a:rPr>
               <a:t>夜间的歌曲4/11</a:t>
             </a:r>
@@ -12107,7 +12107,7 @@
             </a:pPr>
             <a:r>
               <a:rPr sz="4800" b="0">
-                <a:latin typeface="FZZhunYuan-M02S"/>
+                <a:latin typeface="方正准圆简体"/>
               </a:rPr>
               <a:t>夜间的歌曲 记念古时奇事</a:t>
             </a:r>
@@ -12126,7 +12126,7 @@
             </a:pPr>
             <a:r>
               <a:rPr sz="4800" b="0">
-                <a:latin typeface="FZZhunYuan-M02S"/>
+                <a:latin typeface="方正准圆简体"/>
               </a:rPr>
               <a:t>夜间的歌曲 默念他的作为</a:t>
             </a:r>
@@ -12145,7 +12145,7 @@
             </a:pPr>
             <a:r>
               <a:rPr sz="4800" b="0">
-                <a:latin typeface="FZZhunYuan-M02S"/>
+                <a:latin typeface="方正准圆简体"/>
               </a:rPr>
               <a:t>因他曾在大水中开道路</a:t>
             </a:r>
@@ -12164,7 +12164,7 @@
             </a:pPr>
             <a:r>
               <a:rPr sz="4800" b="0">
-                <a:latin typeface="FZZhunYuan-M02S"/>
+                <a:latin typeface="方正准圆简体"/>
               </a:rPr>
               <a:t>至高的神能力无限</a:t>
             </a:r>
@@ -12206,7 +12206,7 @@
             </a:pPr>
             <a:r>
               <a:rPr sz="2400" b="0">
-                <a:latin typeface="FZKai-Z03S"/>
+                <a:latin typeface="方正楷体简体"/>
               </a:rPr>
               <a:t>夜间的歌曲5/11</a:t>
             </a:r>
@@ -12266,7 +12266,7 @@
             </a:pPr>
             <a:r>
               <a:rPr sz="4800" b="0">
-                <a:latin typeface="FZZhunYuan-M02S"/>
+                <a:latin typeface="方正准圆简体"/>
               </a:rPr>
               <a:t>大地众水战抖惊惶</a:t>
             </a:r>
@@ -12285,7 +12285,7 @@
             </a:pPr>
             <a:r>
               <a:rPr sz="4800" b="0">
-                <a:latin typeface="FZZhunYuan-M02S"/>
+                <a:latin typeface="方正准圆简体"/>
               </a:rPr>
               <a:t>慈爱的神使人夜间歌唱</a:t>
             </a:r>
@@ -12304,7 +12304,7 @@
             </a:pPr>
             <a:r>
               <a:rPr sz="4800" b="0">
-                <a:latin typeface="FZZhunYuan-M02S"/>
+                <a:latin typeface="方正准圆简体"/>
               </a:rPr>
               <a:t>重拾盼望</a:t>
             </a:r>
@@ -12323,7 +12323,7 @@
             </a:pPr>
             <a:r>
               <a:rPr sz="4800" b="0">
-                <a:latin typeface="FZZhunYuan-M02S"/>
+                <a:latin typeface="方正准圆简体"/>
               </a:rPr>
               <a:t>你忠诚慈爱引导我</a:t>
             </a:r>
@@ -12365,7 +12365,7 @@
             </a:pPr>
             <a:r>
               <a:rPr sz="2400" b="0">
-                <a:latin typeface="FZKai-Z03S"/>
+                <a:latin typeface="方正楷体简体"/>
               </a:rPr>
               <a:t>夜间的歌曲6/11</a:t>
             </a:r>
@@ -12425,7 +12425,7 @@
             </a:pPr>
             <a:r>
               <a:rPr sz="4800" b="0">
-                <a:latin typeface="FZZhunYuan-M02S"/>
+                <a:latin typeface="方正准圆简体"/>
               </a:rPr>
               <a:t>难道主要永远丢弃</a:t>
             </a:r>
@@ -12444,7 +12444,7 @@
             </a:pPr>
             <a:r>
               <a:rPr sz="4800" b="0">
-                <a:latin typeface="FZZhunYuan-M02S"/>
+                <a:latin typeface="方正准圆简体"/>
               </a:rPr>
               <a:t>不再施恩 应许废弃</a:t>
             </a:r>
@@ -12463,7 +12463,7 @@
             </a:pPr>
             <a:r>
               <a:rPr sz="4800" b="0">
-                <a:latin typeface="FZZhunYuan-M02S"/>
+                <a:latin typeface="方正准圆简体"/>
               </a:rPr>
               <a:t>难道他的慈爱永远穷尽</a:t>
             </a:r>
@@ -12482,7 +12482,7 @@
             </a:pPr>
             <a:r>
               <a:rPr sz="4800" b="0">
-                <a:latin typeface="FZZhunYuan-M02S"/>
+                <a:latin typeface="方正准圆简体"/>
               </a:rPr>
               <a:t>忘记施恩</a:t>
             </a:r>
@@ -12501,7 +12501,7 @@
             </a:pPr>
             <a:r>
               <a:rPr sz="4800" b="0">
-                <a:latin typeface="FZZhunYuan-M02S"/>
+                <a:latin typeface="方正准圆简体"/>
               </a:rPr>
               <a:t>因发怒止住他怜悯</a:t>
             </a:r>
@@ -12543,7 +12543,7 @@
             </a:pPr>
             <a:r>
               <a:rPr sz="2400" b="0">
-                <a:latin typeface="FZKai-Z03S"/>
+                <a:latin typeface="方正楷体简体"/>
               </a:rPr>
               <a:t>夜间的歌曲7/11</a:t>
             </a:r>
@@ -12603,7 +12603,7 @@
             </a:pPr>
             <a:r>
               <a:rPr sz="4800" b="0">
-                <a:latin typeface="FZZhunYuan-M02S"/>
+                <a:latin typeface="方正准圆简体"/>
               </a:rPr>
               <a:t>赐我夜间的歌曲</a:t>
             </a:r>
@@ -12622,7 +12622,7 @@
             </a:pPr>
             <a:r>
               <a:rPr sz="4800" b="0">
-                <a:latin typeface="FZZhunYuan-M02S"/>
+                <a:latin typeface="方正准圆简体"/>
               </a:rPr>
               <a:t>追念主的能力</a:t>
             </a:r>
@@ -12641,7 +12641,7 @@
             </a:pPr>
             <a:r>
               <a:rPr sz="4800" b="0">
-                <a:latin typeface="FZZhunYuan-M02S"/>
+                <a:latin typeface="方正准圆简体"/>
               </a:rPr>
               <a:t>夜间的歌曲 记念古时奇事</a:t>
             </a:r>
@@ -12660,7 +12660,7 @@
             </a:pPr>
             <a:r>
               <a:rPr sz="4800" b="0">
-                <a:latin typeface="FZZhunYuan-M02S"/>
+                <a:latin typeface="方正准圆简体"/>
               </a:rPr>
               <a:t>夜间的歌曲 默念他的作为</a:t>
             </a:r>
@@ -12679,7 +12679,7 @@
             </a:pPr>
             <a:r>
               <a:rPr sz="4800" b="0">
-                <a:latin typeface="FZZhunYuan-M02S"/>
+                <a:latin typeface="方正准圆简体"/>
               </a:rPr>
               <a:t>因他曾在大水中开道路</a:t>
             </a:r>
@@ -12721,7 +12721,7 @@
             </a:pPr>
             <a:r>
               <a:rPr sz="2400" b="0">
-                <a:latin typeface="FZKai-Z03S"/>
+                <a:latin typeface="方正楷体简体"/>
               </a:rPr>
               <a:t>夜间的歌曲8/11</a:t>
             </a:r>
@@ -12773,7 +12773,7 @@
                 <a:spcPts val="5200"/>
               </a:lnSpc>
               <a:spcBef>
-                <a:spcPts val="24"/>
+                <a:spcPts val="1200"/>
               </a:spcBef>
               <a:spcAft>
                 <a:spcPts val="0"/>
@@ -12781,7 +12781,7 @@
             </a:pPr>
             <a:r>
               <a:rPr sz="4400" b="1">
-                <a:latin typeface="FZKai-Z03S"/>
+                <a:latin typeface="方正楷体简体"/>
               </a:rPr>
               <a:t>为身体抱恙或年纪大的弟兄姊妹祷告，求主医治他们的创伤和疾病，赐给他们信心和安慰，经历主的恩典。</a:t>
             </a:r>
@@ -12823,7 +12823,7 @@
             </a:pPr>
             <a:r>
               <a:rPr sz="2400" b="1">
-                <a:latin typeface="FZKai-Z03S"/>
+                <a:latin typeface="方正楷体简体"/>
               </a:rPr>
               <a:t>代祷事项</a:t>
             </a:r>
@@ -12883,7 +12883,7 @@
             </a:pPr>
             <a:r>
               <a:rPr sz="4800" b="0">
-                <a:latin typeface="FZZhunYuan-M02S"/>
+                <a:latin typeface="方正准圆简体"/>
               </a:rPr>
               <a:t>赐我夜间的歌曲</a:t>
             </a:r>
@@ -12902,7 +12902,7 @@
             </a:pPr>
             <a:r>
               <a:rPr sz="4800" b="0">
-                <a:latin typeface="FZZhunYuan-M02S"/>
+                <a:latin typeface="方正准圆简体"/>
               </a:rPr>
               <a:t>追念主的能力</a:t>
             </a:r>
@@ -12921,7 +12921,7 @@
             </a:pPr>
             <a:r>
               <a:rPr sz="4800" b="0">
-                <a:latin typeface="FZZhunYuan-M02S"/>
+                <a:latin typeface="方正准圆简体"/>
               </a:rPr>
               <a:t>夜间的歌曲 记念古时奇事</a:t>
             </a:r>
@@ -12940,7 +12940,7 @@
             </a:pPr>
             <a:r>
               <a:rPr sz="4800" b="0">
-                <a:latin typeface="FZZhunYuan-M02S"/>
+                <a:latin typeface="方正准圆简体"/>
               </a:rPr>
               <a:t>夜间的歌曲 默念他的作为</a:t>
             </a:r>
@@ -12959,7 +12959,7 @@
             </a:pPr>
             <a:r>
               <a:rPr sz="4800" b="0">
-                <a:latin typeface="FZZhunYuan-M02S"/>
+                <a:latin typeface="方正准圆简体"/>
               </a:rPr>
               <a:t>因他曾在大水中开道路</a:t>
             </a:r>
@@ -13001,7 +13001,7 @@
             </a:pPr>
             <a:r>
               <a:rPr sz="2400" b="0">
-                <a:latin typeface="FZKai-Z03S"/>
+                <a:latin typeface="方正楷体简体"/>
               </a:rPr>
               <a:t>夜间的歌曲9/11</a:t>
             </a:r>
@@ -13061,7 +13061,7 @@
             </a:pPr>
             <a:r>
               <a:rPr sz="4800" b="0">
-                <a:latin typeface="FZZhunYuan-M02S"/>
+                <a:latin typeface="方正准圆简体"/>
               </a:rPr>
               <a:t>至高的神能力无限</a:t>
             </a:r>
@@ -13080,7 +13080,7 @@
             </a:pPr>
             <a:r>
               <a:rPr sz="4800" b="0">
-                <a:latin typeface="FZZhunYuan-M02S"/>
+                <a:latin typeface="方正准圆简体"/>
               </a:rPr>
               <a:t>大地众水战抖惊惶</a:t>
             </a:r>
@@ -13099,7 +13099,7 @@
             </a:pPr>
             <a:r>
               <a:rPr sz="4800" b="0">
-                <a:latin typeface="FZZhunYuan-M02S"/>
+                <a:latin typeface="方正准圆简体"/>
               </a:rPr>
               <a:t>慈爱的神使人夜间歌唱</a:t>
             </a:r>
@@ -13118,7 +13118,7 @@
             </a:pPr>
             <a:r>
               <a:rPr sz="4800" b="0">
-                <a:latin typeface="FZZhunYuan-M02S"/>
+                <a:latin typeface="方正准圆简体"/>
               </a:rPr>
               <a:t>重拾盼望</a:t>
             </a:r>
@@ -13137,7 +13137,7 @@
             </a:pPr>
             <a:r>
               <a:rPr sz="4800" b="0">
-                <a:latin typeface="FZZhunYuan-M02S"/>
+                <a:latin typeface="方正准圆简体"/>
               </a:rPr>
               <a:t>你忠诚慈爱引导我</a:t>
             </a:r>
@@ -13179,7 +13179,7 @@
             </a:pPr>
             <a:r>
               <a:rPr sz="2400" b="0">
-                <a:latin typeface="FZKai-Z03S"/>
+                <a:latin typeface="方正楷体简体"/>
               </a:rPr>
               <a:t>夜间的歌曲10/11</a:t>
             </a:r>
@@ -13239,7 +13239,7 @@
             </a:pPr>
             <a:r>
               <a:rPr sz="4800" b="0">
-                <a:latin typeface="FZZhunYuan-M02S"/>
+                <a:latin typeface="方正准圆简体"/>
               </a:rPr>
               <a:t>慈爱的神使人夜间歌唱</a:t>
             </a:r>
@@ -13258,7 +13258,7 @@
             </a:pPr>
             <a:r>
               <a:rPr sz="4800" b="0">
-                <a:latin typeface="FZZhunYuan-M02S"/>
+                <a:latin typeface="方正准圆简体"/>
               </a:rPr>
               <a:t>重拾盼望</a:t>
             </a:r>
@@ -13277,7 +13277,7 @@
             </a:pPr>
             <a:r>
               <a:rPr sz="4800" b="0">
-                <a:latin typeface="FZZhunYuan-M02S"/>
+                <a:latin typeface="方正准圆简体"/>
               </a:rPr>
               <a:t>你忠诚慈爱引导我</a:t>
             </a:r>
@@ -13319,7 +13319,7 @@
             </a:pPr>
             <a:r>
               <a:rPr sz="2400" b="0">
-                <a:latin typeface="FZKai-Z03S"/>
+                <a:latin typeface="方正楷体简体"/>
               </a:rPr>
               <a:t>夜间的歌曲11/11</a:t>
             </a:r>
@@ -13397,7 +13397,7 @@
             </a:pPr>
             <a:r>
               <a:rPr sz="8000" b="1">
-                <a:latin typeface="FZZhunYuan-M02S"/>
+                <a:latin typeface="方正准圆简体"/>
               </a:rPr>
               <a:t>荣耀颂</a:t>
             </a:r>
@@ -13499,7 +13499,7 @@
             </a:pPr>
             <a:r>
               <a:rPr sz="4800" b="0">
-                <a:latin typeface="FZZhunYuan-M02S"/>
+                <a:latin typeface="方正准圆简体"/>
               </a:rPr>
               <a:t>诸天述说神的荣耀</a:t>
             </a:r>
@@ -13518,7 +13518,7 @@
             </a:pPr>
             <a:r>
               <a:rPr sz="4800" b="0">
-                <a:latin typeface="FZZhunYuan-M02S"/>
+                <a:latin typeface="方正准圆简体"/>
               </a:rPr>
               <a:t>穹苍传扬他的作为</a:t>
             </a:r>
@@ -13537,7 +13537,7 @@
             </a:pPr>
             <a:r>
               <a:rPr sz="4800" b="0">
-                <a:latin typeface="FZZhunYuan-M02S"/>
+                <a:latin typeface="方正准圆简体"/>
               </a:rPr>
               <a:t>赞美的呼声</a:t>
             </a:r>
@@ -13556,7 +13556,7 @@
             </a:pPr>
             <a:r>
               <a:rPr sz="4800" b="0">
-                <a:latin typeface="FZZhunYuan-M02S"/>
+                <a:latin typeface="方正准圆简体"/>
               </a:rPr>
               <a:t>如澎湃的大水</a:t>
             </a:r>
@@ -13575,7 +13575,7 @@
             </a:pPr>
             <a:r>
               <a:rPr sz="4800" b="0">
-                <a:latin typeface="FZZhunYuan-M02S"/>
+                <a:latin typeface="方正准圆简体"/>
               </a:rPr>
               <a:t>太阳普照温暖世界</a:t>
             </a:r>
@@ -13617,7 +13617,7 @@
             </a:pPr>
             <a:r>
               <a:rPr sz="2400" b="0">
-                <a:latin typeface="FZKai-Z03S"/>
+                <a:latin typeface="方正楷体简体"/>
               </a:rPr>
               <a:t>荣耀颂1/8</a:t>
             </a:r>
@@ -13677,7 +13677,7 @@
             </a:pPr>
             <a:r>
               <a:rPr sz="4800" b="0">
-                <a:latin typeface="FZZhunYuan-M02S"/>
+                <a:latin typeface="方正准圆简体"/>
               </a:rPr>
               <a:t>月亮星宿发出光辉</a:t>
             </a:r>
@@ -13696,7 +13696,7 @@
             </a:pPr>
             <a:r>
               <a:rPr sz="4800" b="0">
-                <a:latin typeface="FZZhunYuan-M02S"/>
+                <a:latin typeface="方正准圆简体"/>
               </a:rPr>
               <a:t>宇宙的万有</a:t>
             </a:r>
@@ -13715,7 +13715,7 @@
             </a:pPr>
             <a:r>
               <a:rPr sz="4800" b="0">
-                <a:latin typeface="FZZhunYuan-M02S"/>
+                <a:latin typeface="方正准圆简体"/>
               </a:rPr>
               <a:t>必大声赞美</a:t>
             </a:r>
@@ -13734,7 +13734,7 @@
             </a:pPr>
             <a:r>
               <a:rPr sz="4800" b="0">
-                <a:latin typeface="FZZhunYuan-M02S"/>
+                <a:latin typeface="方正准圆简体"/>
               </a:rPr>
               <a:t>高唱 Glo-ri-a Glo-ri-a</a:t>
             </a:r>
@@ -13753,7 +13753,7 @@
             </a:pPr>
             <a:r>
               <a:rPr sz="4800" b="0">
-                <a:latin typeface="FZZhunYuan-M02S"/>
+                <a:latin typeface="方正准圆简体"/>
               </a:rPr>
               <a:t>高唱 Glo-ri-a Glo-ri-a</a:t>
             </a:r>
@@ -13795,7 +13795,7 @@
             </a:pPr>
             <a:r>
               <a:rPr sz="2400" b="0">
-                <a:latin typeface="FZKai-Z03S"/>
+                <a:latin typeface="方正楷体简体"/>
               </a:rPr>
               <a:t>荣耀颂2/8</a:t>
             </a:r>
@@ -13855,7 +13855,7 @@
             </a:pPr>
             <a:r>
               <a:rPr sz="4800" b="0">
-                <a:latin typeface="FZZhunYuan-M02S"/>
+                <a:latin typeface="方正准圆简体"/>
               </a:rPr>
               <a:t>但愿普天下的人</a:t>
             </a:r>
@@ -13874,7 +13874,7 @@
             </a:pPr>
             <a:r>
               <a:rPr sz="4800" b="0">
-                <a:latin typeface="FZZhunYuan-M02S"/>
+                <a:latin typeface="方正准圆简体"/>
               </a:rPr>
               <a:t>向至高神下跪</a:t>
             </a:r>
@@ -13893,7 +13893,7 @@
             </a:pPr>
             <a:r>
               <a:rPr sz="4800" b="0">
-                <a:latin typeface="FZZhunYuan-M02S"/>
+                <a:latin typeface="方正准圆简体"/>
               </a:rPr>
               <a:t>高唱 Glo-ri-a Glo-ri-a</a:t>
             </a:r>
@@ -13912,7 +13912,7 @@
             </a:pPr>
             <a:r>
               <a:rPr sz="4800" b="0">
-                <a:latin typeface="FZZhunYuan-M02S"/>
+                <a:latin typeface="方正准圆简体"/>
               </a:rPr>
               <a:t>高唱 Glo-ri-a Glo-ri-a</a:t>
             </a:r>
@@ -13931,7 +13931,7 @@
             </a:pPr>
             <a:r>
               <a:rPr sz="4800" b="0">
-                <a:latin typeface="FZZhunYuan-M02S"/>
+                <a:latin typeface="方正准圆简体"/>
               </a:rPr>
               <a:t>惟独基督是主 配得天上地下</a:t>
             </a:r>
@@ -13973,7 +13973,7 @@
             </a:pPr>
             <a:r>
               <a:rPr sz="2400" b="0">
-                <a:latin typeface="FZKai-Z03S"/>
+                <a:latin typeface="方正楷体简体"/>
               </a:rPr>
               <a:t>荣耀颂3/8</a:t>
             </a:r>
@@ -14033,7 +14033,7 @@
             </a:pPr>
             <a:r>
               <a:rPr sz="4800" b="0">
-                <a:latin typeface="FZZhunYuan-M02S"/>
+                <a:latin typeface="方正准圆简体"/>
               </a:rPr>
               <a:t>永永远远一切的荣耀与尊贵</a:t>
             </a:r>
@@ -14052,7 +14052,7 @@
             </a:pPr>
             <a:r>
               <a:rPr sz="4800" b="0">
-                <a:latin typeface="FZZhunYuan-M02S"/>
+                <a:latin typeface="方正准圆简体"/>
               </a:rPr>
               <a:t>高山夸耀神的伟大</a:t>
             </a:r>
@@ -14071,7 +14071,7 @@
             </a:pPr>
             <a:r>
               <a:rPr sz="4800" b="0">
-                <a:latin typeface="FZZhunYuan-M02S"/>
+                <a:latin typeface="方正准圆简体"/>
               </a:rPr>
               <a:t>洋海歌颂他的信实</a:t>
             </a:r>
@@ -14090,7 +14090,7 @@
             </a:pPr>
             <a:r>
               <a:rPr sz="4800" b="0">
-                <a:latin typeface="FZZhunYuan-M02S"/>
+                <a:latin typeface="方正准圆简体"/>
               </a:rPr>
               <a:t>赞美的呼声</a:t>
             </a:r>
@@ -14109,7 +14109,7 @@
             </a:pPr>
             <a:r>
               <a:rPr sz="4800" b="0">
-                <a:latin typeface="FZZhunYuan-M02S"/>
+                <a:latin typeface="方正准圆简体"/>
               </a:rPr>
               <a:t>如澎湃的大水</a:t>
             </a:r>
@@ -14151,7 +14151,7 @@
             </a:pPr>
             <a:r>
               <a:rPr sz="2400" b="0">
-                <a:latin typeface="FZKai-Z03S"/>
+                <a:latin typeface="方正楷体简体"/>
               </a:rPr>
               <a:t>荣耀颂4/8</a:t>
             </a:r>
@@ -14211,7 +14211,7 @@
             </a:pPr>
             <a:r>
               <a:rPr sz="4800" b="0">
-                <a:latin typeface="FZZhunYuan-M02S"/>
+                <a:latin typeface="方正准圆简体"/>
               </a:rPr>
               <a:t>花朵欣然向主开放</a:t>
             </a:r>
@@ -14230,7 +14230,7 @@
             </a:pPr>
             <a:r>
               <a:rPr sz="4800" b="0">
-                <a:latin typeface="FZZhunYuan-M02S"/>
+                <a:latin typeface="方正准圆简体"/>
               </a:rPr>
               <a:t>小鸟欢然飞在天上</a:t>
             </a:r>
@@ -14249,7 +14249,7 @@
             </a:pPr>
             <a:r>
               <a:rPr sz="4800" b="0">
-                <a:latin typeface="FZZhunYuan-M02S"/>
+                <a:latin typeface="方正准圆简体"/>
               </a:rPr>
               <a:t>宇宙的万有</a:t>
             </a:r>
@@ -14268,7 +14268,7 @@
             </a:pPr>
             <a:r>
               <a:rPr sz="4800" b="0">
-                <a:latin typeface="FZZhunYuan-M02S"/>
+                <a:latin typeface="方正准圆简体"/>
               </a:rPr>
               <a:t>必大声赞美</a:t>
             </a:r>
@@ -14287,7 +14287,7 @@
             </a:pPr>
             <a:r>
               <a:rPr sz="4800" b="0">
-                <a:latin typeface="FZZhunYuan-M02S"/>
+                <a:latin typeface="方正准圆简体"/>
               </a:rPr>
               <a:t>高唱 Glo-ri-a Glo-ri-a</a:t>
             </a:r>
@@ -14329,7 +14329,7 @@
             </a:pPr>
             <a:r>
               <a:rPr sz="2400" b="0">
-                <a:latin typeface="FZKai-Z03S"/>
+                <a:latin typeface="方正楷体简体"/>
               </a:rPr>
               <a:t>荣耀颂5/8</a:t>
             </a:r>
@@ -14381,7 +14381,7 @@
                 <a:spcPts val="5200"/>
               </a:lnSpc>
               <a:spcBef>
-                <a:spcPts val="24"/>
+                <a:spcPts val="1200"/>
               </a:spcBef>
               <a:spcAft>
                 <a:spcPts val="0"/>
@@ -14389,7 +14389,7 @@
             </a:pPr>
             <a:r>
               <a:rPr sz="4400" b="1">
-                <a:latin typeface="FZKai-Z03S"/>
+                <a:latin typeface="方正楷体简体"/>
               </a:rPr>
               <a:t>感谢主教会的少年人纷纷决志愿意委身持守基督，求主的灵大大感动和帮助他们人生的每一步。为教育事工继续祷告，求主使用我们的主日学老师和学生，让他们从小被　神的话语充满，被圣灵引导，一生走在当行的路上。</a:t>
             </a:r>
@@ -14431,7 +14431,7 @@
             </a:pPr>
             <a:r>
               <a:rPr sz="2400" b="1">
-                <a:latin typeface="FZKai-Z03S"/>
+                <a:latin typeface="方正楷体简体"/>
               </a:rPr>
               <a:t>代祷事项</a:t>
             </a:r>
@@ -14491,7 +14491,7 @@
             </a:pPr>
             <a:r>
               <a:rPr sz="4800" b="0">
-                <a:latin typeface="FZZhunYuan-M02S"/>
+                <a:latin typeface="方正准圆简体"/>
               </a:rPr>
               <a:t>高唱 Glo-ri-a Glo-ri-a</a:t>
             </a:r>
@@ -14510,7 +14510,7 @@
             </a:pPr>
             <a:r>
               <a:rPr sz="4800" b="0">
-                <a:latin typeface="FZZhunYuan-M02S"/>
+                <a:latin typeface="方正准圆简体"/>
               </a:rPr>
               <a:t>但愿普天下的人</a:t>
             </a:r>
@@ -14529,7 +14529,7 @@
             </a:pPr>
             <a:r>
               <a:rPr sz="4800" b="0">
-                <a:latin typeface="FZZhunYuan-M02S"/>
+                <a:latin typeface="方正准圆简体"/>
               </a:rPr>
               <a:t>向至高神下跪</a:t>
             </a:r>
@@ -14548,7 +14548,7 @@
             </a:pPr>
             <a:r>
               <a:rPr sz="4800" b="0">
-                <a:latin typeface="FZZhunYuan-M02S"/>
+                <a:latin typeface="方正准圆简体"/>
               </a:rPr>
               <a:t>高唱 Glo-ri-a Glo-ri-a</a:t>
             </a:r>
@@ -14567,7 +14567,7 @@
             </a:pPr>
             <a:r>
               <a:rPr sz="4800" b="0">
-                <a:latin typeface="FZZhunYuan-M02S"/>
+                <a:latin typeface="方正准圆简体"/>
               </a:rPr>
               <a:t>高唱 Glo-ri-a Glo-ri-a</a:t>
             </a:r>
@@ -14609,7 +14609,7 @@
             </a:pPr>
             <a:r>
               <a:rPr sz="2400" b="0">
-                <a:latin typeface="FZKai-Z03S"/>
+                <a:latin typeface="方正楷体简体"/>
               </a:rPr>
               <a:t>荣耀颂6/8</a:t>
             </a:r>
@@ -14669,7 +14669,7 @@
             </a:pPr>
             <a:r>
               <a:rPr sz="4800" b="0">
-                <a:latin typeface="FZZhunYuan-M02S"/>
+                <a:latin typeface="方正准圆简体"/>
               </a:rPr>
               <a:t>惟独基督是主 配得天上地下</a:t>
             </a:r>
@@ -14688,7 +14688,7 @@
             </a:pPr>
             <a:r>
               <a:rPr sz="4800" b="0">
-                <a:latin typeface="FZZhunYuan-M02S"/>
+                <a:latin typeface="方正准圆简体"/>
               </a:rPr>
               <a:t>永永远远一切的荣耀与尊贵</a:t>
             </a:r>
@@ -14707,7 +14707,7 @@
             </a:pPr>
             <a:r>
               <a:rPr sz="4800" b="0">
-                <a:latin typeface="FZZhunYuan-M02S"/>
+                <a:latin typeface="方正准圆简体"/>
               </a:rPr>
               <a:t>高唱 Glo-ri-a Glo-ri-a</a:t>
             </a:r>
@@ -14726,7 +14726,7 @@
             </a:pPr>
             <a:r>
               <a:rPr sz="4800" b="0">
-                <a:latin typeface="FZZhunYuan-M02S"/>
+                <a:latin typeface="方正准圆简体"/>
               </a:rPr>
               <a:t>高唱 Glo-ri-a Glo-ri-a</a:t>
             </a:r>
@@ -14745,7 +14745,7 @@
             </a:pPr>
             <a:r>
               <a:rPr sz="4800" b="0">
-                <a:latin typeface="FZZhunYuan-M02S"/>
+                <a:latin typeface="方正准圆简体"/>
               </a:rPr>
               <a:t>但愿普天下的人</a:t>
             </a:r>
@@ -14787,7 +14787,7 @@
             </a:pPr>
             <a:r>
               <a:rPr sz="2400" b="0">
-                <a:latin typeface="FZKai-Z03S"/>
+                <a:latin typeface="方正楷体简体"/>
               </a:rPr>
               <a:t>荣耀颂7/8</a:t>
             </a:r>
@@ -14847,7 +14847,7 @@
             </a:pPr>
             <a:r>
               <a:rPr sz="4800" b="0">
-                <a:latin typeface="FZZhunYuan-M02S"/>
+                <a:latin typeface="方正准圆简体"/>
               </a:rPr>
               <a:t>向至高神下跪</a:t>
             </a:r>
@@ -14866,7 +14866,7 @@
             </a:pPr>
             <a:r>
               <a:rPr sz="4800" b="0">
-                <a:latin typeface="FZZhunYuan-M02S"/>
+                <a:latin typeface="方正准圆简体"/>
               </a:rPr>
               <a:t>高唱 Glo-ri-a Glo-ri-a</a:t>
             </a:r>
@@ -14885,7 +14885,7 @@
             </a:pPr>
             <a:r>
               <a:rPr sz="4800" b="0">
-                <a:latin typeface="FZZhunYuan-M02S"/>
+                <a:latin typeface="方正准圆简体"/>
               </a:rPr>
               <a:t>高唱 Glo-ri-a Glo-ri-a</a:t>
             </a:r>
@@ -14904,7 +14904,7 @@
             </a:pPr>
             <a:r>
               <a:rPr sz="4800" b="0">
-                <a:latin typeface="FZZhunYuan-M02S"/>
+                <a:latin typeface="方正准圆简体"/>
               </a:rPr>
               <a:t>惟独基督是主 配得天上地下</a:t>
             </a:r>
@@ -14923,7 +14923,7 @@
             </a:pPr>
             <a:r>
               <a:rPr sz="4800" b="0">
-                <a:latin typeface="FZZhunYuan-M02S"/>
+                <a:latin typeface="方正准圆简体"/>
               </a:rPr>
               <a:t>永永远远一切的荣耀与尊贵</a:t>
             </a:r>
@@ -14965,7 +14965,7 @@
             </a:pPr>
             <a:r>
               <a:rPr sz="2400" b="0">
-                <a:latin typeface="FZKai-Z03S"/>
+                <a:latin typeface="方正楷体简体"/>
               </a:rPr>
               <a:t>荣耀颂8/8</a:t>
             </a:r>
@@ -15146,7 +15146,29 @@
                 <a:spcPts val="5200"/>
               </a:lnSpc>
               <a:spcBef>
-                <a:spcPts val="24"/>
+                <a:spcPts val="1200"/>
+              </a:spcBef>
+              <a:spcAft>
+                <a:spcPts val="0"/>
+              </a:spcAft>
+            </a:pPr>
+            <a:r>
+              <a:rPr sz="4400" b="1">
+                <a:solidFill>
+                  <a:srgbClr val="FFFFFF"/>
+                </a:solidFill>
+                <a:latin typeface="方正楷体简体"/>
+              </a:rPr>
+              <a:t>当趁耶和华可寻找的时候寻找他，相近的时候求告他。</a:t>
+            </a:r>
+          </a:p>
+          <a:p>
+            <a:pPr algn="l">
+              <a:lnSpc>
+                <a:spcPts val="5200"/>
+              </a:lnSpc>
+              <a:spcBef>
+                <a:spcPts val="1200"/>
               </a:spcBef>
               <a:spcAft>
                 <a:spcPts val="0"/>
@@ -15156,28 +15178,6 @@
               <a:rPr sz="4400" b="1">
                 <a:solidFill>
                   <a:srgbClr val="FFFF00"/>
-                </a:solidFill>
-                <a:latin typeface="方正楷体简体"/>
-              </a:rPr>
-              <a:t>当趁耶和华可寻找的时候寻找他，相近的时候求告他。</a:t>
-            </a:r>
-          </a:p>
-          <a:p>
-            <a:pPr algn="l">
-              <a:lnSpc>
-                <a:spcPts val="5200"/>
-              </a:lnSpc>
-              <a:spcBef>
-                <a:spcPts val="24"/>
-              </a:spcBef>
-              <a:spcAft>
-                <a:spcPts val="0"/>
-              </a:spcAft>
-            </a:pPr>
-            <a:r>
-              <a:rPr sz="4400" b="1">
-                <a:solidFill>
-                  <a:srgbClr val="FFFFFF"/>
                 </a:solidFill>
                 <a:latin typeface="方正楷体简体"/>
               </a:rPr>
@@ -15300,7 +15300,29 @@
                 <a:spcPts val="5200"/>
               </a:lnSpc>
               <a:spcBef>
-                <a:spcPts val="24"/>
+                <a:spcPts val="1200"/>
+              </a:spcBef>
+              <a:spcAft>
+                <a:spcPts val="0"/>
+              </a:spcAft>
+            </a:pPr>
+            <a:r>
+              <a:rPr sz="4400" b="1">
+                <a:solidFill>
+                  <a:srgbClr val="FFFFFF"/>
+                </a:solidFill>
+                <a:latin typeface="方正楷体简体"/>
+              </a:rPr>
+              <a:t>我向耶和华我的　神祈祷，认罪说，主啊，大而可畏的　神，向爱主守主诫命的人，守约施慈爱。</a:t>
+            </a:r>
+          </a:p>
+          <a:p>
+            <a:pPr algn="l">
+              <a:lnSpc>
+                <a:spcPts val="5200"/>
+              </a:lnSpc>
+              <a:spcBef>
+                <a:spcPts val="1200"/>
               </a:spcBef>
               <a:spcAft>
                 <a:spcPts val="0"/>
@@ -15310,28 +15332,6 @@
               <a:rPr sz="4400" b="1">
                 <a:solidFill>
                   <a:srgbClr val="FFFF00"/>
-                </a:solidFill>
-                <a:latin typeface="方正楷体简体"/>
-              </a:rPr>
-              <a:t>我向耶和华我的　神祈祷，认罪说，主啊，大而可畏的　神，向爱主守主诫命的人，守约施慈爱。</a:t>
-            </a:r>
-          </a:p>
-          <a:p>
-            <a:pPr algn="l">
-              <a:lnSpc>
-                <a:spcPts val="5200"/>
-              </a:lnSpc>
-              <a:spcBef>
-                <a:spcPts val="24"/>
-              </a:spcBef>
-              <a:spcAft>
-                <a:spcPts val="0"/>
-              </a:spcAft>
-            </a:pPr>
-            <a:r>
-              <a:rPr sz="4400" b="1">
-                <a:solidFill>
-                  <a:srgbClr val="FFFFFF"/>
                 </a:solidFill>
                 <a:latin typeface="方正楷体简体"/>
               </a:rPr>
@@ -15454,7 +15454,29 @@
                 <a:spcPts val="5200"/>
               </a:lnSpc>
               <a:spcBef>
-                <a:spcPts val="24"/>
+                <a:spcPts val="1200"/>
+              </a:spcBef>
+              <a:spcAft>
+                <a:spcPts val="0"/>
+              </a:spcAft>
+            </a:pPr>
+            <a:r>
+              <a:rPr sz="4400" b="1">
+                <a:solidFill>
+                  <a:srgbClr val="FFFFFF"/>
+                </a:solidFill>
+                <a:latin typeface="方正楷体简体"/>
+              </a:rPr>
+              <a:t>没有听从你仆人众先知，奉你名向我们君王，首领，列祖和国中一切百姓所说的话。</a:t>
+            </a:r>
+          </a:p>
+          <a:p>
+            <a:pPr algn="l">
+              <a:lnSpc>
+                <a:spcPts val="5200"/>
+              </a:lnSpc>
+              <a:spcBef>
+                <a:spcPts val="1200"/>
               </a:spcBef>
               <a:spcAft>
                 <a:spcPts val="0"/>
@@ -15464,28 +15486,6 @@
               <a:rPr sz="4400" b="1">
                 <a:solidFill>
                   <a:srgbClr val="FFFF00"/>
-                </a:solidFill>
-                <a:latin typeface="方正楷体简体"/>
-              </a:rPr>
-              <a:t>没有听从你仆人众先知，奉你名向我们君王，首领，列祖和国中一切百姓所说的话。</a:t>
-            </a:r>
-          </a:p>
-          <a:p>
-            <a:pPr algn="l">
-              <a:lnSpc>
-                <a:spcPts val="5200"/>
-              </a:lnSpc>
-              <a:spcBef>
-                <a:spcPts val="24"/>
-              </a:spcBef>
-              <a:spcAft>
-                <a:spcPts val="0"/>
-              </a:spcAft>
-            </a:pPr>
-            <a:r>
-              <a:rPr sz="4400" b="1">
-                <a:solidFill>
-                  <a:srgbClr val="FFFFFF"/>
                 </a:solidFill>
                 <a:latin typeface="方正楷体简体"/>
               </a:rPr>
@@ -15608,7 +15608,29 @@
                 <a:spcPts val="5200"/>
               </a:lnSpc>
               <a:spcBef>
-                <a:spcPts val="24"/>
+                <a:spcPts val="1200"/>
+              </a:spcBef>
+              <a:spcAft>
+                <a:spcPts val="0"/>
+              </a:spcAft>
+            </a:pPr>
+            <a:r>
+              <a:rPr sz="4400" b="1">
+                <a:solidFill>
+                  <a:srgbClr val="FFFFFF"/>
+                </a:solidFill>
+                <a:latin typeface="方正楷体简体"/>
+              </a:rPr>
+              <a:t>我们若说是与　神相交，却仍在黑暗里行，就是说谎话，不行真理了。</a:t>
+            </a:r>
+          </a:p>
+          <a:p>
+            <a:pPr algn="l">
+              <a:lnSpc>
+                <a:spcPts val="5200"/>
+              </a:lnSpc>
+              <a:spcBef>
+                <a:spcPts val="1200"/>
               </a:spcBef>
               <a:spcAft>
                 <a:spcPts val="0"/>
@@ -15618,28 +15640,6 @@
               <a:rPr sz="4400" b="1">
                 <a:solidFill>
                   <a:srgbClr val="FFFF00"/>
-                </a:solidFill>
-                <a:latin typeface="方正楷体简体"/>
-              </a:rPr>
-              <a:t>我们若说是与　神相交，却仍在黑暗里行，就是说谎话，不行真理了。</a:t>
-            </a:r>
-          </a:p>
-          <a:p>
-            <a:pPr algn="l">
-              <a:lnSpc>
-                <a:spcPts val="5200"/>
-              </a:lnSpc>
-              <a:spcBef>
-                <a:spcPts val="24"/>
-              </a:spcBef>
-              <a:spcAft>
-                <a:spcPts val="0"/>
-              </a:spcAft>
-            </a:pPr>
-            <a:r>
-              <a:rPr sz="4400" b="1">
-                <a:solidFill>
-                  <a:srgbClr val="FFFFFF"/>
                 </a:solidFill>
                 <a:latin typeface="方正楷体简体"/>
               </a:rPr>
@@ -15762,7 +15762,29 @@
                 <a:spcPts val="5200"/>
               </a:lnSpc>
               <a:spcBef>
-                <a:spcPts val="24"/>
+                <a:spcPts val="1200"/>
+              </a:spcBef>
+              <a:spcAft>
+                <a:spcPts val="0"/>
+              </a:spcAft>
+            </a:pPr>
+            <a:r>
+              <a:rPr sz="4400" b="1">
+                <a:solidFill>
+                  <a:srgbClr val="FFFFFF"/>
+                </a:solidFill>
+                <a:latin typeface="方正楷体简体"/>
+              </a:rPr>
+              <a:t>我们若说自己无罪，便是自欺，真理不在我们心里了。</a:t>
+            </a:r>
+          </a:p>
+          <a:p>
+            <a:pPr algn="l">
+              <a:lnSpc>
+                <a:spcPts val="5200"/>
+              </a:lnSpc>
+              <a:spcBef>
+                <a:spcPts val="1200"/>
               </a:spcBef>
               <a:spcAft>
                 <a:spcPts val="0"/>
@@ -15772,28 +15794,6 @@
               <a:rPr sz="4400" b="1">
                 <a:solidFill>
                   <a:srgbClr val="FFFF00"/>
-                </a:solidFill>
-                <a:latin typeface="方正楷体简体"/>
-              </a:rPr>
-              <a:t>我们若说自己无罪，便是自欺，真理不在我们心里了。</a:t>
-            </a:r>
-          </a:p>
-          <a:p>
-            <a:pPr algn="l">
-              <a:lnSpc>
-                <a:spcPts val="5200"/>
-              </a:lnSpc>
-              <a:spcBef>
-                <a:spcPts val="24"/>
-              </a:spcBef>
-              <a:spcAft>
-                <a:spcPts val="0"/>
-              </a:spcAft>
-            </a:pPr>
-            <a:r>
-              <a:rPr sz="4400" b="1">
-                <a:solidFill>
-                  <a:srgbClr val="FFFFFF"/>
                 </a:solidFill>
                 <a:latin typeface="方正楷体简体"/>
               </a:rPr>
@@ -15892,7 +15892,7 @@
                 <a:spcPts val="5200"/>
               </a:lnSpc>
               <a:spcBef>
-                <a:spcPts val="24"/>
+                <a:spcPts val="1200"/>
               </a:spcBef>
               <a:spcAft>
                 <a:spcPts val="0"/>
@@ -15900,7 +15900,7 @@
             </a:pPr>
             <a:r>
               <a:rPr sz="4400" b="1">
-                <a:latin typeface="FZKai-Z03S"/>
+                <a:latin typeface="方正楷体简体"/>
               </a:rPr>
               <a:t>请为后疫情时代的福音工作代祷，愿我们不单顾自己的事，更是看到别人的需要，看到身边还未信主的朋友的需要，而勇于开口。</a:t>
             </a:r>
@@ -15942,7 +15942,7 @@
             </a:pPr>
             <a:r>
               <a:rPr sz="2400" b="1">
-                <a:latin typeface="FZKai-Z03S"/>
+                <a:latin typeface="方正楷体简体"/>
               </a:rPr>
               <a:t>代祷事项</a:t>
             </a:r>
@@ -16018,7 +16018,29 @@
                 <a:spcPts val="5200"/>
               </a:lnSpc>
               <a:spcBef>
-                <a:spcPts val="24"/>
+                <a:spcPts val="1200"/>
+              </a:spcBef>
+              <a:spcAft>
+                <a:spcPts val="0"/>
+              </a:spcAft>
+            </a:pPr>
+            <a:r>
+              <a:rPr sz="4400" b="1">
+                <a:solidFill>
+                  <a:srgbClr val="FFFFFF"/>
+                </a:solidFill>
+                <a:latin typeface="方正楷体简体"/>
+              </a:rPr>
+              <a:t>我们若说自己没有犯过罪，便是以　神为说谎的，他的道也不在我们心里了。</a:t>
+            </a:r>
+          </a:p>
+          <a:p>
+            <a:pPr algn="l">
+              <a:lnSpc>
+                <a:spcPts val="5200"/>
+              </a:lnSpc>
+              <a:spcBef>
+                <a:spcPts val="1200"/>
               </a:spcBef>
               <a:spcAft>
                 <a:spcPts val="0"/>
@@ -16028,28 +16050,6 @@
               <a:rPr sz="4400" b="1">
                 <a:solidFill>
                   <a:srgbClr val="FFFF00"/>
-                </a:solidFill>
-                <a:latin typeface="方正楷体简体"/>
-              </a:rPr>
-              <a:t>我们若说自己没有犯过罪，便是以　神为说谎的，他的道也不在我们心里了。</a:t>
-            </a:r>
-          </a:p>
-          <a:p>
-            <a:pPr algn="l">
-              <a:lnSpc>
-                <a:spcPts val="5200"/>
-              </a:lnSpc>
-              <a:spcBef>
-                <a:spcPts val="24"/>
-              </a:spcBef>
-              <a:spcAft>
-                <a:spcPts val="0"/>
-              </a:spcAft>
-            </a:pPr>
-            <a:r>
-              <a:rPr sz="4400" b="1">
-                <a:solidFill>
-                  <a:srgbClr val="FFFFFF"/>
                 </a:solidFill>
                 <a:latin typeface="方正楷体简体"/>
               </a:rPr>
@@ -16172,7 +16172,29 @@
                 <a:spcPts val="5200"/>
               </a:lnSpc>
               <a:spcBef>
-                <a:spcPts val="24"/>
+                <a:spcPts val="1200"/>
+              </a:spcBef>
+              <a:spcAft>
+                <a:spcPts val="0"/>
+              </a:spcAft>
+            </a:pPr>
+            <a:r>
+              <a:rPr sz="4400" b="1">
+                <a:solidFill>
+                  <a:srgbClr val="FFFFFF"/>
+                </a:solidFill>
+                <a:latin typeface="方正楷体简体"/>
+              </a:rPr>
+              <a:t>若有人犯罪，在父那里我们有一位中保，就是那义者耶稣基督。</a:t>
+            </a:r>
+          </a:p>
+          <a:p>
+            <a:pPr algn="l">
+              <a:lnSpc>
+                <a:spcPts val="5200"/>
+              </a:lnSpc>
+              <a:spcBef>
+                <a:spcPts val="1200"/>
               </a:spcBef>
               <a:spcAft>
                 <a:spcPts val="0"/>
@@ -16182,28 +16204,6 @@
               <a:rPr sz="4400" b="1">
                 <a:solidFill>
                   <a:srgbClr val="FFFF00"/>
-                </a:solidFill>
-                <a:latin typeface="方正楷体简体"/>
-              </a:rPr>
-              <a:t>若有人犯罪，在父那里我们有一位中保，就是那义者耶稣基督。</a:t>
-            </a:r>
-          </a:p>
-          <a:p>
-            <a:pPr algn="l">
-              <a:lnSpc>
-                <a:spcPts val="5200"/>
-              </a:lnSpc>
-              <a:spcBef>
-                <a:spcPts val="24"/>
-              </a:spcBef>
-              <a:spcAft>
-                <a:spcPts val="0"/>
-              </a:spcAft>
-            </a:pPr>
-            <a:r>
-              <a:rPr sz="4400" b="1">
-                <a:solidFill>
-                  <a:srgbClr val="FFFFFF"/>
                 </a:solidFill>
                 <a:latin typeface="方正楷体简体"/>
               </a:rPr>
@@ -16326,7 +16326,29 @@
                 <a:spcPts val="5200"/>
               </a:lnSpc>
               <a:spcBef>
-                <a:spcPts val="24"/>
+                <a:spcPts val="1200"/>
+              </a:spcBef>
+              <a:spcAft>
+                <a:spcPts val="0"/>
+              </a:spcAft>
+            </a:pPr>
+            <a:r>
+              <a:rPr sz="4400" b="1">
+                <a:solidFill>
+                  <a:srgbClr val="FFFFFF"/>
+                </a:solidFill>
+                <a:latin typeface="方正楷体简体"/>
+              </a:rPr>
+              <a:t>我向你陈明我的罪，不隐瞒我的恶。</a:t>
+            </a:r>
+          </a:p>
+          <a:p>
+            <a:pPr algn="l">
+              <a:lnSpc>
+                <a:spcPts val="5200"/>
+              </a:lnSpc>
+              <a:spcBef>
+                <a:spcPts val="1200"/>
               </a:spcBef>
               <a:spcAft>
                 <a:spcPts val="0"/>
@@ -16336,28 +16358,6 @@
               <a:rPr sz="4400" b="1">
                 <a:solidFill>
                   <a:srgbClr val="FFFF00"/>
-                </a:solidFill>
-                <a:latin typeface="方正楷体简体"/>
-              </a:rPr>
-              <a:t>我向你陈明我的罪，不隐瞒我的恶。</a:t>
-            </a:r>
-          </a:p>
-          <a:p>
-            <a:pPr algn="l">
-              <a:lnSpc>
-                <a:spcPts val="5200"/>
-              </a:lnSpc>
-              <a:spcBef>
-                <a:spcPts val="24"/>
-              </a:spcBef>
-              <a:spcAft>
-                <a:spcPts val="0"/>
-              </a:spcAft>
-            </a:pPr>
-            <a:r>
-              <a:rPr sz="4400" b="1">
-                <a:solidFill>
-                  <a:srgbClr val="FFFFFF"/>
                 </a:solidFill>
                 <a:latin typeface="方正楷体简体"/>
               </a:rPr>
@@ -16693,7 +16693,7 @@
             </a:pPr>
             <a:r>
               <a:rPr sz="4000" b="1">
-                <a:latin typeface="FZKai-Z03S"/>
+                <a:latin typeface="方正楷体简体"/>
               </a:rPr>
               <a:t>读  经</a:t>
             </a:r>
@@ -16745,7 +16745,7 @@
                 <a:spcPts val="5200"/>
               </a:lnSpc>
               <a:spcBef>
-                <a:spcPts val="0"/>
+                <a:spcPts val="1200"/>
               </a:spcBef>
               <a:spcAft>
                 <a:spcPts val="0"/>
@@ -16770,7 +16770,7 @@
                 <a:spcPts val="5200"/>
               </a:lnSpc>
               <a:spcBef>
-                <a:spcPts val="0"/>
+                <a:spcPts val="1200"/>
               </a:spcBef>
               <a:spcAft>
                 <a:spcPts val="0"/>
@@ -16878,7 +16878,7 @@
                 <a:spcPts val="5200"/>
               </a:lnSpc>
               <a:spcBef>
-                <a:spcPts val="0"/>
+                <a:spcPts val="1200"/>
               </a:spcBef>
               <a:spcAft>
                 <a:spcPts val="0"/>
@@ -16903,7 +16903,7 @@
                 <a:spcPts val="5200"/>
               </a:lnSpc>
               <a:spcBef>
-                <a:spcPts val="0"/>
+                <a:spcPts val="1200"/>
               </a:spcBef>
               <a:spcAft>
                 <a:spcPts val="0"/>
@@ -17011,7 +17011,7 @@
                 <a:spcPts val="5200"/>
               </a:lnSpc>
               <a:spcBef>
-                <a:spcPts val="24"/>
+                <a:spcPts val="1200"/>
               </a:spcBef>
               <a:spcAft>
                 <a:spcPts val="0"/>
@@ -17019,7 +17019,7 @@
             </a:pPr>
             <a:r>
               <a:rPr sz="4400" b="1">
-                <a:latin typeface="FZKai-Z03S"/>
+                <a:latin typeface="方正楷体简体"/>
               </a:rPr>
               <a:t>请为吴雨洁传道在德国开展校园事工祷告，求主为她开路，在事奉中赐给她力量。也为意大利神学生刘易斯来我们教会为期七周的实习代祷，愿　神给他美好的经历和丰富的学习，与教会弟兄姊妹也建立有爱的联结。</a:t>
             </a:r>
@@ -17061,7 +17061,7 @@
             </a:pPr>
             <a:r>
               <a:rPr sz="2400" b="1">
-                <a:latin typeface="FZKai-Z03S"/>
+                <a:latin typeface="方正楷体简体"/>
               </a:rPr>
               <a:t>代祷事项</a:t>
             </a:r>
@@ -17113,7 +17113,7 @@
                 <a:spcPts val="5200"/>
               </a:lnSpc>
               <a:spcBef>
-                <a:spcPts val="0"/>
+                <a:spcPts val="1200"/>
               </a:spcBef>
               <a:spcAft>
                 <a:spcPts val="0"/>
@@ -17138,7 +17138,7 @@
                 <a:spcPts val="5200"/>
               </a:lnSpc>
               <a:spcBef>
-                <a:spcPts val="0"/>
+                <a:spcPts val="1200"/>
               </a:spcBef>
               <a:spcAft>
                 <a:spcPts val="0"/>
@@ -17246,7 +17246,7 @@
                 <a:spcPts val="5200"/>
               </a:lnSpc>
               <a:spcBef>
-                <a:spcPts val="0"/>
+                <a:spcPts val="1200"/>
               </a:spcBef>
               <a:spcAft>
                 <a:spcPts val="0"/>
@@ -17271,7 +17271,7 @@
                 <a:spcPts val="5200"/>
               </a:lnSpc>
               <a:spcBef>
-                <a:spcPts val="0"/>
+                <a:spcPts val="1200"/>
               </a:spcBef>
               <a:spcAft>
                 <a:spcPts val="0"/>
@@ -17379,7 +17379,7 @@
                 <a:spcPts val="5200"/>
               </a:lnSpc>
               <a:spcBef>
-                <a:spcPts val="0"/>
+                <a:spcPts val="1200"/>
               </a:spcBef>
               <a:spcAft>
                 <a:spcPts val="0"/>
@@ -17404,7 +17404,7 @@
                 <a:spcPts val="5200"/>
               </a:lnSpc>
               <a:spcBef>
-                <a:spcPts val="0"/>
+                <a:spcPts val="1200"/>
               </a:spcBef>
               <a:spcAft>
                 <a:spcPts val="0"/>
@@ -17562,7 +17562,7 @@
             </a:pPr>
             <a:r>
               <a:rPr sz="6600" b="1">
-                <a:latin typeface="FZKai-Z03S"/>
+                <a:latin typeface="方正楷体简体"/>
               </a:rPr>
               <a:t>善仆与恶仆</a:t>
             </a:r>
@@ -17604,7 +17604,7 @@
             </a:pPr>
             <a:r>
               <a:rPr sz="4000" b="0">
-                <a:latin typeface="FZKai-Z03S"/>
+                <a:latin typeface="方正楷体简体"/>
               </a:rPr>
               <a:t>吴振忠牧师证道</a:t>
             </a:r>
@@ -17623,7 +17623,7 @@
             </a:pPr>
             <a:r>
               <a:rPr sz="4000" b="0">
-                <a:latin typeface="FZKai-Z03S"/>
+                <a:latin typeface="方正楷体简体"/>
               </a:rPr>
               <a:t>路19:11-28</a:t>
             </a:r>
@@ -17675,7 +17675,7 @@
                 <a:spcPts val="5200"/>
               </a:lnSpc>
               <a:spcBef>
-                <a:spcPts val="0"/>
+                <a:spcPts val="1200"/>
               </a:spcBef>
               <a:spcAft>
                 <a:spcPts val="0"/>
@@ -17683,7 +17683,7 @@
             </a:pPr>
             <a:r>
               <a:rPr sz="4400" b="1">
-                <a:latin typeface="FZKai-Z03S"/>
+                <a:latin typeface="方正楷体简体"/>
               </a:rPr>
               <a:t>引言：</a:t>
             </a:r>
@@ -17694,7 +17694,7 @@
                 <a:spcPts val="5200"/>
               </a:lnSpc>
               <a:spcBef>
-                <a:spcPts val="0"/>
+                <a:spcPts val="1200"/>
               </a:spcBef>
               <a:spcAft>
                 <a:spcPts val="0"/>
@@ -17702,7 +17702,7 @@
             </a:pPr>
             <a:r>
               <a:rPr sz="4400" b="1">
-                <a:latin typeface="FZKai-Z03S"/>
+                <a:latin typeface="方正楷体简体"/>
               </a:rPr>
               <a:t>1.为什么我们觉得自己只是一个普通的信徒？ 没有什么可以为神作的呢？</a:t>
             </a:r>
@@ -17744,7 +17744,7 @@
             </a:pPr>
             <a:r>
               <a:rPr sz="2400" b="1">
-                <a:latin typeface="FZKai-Z03S"/>
+                <a:latin typeface="方正楷体简体"/>
               </a:rPr>
               <a:t>善仆与恶仆（路19:11-28）</a:t>
             </a:r>
@@ -17796,7 +17796,7 @@
                 <a:spcPts val="5200"/>
               </a:lnSpc>
               <a:spcBef>
-                <a:spcPts val="0"/>
+                <a:spcPts val="1200"/>
               </a:spcBef>
               <a:spcAft>
                 <a:spcPts val="0"/>
@@ -17804,7 +17804,7 @@
             </a:pPr>
             <a:r>
               <a:rPr sz="4400" b="1">
-                <a:latin typeface="FZKai-Z03S"/>
+                <a:latin typeface="方正楷体简体"/>
               </a:rPr>
               <a:t>引言：</a:t>
             </a:r>
@@ -17815,7 +17815,7 @@
                 <a:spcPts val="5200"/>
               </a:lnSpc>
               <a:spcBef>
-                <a:spcPts val="0"/>
+                <a:spcPts val="1200"/>
               </a:spcBef>
               <a:spcAft>
                 <a:spcPts val="0"/>
@@ -17823,7 +17823,7 @@
             </a:pPr>
             <a:r>
               <a:rPr sz="4400" b="1">
-                <a:latin typeface="FZKai-Z03S"/>
+                <a:latin typeface="方正楷体简体"/>
               </a:rPr>
               <a:t>1.为什么我们觉得自己只是一个普通的信徒？ 没有什么可以为神作的呢？</a:t>
             </a:r>
@@ -17834,7 +17834,7 @@
                 <a:spcPts val="5200"/>
               </a:lnSpc>
               <a:spcBef>
-                <a:spcPts val="0"/>
+                <a:spcPts val="1200"/>
               </a:spcBef>
               <a:spcAft>
                 <a:spcPts val="0"/>
@@ -17842,7 +17842,7 @@
             </a:pPr>
             <a:r>
               <a:rPr sz="4400" b="1">
-                <a:latin typeface="FZKai-Z03S"/>
+                <a:latin typeface="方正楷体简体"/>
               </a:rPr>
               <a:t>2.为什么我们有时埋怨神没有给我们什么恩赐，好像有些比不上别人？</a:t>
             </a:r>
@@ -17884,7 +17884,7 @@
             </a:pPr>
             <a:r>
               <a:rPr sz="2400" b="1">
-                <a:latin typeface="FZKai-Z03S"/>
+                <a:latin typeface="方正楷体简体"/>
               </a:rPr>
               <a:t>善仆与恶仆（路19:11-28）</a:t>
             </a:r>
@@ -17936,7 +17936,7 @@
                 <a:spcPts val="5200"/>
               </a:lnSpc>
               <a:spcBef>
-                <a:spcPts val="0"/>
+                <a:spcPts val="1200"/>
               </a:spcBef>
               <a:spcAft>
                 <a:spcPts val="0"/>
@@ -17944,7 +17944,7 @@
             </a:pPr>
             <a:r>
               <a:rPr sz="4400" b="1">
-                <a:latin typeface="FZKai-Z03S"/>
+                <a:latin typeface="方正楷体简体"/>
               </a:rPr>
               <a:t>引言：</a:t>
             </a:r>
@@ -17955,7 +17955,7 @@
                 <a:spcPts val="5200"/>
               </a:lnSpc>
               <a:spcBef>
-                <a:spcPts val="0"/>
+                <a:spcPts val="1200"/>
               </a:spcBef>
               <a:spcAft>
                 <a:spcPts val="0"/>
@@ -17963,7 +17963,7 @@
             </a:pPr>
             <a:r>
               <a:rPr sz="4400" b="1">
-                <a:latin typeface="FZKai-Z03S"/>
+                <a:latin typeface="方正楷体简体"/>
               </a:rPr>
               <a:t>3.为什么有些信徒不愿意神作自己的主人，反倒过来希望神作我们的仆人？</a:t>
             </a:r>
@@ -18005,7 +18005,7 @@
             </a:pPr>
             <a:r>
               <a:rPr sz="2400" b="1">
-                <a:latin typeface="FZKai-Z03S"/>
+                <a:latin typeface="方正楷体简体"/>
               </a:rPr>
               <a:t>善仆与恶仆（路19:11-28）</a:t>
             </a:r>
@@ -18057,7 +18057,7 @@
                 <a:spcPts val="5200"/>
               </a:lnSpc>
               <a:spcBef>
-                <a:spcPts val="0"/>
+                <a:spcPts val="1200"/>
               </a:spcBef>
               <a:spcAft>
                 <a:spcPts val="0"/>
@@ -18065,7 +18065,7 @@
             </a:pPr>
             <a:r>
               <a:rPr sz="4400" b="1">
-                <a:latin typeface="FZKai-Z03S"/>
+                <a:latin typeface="方正楷体简体"/>
               </a:rPr>
               <a:t>引言：</a:t>
             </a:r>
@@ -18076,7 +18076,7 @@
                 <a:spcPts val="5200"/>
               </a:lnSpc>
               <a:spcBef>
-                <a:spcPts val="0"/>
+                <a:spcPts val="1200"/>
               </a:spcBef>
               <a:spcAft>
                 <a:spcPts val="0"/>
@@ -18084,7 +18084,7 @@
             </a:pPr>
             <a:r>
               <a:rPr sz="4400" b="1">
-                <a:latin typeface="FZKai-Z03S"/>
+                <a:latin typeface="方正楷体简体"/>
               </a:rPr>
               <a:t>3.为什么有些信徒不愿意神作自己的主人，反倒过来希望神作我们的仆人？</a:t>
             </a:r>
@@ -18095,7 +18095,7 @@
                 <a:spcPts val="5200"/>
               </a:lnSpc>
               <a:spcBef>
-                <a:spcPts val="0"/>
+                <a:spcPts val="1200"/>
               </a:spcBef>
               <a:spcAft>
                 <a:spcPts val="0"/>
@@ -18103,7 +18103,7 @@
             </a:pPr>
             <a:r>
               <a:rPr sz="4400" b="1">
-                <a:latin typeface="FZKai-Z03S"/>
+                <a:latin typeface="方正楷体简体"/>
               </a:rPr>
               <a:t>4.为什么神要我们为他作工呢？ 神自己没有能力吗？</a:t>
             </a:r>
@@ -18145,7 +18145,7 @@
             </a:pPr>
             <a:r>
               <a:rPr sz="2400" b="1">
-                <a:latin typeface="FZKai-Z03S"/>
+                <a:latin typeface="方正楷体简体"/>
               </a:rPr>
               <a:t>善仆与恶仆（路19:11-28）</a:t>
             </a:r>
@@ -18197,7 +18197,7 @@
                 <a:spcPts val="5200"/>
               </a:lnSpc>
               <a:spcBef>
-                <a:spcPts val="0"/>
+                <a:spcPts val="1200"/>
               </a:spcBef>
               <a:spcAft>
                 <a:spcPts val="0"/>
@@ -18205,7 +18205,7 @@
             </a:pPr>
             <a:r>
               <a:rPr sz="4400" b="1">
-                <a:latin typeface="FZKai-Z03S"/>
+                <a:latin typeface="方正楷体简体"/>
               </a:rPr>
               <a:t>引言：</a:t>
             </a:r>
@@ -18216,7 +18216,7 @@
                 <a:spcPts val="5200"/>
               </a:lnSpc>
               <a:spcBef>
-                <a:spcPts val="0"/>
+                <a:spcPts val="1200"/>
               </a:spcBef>
               <a:spcAft>
                 <a:spcPts val="0"/>
@@ -18224,7 +18224,7 @@
             </a:pPr>
             <a:r>
               <a:rPr sz="4400" b="1">
-                <a:latin typeface="FZKai-Z03S"/>
+                <a:latin typeface="方正楷体简体"/>
               </a:rPr>
               <a:t>3.为什么有些信徒不愿意神作自己的主人，反倒过来希望神作我们的仆人？</a:t>
             </a:r>
@@ -18235,7 +18235,7 @@
                 <a:spcPts val="5200"/>
               </a:lnSpc>
               <a:spcBef>
-                <a:spcPts val="0"/>
+                <a:spcPts val="1200"/>
               </a:spcBef>
               <a:spcAft>
                 <a:spcPts val="0"/>
@@ -18243,7 +18243,7 @@
             </a:pPr>
             <a:r>
               <a:rPr sz="4400" b="1">
-                <a:latin typeface="FZKai-Z03S"/>
+                <a:latin typeface="方正楷体简体"/>
               </a:rPr>
               <a:t>4.为什么神要我们为他作工呢？ 神自己没有能力吗？</a:t>
             </a:r>
@@ -18254,7 +18254,7 @@
                 <a:spcPts val="5200"/>
               </a:lnSpc>
               <a:spcBef>
-                <a:spcPts val="0"/>
+                <a:spcPts val="1200"/>
               </a:spcBef>
               <a:spcAft>
                 <a:spcPts val="0"/>
@@ -18262,7 +18262,7 @@
             </a:pPr>
             <a:r>
               <a:rPr sz="4400" b="1">
-                <a:latin typeface="FZKai-Z03S"/>
+                <a:latin typeface="方正楷体简体"/>
               </a:rPr>
               <a:t>5.为什么面对神托付的使命时，我们总是可以找出很多借口去推搪的呢？</a:t>
             </a:r>
@@ -18304,7 +18304,7 @@
             </a:pPr>
             <a:r>
               <a:rPr sz="2400" b="1">
-                <a:latin typeface="FZKai-Z03S"/>
+                <a:latin typeface="方正楷体简体"/>
               </a:rPr>
               <a:t>善仆与恶仆（路19:11-28）</a:t>
             </a:r>
@@ -18356,7 +18356,7 @@
                 <a:spcPts val="5200"/>
               </a:lnSpc>
               <a:spcBef>
-                <a:spcPts val="24"/>
+                <a:spcPts val="1200"/>
               </a:spcBef>
               <a:spcAft>
                 <a:spcPts val="0"/>
@@ -18364,7 +18364,7 @@
             </a:pPr>
             <a:r>
               <a:rPr sz="4400" b="1">
-                <a:latin typeface="FZKai-Z03S"/>
+                <a:latin typeface="方正楷体简体"/>
               </a:rPr>
               <a:t>求　神赐福保守教会牧者们身体健康、力量充沛、出入平安。</a:t>
             </a:r>
@@ -18406,7 +18406,7 @@
             </a:pPr>
             <a:r>
               <a:rPr sz="2400" b="1">
-                <a:latin typeface="FZKai-Z03S"/>
+                <a:latin typeface="方正楷体简体"/>
               </a:rPr>
               <a:t>代祷事项</a:t>
             </a:r>
@@ -18458,7 +18458,7 @@
                 <a:spcPts val="5200"/>
               </a:lnSpc>
               <a:spcBef>
-                <a:spcPts val="0"/>
+                <a:spcPts val="1200"/>
               </a:spcBef>
               <a:spcAft>
                 <a:spcPts val="0"/>
@@ -18466,7 +18466,7 @@
             </a:pPr>
             <a:r>
               <a:rPr sz="4400" b="1">
-                <a:latin typeface="FZKai-Z03S"/>
+                <a:latin typeface="方正楷体简体"/>
               </a:rPr>
               <a:t>经文的理解与应用：</a:t>
             </a:r>
@@ -18477,7 +18477,7 @@
                 <a:spcPts val="5200"/>
               </a:lnSpc>
               <a:spcBef>
-                <a:spcPts val="0"/>
+                <a:spcPts val="1200"/>
               </a:spcBef>
               <a:spcAft>
                 <a:spcPts val="0"/>
@@ -18485,7 +18485,7 @@
             </a:pPr>
             <a:r>
               <a:rPr sz="4400" b="1">
-                <a:latin typeface="FZKai-Z03S"/>
+                <a:latin typeface="方正楷体简体"/>
               </a:rPr>
               <a:t>1.耶稣已经呼召了一个愿意真诚悔改，有行动回应的撒该，并且说了：「人子来，为要寻找，拯救失丧的人」的道理。</a:t>
             </a:r>
@@ -18527,7 +18527,7 @@
             </a:pPr>
             <a:r>
               <a:rPr sz="2400" b="1">
-                <a:latin typeface="FZKai-Z03S"/>
+                <a:latin typeface="方正楷体简体"/>
               </a:rPr>
               <a:t>善仆与恶仆（路19:11-28）</a:t>
             </a:r>
@@ -18579,7 +18579,7 @@
                 <a:spcPts val="5200"/>
               </a:lnSpc>
               <a:spcBef>
-                <a:spcPts val="0"/>
+                <a:spcPts val="1200"/>
               </a:spcBef>
               <a:spcAft>
                 <a:spcPts val="0"/>
@@ -18587,7 +18587,7 @@
             </a:pPr>
             <a:r>
               <a:rPr sz="4400" b="1">
-                <a:latin typeface="FZKai-Z03S"/>
+                <a:latin typeface="方正楷体简体"/>
               </a:rPr>
               <a:t>经文的理解与应用：</a:t>
             </a:r>
@@ -18598,7 +18598,7 @@
                 <a:spcPts val="5200"/>
               </a:lnSpc>
               <a:spcBef>
-                <a:spcPts val="0"/>
+                <a:spcPts val="1200"/>
               </a:spcBef>
               <a:spcAft>
                 <a:spcPts val="0"/>
@@ -18606,7 +18606,7 @@
             </a:pPr>
             <a:r>
               <a:rPr sz="4400" b="1">
-                <a:latin typeface="FZKai-Z03S"/>
+                <a:latin typeface="方正楷体简体"/>
               </a:rPr>
               <a:t>1.耶稣已经呼召了一个愿意真诚悔改，有行动回应的撒该，并且说了：「人子来，为要寻找，拯救失丧的人」的道理。</a:t>
             </a:r>
@@ -18617,7 +18617,7 @@
                 <a:spcPts val="5200"/>
               </a:lnSpc>
               <a:spcBef>
-                <a:spcPts val="0"/>
+                <a:spcPts val="1200"/>
               </a:spcBef>
               <a:spcAft>
                 <a:spcPts val="0"/>
@@ -18625,7 +18625,7 @@
             </a:pPr>
             <a:r>
               <a:rPr sz="4400" b="1">
-                <a:latin typeface="FZKai-Z03S"/>
+                <a:latin typeface="方正楷体简体"/>
               </a:rPr>
               <a:t>2.众人既然以为神的国快要显出来，耶稣就说出了这个善仆与恶仆的比喻。</a:t>
             </a:r>
@@ -18667,7 +18667,7 @@
             </a:pPr>
             <a:r>
               <a:rPr sz="2400" b="1">
-                <a:latin typeface="FZKai-Z03S"/>
+                <a:latin typeface="方正楷体简体"/>
               </a:rPr>
               <a:t>善仆与恶仆（路19:11-28）</a:t>
             </a:r>
@@ -18719,7 +18719,7 @@
                 <a:spcPts val="5200"/>
               </a:lnSpc>
               <a:spcBef>
-                <a:spcPts val="0"/>
+                <a:spcPts val="1200"/>
               </a:spcBef>
               <a:spcAft>
                 <a:spcPts val="0"/>
@@ -18727,7 +18727,7 @@
             </a:pPr>
             <a:r>
               <a:rPr sz="4400" b="1">
-                <a:latin typeface="FZKai-Z03S"/>
+                <a:latin typeface="方正楷体简体"/>
               </a:rPr>
               <a:t>经文的理解与应用：</a:t>
             </a:r>
@@ -18738,7 +18738,7 @@
                 <a:spcPts val="5200"/>
               </a:lnSpc>
               <a:spcBef>
-                <a:spcPts val="0"/>
+                <a:spcPts val="1200"/>
               </a:spcBef>
               <a:spcAft>
                 <a:spcPts val="0"/>
@@ -18746,7 +18746,7 @@
             </a:pPr>
             <a:r>
               <a:rPr sz="4400" b="1">
-                <a:latin typeface="FZKai-Z03S"/>
+                <a:latin typeface="方正楷体简体"/>
               </a:rPr>
               <a:t>3.一个身份、一様恩赐、一项使命</a:t>
             </a:r>
@@ -18788,7 +18788,7 @@
             </a:pPr>
             <a:r>
               <a:rPr sz="2400" b="1">
-                <a:latin typeface="FZKai-Z03S"/>
+                <a:latin typeface="方正楷体简体"/>
               </a:rPr>
               <a:t>善仆与恶仆（路19:11-28）</a:t>
             </a:r>
@@ -18840,7 +18840,7 @@
                 <a:spcPts val="5200"/>
               </a:lnSpc>
               <a:spcBef>
-                <a:spcPts val="0"/>
+                <a:spcPts val="1200"/>
               </a:spcBef>
               <a:spcAft>
                 <a:spcPts val="0"/>
@@ -18848,7 +18848,7 @@
             </a:pPr>
             <a:r>
               <a:rPr sz="4400" b="1">
-                <a:latin typeface="FZKai-Z03S"/>
+                <a:latin typeface="方正楷体简体"/>
               </a:rPr>
               <a:t>经文的理解与应用：</a:t>
             </a:r>
@@ -18859,7 +18859,7 @@
                 <a:spcPts val="5200"/>
               </a:lnSpc>
               <a:spcBef>
-                <a:spcPts val="0"/>
+                <a:spcPts val="1200"/>
               </a:spcBef>
               <a:spcAft>
                 <a:spcPts val="0"/>
@@ -18867,7 +18867,7 @@
             </a:pPr>
             <a:r>
               <a:rPr sz="4400" b="1">
-                <a:latin typeface="FZKai-Z03S"/>
+                <a:latin typeface="方正楷体简体"/>
               </a:rPr>
               <a:t>3.一个身份、一様恩赐、一项使命</a:t>
             </a:r>
@@ -18878,7 +18878,7 @@
                 <a:spcPts val="5200"/>
               </a:lnSpc>
               <a:spcBef>
-                <a:spcPts val="0"/>
+                <a:spcPts val="1200"/>
               </a:spcBef>
               <a:spcAft>
                 <a:spcPts val="0"/>
@@ -18886,7 +18886,7 @@
             </a:pPr>
             <a:r>
               <a:rPr sz="4400" b="1">
-                <a:latin typeface="FZKai-Z03S"/>
+                <a:latin typeface="方正楷体简体"/>
               </a:rPr>
               <a:t>4.我们只是为主做好一件小事，他却给了我们大的权柄</a:t>
             </a:r>
@@ -18928,7 +18928,7 @@
             </a:pPr>
             <a:r>
               <a:rPr sz="2400" b="1">
-                <a:latin typeface="FZKai-Z03S"/>
+                <a:latin typeface="方正楷体简体"/>
               </a:rPr>
               <a:t>善仆与恶仆（路19:11-28）</a:t>
             </a:r>
@@ -18980,7 +18980,7 @@
                 <a:spcPts val="5200"/>
               </a:lnSpc>
               <a:spcBef>
-                <a:spcPts val="0"/>
+                <a:spcPts val="1200"/>
               </a:spcBef>
               <a:spcAft>
                 <a:spcPts val="0"/>
@@ -18988,7 +18988,7 @@
             </a:pPr>
             <a:r>
               <a:rPr sz="4400" b="1">
-                <a:latin typeface="FZKai-Z03S"/>
+                <a:latin typeface="方正楷体简体"/>
               </a:rPr>
               <a:t>经文的理解与应用：</a:t>
             </a:r>
@@ -18999,7 +18999,7 @@
                 <a:spcPts val="5200"/>
               </a:lnSpc>
               <a:spcBef>
-                <a:spcPts val="0"/>
+                <a:spcPts val="1200"/>
               </a:spcBef>
               <a:spcAft>
                 <a:spcPts val="0"/>
@@ -19007,7 +19007,7 @@
             </a:pPr>
             <a:r>
               <a:rPr sz="4400" b="1">
-                <a:latin typeface="FZKai-Z03S"/>
+                <a:latin typeface="方正楷体简体"/>
               </a:rPr>
               <a:t>3.一个身份、一様恩赐、一项使命</a:t>
             </a:r>
@@ -19018,7 +19018,7 @@
                 <a:spcPts val="5200"/>
               </a:lnSpc>
               <a:spcBef>
-                <a:spcPts val="0"/>
+                <a:spcPts val="1200"/>
               </a:spcBef>
               <a:spcAft>
                 <a:spcPts val="0"/>
@@ -19026,7 +19026,7 @@
             </a:pPr>
             <a:r>
               <a:rPr sz="4400" b="1">
-                <a:latin typeface="FZKai-Z03S"/>
+                <a:latin typeface="方正楷体简体"/>
               </a:rPr>
               <a:t>4.我们只是为主做好一件小事，他却给了我们大的权柄</a:t>
             </a:r>
@@ -19037,7 +19037,7 @@
                 <a:spcPts val="5200"/>
               </a:lnSpc>
               <a:spcBef>
-                <a:spcPts val="0"/>
+                <a:spcPts val="1200"/>
               </a:spcBef>
               <a:spcAft>
                 <a:spcPts val="0"/>
@@ -19045,7 +19045,7 @@
             </a:pPr>
             <a:r>
               <a:rPr sz="4400" b="1">
-                <a:latin typeface="FZKai-Z03S"/>
+                <a:latin typeface="方正楷体简体"/>
               </a:rPr>
               <a:t>5.拦阻主的工作的人仍有很多，我们不要作恶仆，更不要作主的仇敌</a:t>
             </a:r>
@@ -19087,7 +19087,7 @@
             </a:pPr>
             <a:r>
               <a:rPr sz="2400" b="1">
-                <a:latin typeface="FZKai-Z03S"/>
+                <a:latin typeface="方正楷体简体"/>
               </a:rPr>
               <a:t>善仆与恶仆（路19:11-28）</a:t>
             </a:r>
@@ -19139,7 +19139,7 @@
                 <a:spcPts val="5200"/>
               </a:lnSpc>
               <a:spcBef>
-                <a:spcPts val="0"/>
+                <a:spcPts val="1200"/>
               </a:spcBef>
               <a:spcAft>
                 <a:spcPts val="0"/>
@@ -19147,7 +19147,7 @@
             </a:pPr>
             <a:r>
               <a:rPr sz="4400" b="1">
-                <a:latin typeface="FZKai-Z03S"/>
+                <a:latin typeface="方正楷体简体"/>
               </a:rPr>
               <a:t>经文的理解与应用：</a:t>
             </a:r>
@@ -19158,7 +19158,7 @@
                 <a:spcPts val="5200"/>
               </a:lnSpc>
               <a:spcBef>
-                <a:spcPts val="0"/>
+                <a:spcPts val="1200"/>
               </a:spcBef>
               <a:spcAft>
                 <a:spcPts val="0"/>
@@ -19166,7 +19166,7 @@
             </a:pPr>
             <a:r>
               <a:rPr sz="4400" b="1">
-                <a:latin typeface="FZKai-Z03S"/>
+                <a:latin typeface="方正楷体简体"/>
               </a:rPr>
               <a:t>6.不要以借口推辞神的使命和托付</a:t>
             </a:r>
@@ -19208,7 +19208,7 @@
             </a:pPr>
             <a:r>
               <a:rPr sz="2400" b="1">
-                <a:latin typeface="FZKai-Z03S"/>
+                <a:latin typeface="方正楷体简体"/>
               </a:rPr>
               <a:t>善仆与恶仆（路19:11-28）</a:t>
             </a:r>
@@ -19260,7 +19260,7 @@
                 <a:spcPts val="5200"/>
               </a:lnSpc>
               <a:spcBef>
-                <a:spcPts val="0"/>
+                <a:spcPts val="1200"/>
               </a:spcBef>
               <a:spcAft>
                 <a:spcPts val="0"/>
@@ -19268,7 +19268,7 @@
             </a:pPr>
             <a:r>
               <a:rPr sz="4400" b="1">
-                <a:latin typeface="FZKai-Z03S"/>
+                <a:latin typeface="方正楷体简体"/>
               </a:rPr>
               <a:t>经文的理解与应用：</a:t>
             </a:r>
@@ -19279,7 +19279,7 @@
                 <a:spcPts val="5200"/>
               </a:lnSpc>
               <a:spcBef>
-                <a:spcPts val="0"/>
+                <a:spcPts val="1200"/>
               </a:spcBef>
               <a:spcAft>
                 <a:spcPts val="0"/>
@@ -19287,7 +19287,7 @@
             </a:pPr>
             <a:r>
               <a:rPr sz="4400" b="1">
-                <a:latin typeface="FZKai-Z03S"/>
+                <a:latin typeface="方正楷体简体"/>
               </a:rPr>
               <a:t>6.不要以借口推辞神的使命和托付</a:t>
             </a:r>
@@ -19298,7 +19298,7 @@
                 <a:spcPts val="5200"/>
               </a:lnSpc>
               <a:spcBef>
-                <a:spcPts val="0"/>
+                <a:spcPts val="1200"/>
               </a:spcBef>
               <a:spcAft>
                 <a:spcPts val="0"/>
@@ -19306,7 +19306,7 @@
             </a:pPr>
             <a:r>
               <a:rPr sz="4400" b="1">
-                <a:latin typeface="FZKai-Z03S"/>
+                <a:latin typeface="方正楷体简体"/>
               </a:rPr>
               <a:t>7.不要以恶意去揣测神的美意</a:t>
             </a:r>
@@ -19348,7 +19348,7 @@
             </a:pPr>
             <a:r>
               <a:rPr sz="2400" b="1">
-                <a:latin typeface="FZKai-Z03S"/>
+                <a:latin typeface="方正楷体简体"/>
               </a:rPr>
               <a:t>善仆与恶仆（路19:11-28）</a:t>
             </a:r>
@@ -19400,7 +19400,7 @@
                 <a:spcPts val="5200"/>
               </a:lnSpc>
               <a:spcBef>
-                <a:spcPts val="0"/>
+                <a:spcPts val="1200"/>
               </a:spcBef>
               <a:spcAft>
                 <a:spcPts val="0"/>
@@ -19408,7 +19408,7 @@
             </a:pPr>
             <a:r>
               <a:rPr sz="4400" b="1">
-                <a:latin typeface="FZKai-Z03S"/>
+                <a:latin typeface="方正楷体简体"/>
               </a:rPr>
               <a:t>经文的理解与应用：</a:t>
             </a:r>
@@ -19419,7 +19419,7 @@
                 <a:spcPts val="5200"/>
               </a:lnSpc>
               <a:spcBef>
-                <a:spcPts val="0"/>
+                <a:spcPts val="1200"/>
               </a:spcBef>
               <a:spcAft>
                 <a:spcPts val="0"/>
@@ -19427,7 +19427,7 @@
             </a:pPr>
             <a:r>
               <a:rPr sz="4400" b="1">
-                <a:latin typeface="FZKai-Z03S"/>
+                <a:latin typeface="方正楷体简体"/>
               </a:rPr>
               <a:t>6.不要以借口推辞神的使命和托付</a:t>
             </a:r>
@@ -19438,7 +19438,7 @@
                 <a:spcPts val="5200"/>
               </a:lnSpc>
               <a:spcBef>
-                <a:spcPts val="0"/>
+                <a:spcPts val="1200"/>
               </a:spcBef>
               <a:spcAft>
                 <a:spcPts val="0"/>
@@ -19446,7 +19446,7 @@
             </a:pPr>
             <a:r>
               <a:rPr sz="4400" b="1">
-                <a:latin typeface="FZKai-Z03S"/>
+                <a:latin typeface="方正楷体简体"/>
               </a:rPr>
               <a:t>7.不要以恶意去揣测神的美意</a:t>
             </a:r>
@@ -19457,7 +19457,7 @@
                 <a:spcPts val="5200"/>
               </a:lnSpc>
               <a:spcBef>
-                <a:spcPts val="0"/>
+                <a:spcPts val="1200"/>
               </a:spcBef>
               <a:spcAft>
                 <a:spcPts val="0"/>
@@ -19465,7 +19465,7 @@
             </a:pPr>
             <a:r>
               <a:rPr sz="4400" b="1">
-                <a:latin typeface="FZKai-Z03S"/>
+                <a:latin typeface="方正楷体简体"/>
               </a:rPr>
               <a:t>8.主人对仆人有合理的期望</a:t>
             </a:r>
@@ -19507,7 +19507,7 @@
             </a:pPr>
             <a:r>
               <a:rPr sz="2400" b="1">
-                <a:latin typeface="FZKai-Z03S"/>
+                <a:latin typeface="方正楷体简体"/>
               </a:rPr>
               <a:t>善仆与恶仆（路19:11-28）</a:t>
             </a:r>
@@ -19559,7 +19559,7 @@
                 <a:spcPts val="5200"/>
               </a:lnSpc>
               <a:spcBef>
-                <a:spcPts val="0"/>
+                <a:spcPts val="1200"/>
               </a:spcBef>
               <a:spcAft>
                 <a:spcPts val="0"/>
@@ -19567,7 +19567,7 @@
             </a:pPr>
             <a:r>
               <a:rPr sz="4400" b="1">
-                <a:latin typeface="FZKai-Z03S"/>
+                <a:latin typeface="方正楷体简体"/>
               </a:rPr>
               <a:t>经文的理解与应用：</a:t>
             </a:r>
@@ -19578,7 +19578,7 @@
                 <a:spcPts val="5200"/>
               </a:lnSpc>
               <a:spcBef>
-                <a:spcPts val="0"/>
+                <a:spcPts val="1200"/>
               </a:spcBef>
               <a:spcAft>
                 <a:spcPts val="0"/>
@@ -19586,7 +19586,7 @@
             </a:pPr>
             <a:r>
               <a:rPr sz="4400" b="1">
-                <a:latin typeface="FZKai-Z03S"/>
+                <a:latin typeface="方正楷体简体"/>
               </a:rPr>
               <a:t>6.不要以借口推辞神的使命和托付</a:t>
             </a:r>
@@ -19597,7 +19597,7 @@
                 <a:spcPts val="5200"/>
               </a:lnSpc>
               <a:spcBef>
-                <a:spcPts val="0"/>
+                <a:spcPts val="1200"/>
               </a:spcBef>
               <a:spcAft>
                 <a:spcPts val="0"/>
@@ -19605,7 +19605,7 @@
             </a:pPr>
             <a:r>
               <a:rPr sz="4400" b="1">
-                <a:latin typeface="FZKai-Z03S"/>
+                <a:latin typeface="方正楷体简体"/>
               </a:rPr>
               <a:t>7.不要以恶意去揣测神的美意</a:t>
             </a:r>
@@ -19616,7 +19616,7 @@
                 <a:spcPts val="5200"/>
               </a:lnSpc>
               <a:spcBef>
-                <a:spcPts val="0"/>
+                <a:spcPts val="1200"/>
               </a:spcBef>
               <a:spcAft>
                 <a:spcPts val="0"/>
@@ -19624,7 +19624,7 @@
             </a:pPr>
             <a:r>
               <a:rPr sz="4400" b="1">
-                <a:latin typeface="FZKai-Z03S"/>
+                <a:latin typeface="方正楷体简体"/>
               </a:rPr>
               <a:t>8.主人对仆人有合理的期望</a:t>
             </a:r>
@@ -19635,7 +19635,7 @@
                 <a:spcPts val="5200"/>
               </a:lnSpc>
               <a:spcBef>
-                <a:spcPts val="0"/>
+                <a:spcPts val="1200"/>
               </a:spcBef>
               <a:spcAft>
                 <a:spcPts val="0"/>
@@ -19643,7 +19643,7 @@
             </a:pPr>
             <a:r>
               <a:rPr sz="4400" b="1">
-                <a:latin typeface="FZKai-Z03S"/>
+                <a:latin typeface="方正楷体简体"/>
               </a:rPr>
               <a:t>9.主人欣赏善仆的忠心和努力，他按仆人的心志与回应给予任务与权柄</a:t>
             </a:r>
@@ -19685,7 +19685,7 @@
             </a:pPr>
             <a:r>
               <a:rPr sz="2400" b="1">
-                <a:latin typeface="FZKai-Z03S"/>
+                <a:latin typeface="方正楷体简体"/>
               </a:rPr>
               <a:t>善仆与恶仆（路19:11-28）</a:t>
             </a:r>
@@ -19737,7 +19737,7 @@
                 <a:spcPts val="5200"/>
               </a:lnSpc>
               <a:spcBef>
-                <a:spcPts val="0"/>
+                <a:spcPts val="1200"/>
               </a:spcBef>
               <a:spcAft>
                 <a:spcPts val="0"/>
@@ -19745,7 +19745,7 @@
             </a:pPr>
             <a:r>
               <a:rPr sz="4400" b="1">
-                <a:latin typeface="FZKai-Z03S"/>
+                <a:latin typeface="方正楷体简体"/>
               </a:rPr>
               <a:t>经文的理解与应用：</a:t>
             </a:r>
@@ -19756,7 +19756,7 @@
                 <a:spcPts val="5200"/>
               </a:lnSpc>
               <a:spcBef>
-                <a:spcPts val="0"/>
+                <a:spcPts val="1200"/>
               </a:spcBef>
               <a:spcAft>
                 <a:spcPts val="0"/>
@@ -19764,7 +19764,7 @@
             </a:pPr>
             <a:r>
               <a:rPr sz="4400" b="1">
-                <a:latin typeface="FZKai-Z03S"/>
+                <a:latin typeface="方正楷体简体"/>
               </a:rPr>
               <a:t>10.我们对主使命的心志与回应是我们成长的指标，是不进则退的，没有可能停留不动。</a:t>
             </a:r>
@@ -19806,7 +19806,7 @@
             </a:pPr>
             <a:r>
               <a:rPr sz="2400" b="1">
-                <a:latin typeface="FZKai-Z03S"/>
+                <a:latin typeface="方正楷体简体"/>
               </a:rPr>
               <a:t>善仆与恶仆（路19:11-28）</a:t>
             </a:r>

</xml_diff>

<commit_message>
fix: set language ID also for each run text
</commit_message>
<xml_diff>
--- a/2023-09-03.pptx
+++ b/2023-09-03.pptx
@@ -3335,7 +3335,7 @@
               </a:defRPr>
             </a:pPr>
             <a:r>
-              <a:rPr sz="4400" b="1">
+              <a:rPr lang="zh-CN" sz="4400" b="1">
                 <a:latin typeface="FZKai-Z03"/>
               </a:rPr>
               <a:t>乌尔姆华人团契 (Ulm)</a:t>
@@ -3357,7 +3357,7 @@
               </a:defRPr>
             </a:pPr>
             <a:r>
-              <a:rPr sz="4400" b="1">
+              <a:rPr lang="zh-CN" sz="4400" b="1">
                 <a:latin typeface="FZKai-Z03"/>
               </a:rPr>
               <a:t>全年平均聚会人数：20 人</a:t>
@@ -3379,7 +3379,7 @@
               </a:defRPr>
             </a:pPr>
             <a:r>
-              <a:rPr sz="4400" b="1">
+              <a:rPr lang="zh-CN" sz="4400" b="1">
                 <a:latin typeface="FZKai-Z03"/>
               </a:rPr>
               <a:t>1. 为乌尔姆团契传福音的事工祷告，求　神带领更多寻求他的人能够认识真理，重生得救；</a:t>
@@ -3424,7 +3424,7 @@
               </a:defRPr>
             </a:pPr>
             <a:r>
-              <a:rPr sz="2400" b="1">
+              <a:rPr lang="zh-CN" sz="2400" b="1">
                 <a:latin typeface="FZKai-Z03"/>
               </a:rPr>
               <a:t>代祷事项</a:t>
@@ -3487,7 +3487,7 @@
               </a:defRPr>
             </a:pPr>
             <a:r>
-              <a:rPr sz="4400" b="1">
+              <a:rPr lang="zh-CN" sz="4400" b="1">
                 <a:latin typeface="FZKai-Z03"/>
               </a:rPr>
               <a:t>引言：</a:t>
@@ -3509,7 +3509,7 @@
               </a:defRPr>
             </a:pPr>
             <a:r>
-              <a:rPr sz="4400" b="1">
+              <a:rPr lang="zh-CN" sz="4400" b="1">
                 <a:latin typeface="FZKai-Z03"/>
               </a:rPr>
               <a:t>5. 彼此就是要一起做，以实际互动表达出来的行为</a:t>
@@ -3554,7 +3554,7 @@
               </a:defRPr>
             </a:pPr>
             <a:r>
-              <a:rPr sz="2400" b="1">
+              <a:rPr lang="zh-CN" sz="2400" b="1">
                 <a:latin typeface="FZKai-Z03"/>
               </a:rPr>
               <a:t>我们要彼此相爱（约翰一书第 3 章）</a:t>
@@ -3617,7 +3617,7 @@
               </a:defRPr>
             </a:pPr>
             <a:r>
-              <a:rPr sz="4400" b="1">
+              <a:rPr lang="zh-CN" sz="4400" b="1">
                 <a:latin typeface="FZKai-Z03"/>
               </a:rPr>
               <a:t>引言：</a:t>
@@ -3639,7 +3639,7 @@
               </a:defRPr>
             </a:pPr>
             <a:r>
-              <a:rPr sz="4400" b="1">
+              <a:rPr lang="zh-CN" sz="4400" b="1">
                 <a:latin typeface="FZKai-Z03"/>
               </a:rPr>
               <a:t>5. 彼此就是要一起做，以实际互动表达出来的行为</a:t>
@@ -3661,7 +3661,7 @@
               </a:defRPr>
             </a:pPr>
             <a:r>
-              <a:rPr sz="4400" b="1">
+              <a:rPr lang="zh-CN" sz="4400" b="1">
                 <a:latin typeface="FZKai-Z03"/>
               </a:rPr>
               <a:t>6. 爱的真谛是真实相爱的内容</a:t>
@@ -3706,7 +3706,7 @@
               </a:defRPr>
             </a:pPr>
             <a:r>
-              <a:rPr sz="2400" b="1">
+              <a:rPr lang="zh-CN" sz="2400" b="1">
                 <a:latin typeface="FZKai-Z03"/>
               </a:rPr>
               <a:t>我们要彼此相爱（约翰一书第 3 章）</a:t>
@@ -3769,7 +3769,7 @@
               </a:defRPr>
             </a:pPr>
             <a:r>
-              <a:rPr sz="4400" b="1">
+              <a:rPr lang="zh-CN" sz="4400" b="1">
                 <a:latin typeface="FZKai-Z03"/>
               </a:rPr>
               <a:t>引言：</a:t>
@@ -3791,7 +3791,7 @@
               </a:defRPr>
             </a:pPr>
             <a:r>
-              <a:rPr sz="4400" b="1">
+              <a:rPr lang="zh-CN" sz="4400" b="1">
                 <a:latin typeface="FZKai-Z03"/>
               </a:rPr>
               <a:t>5. 彼此就是要一起做，以实际互动表达出来的行为</a:t>
@@ -3813,7 +3813,7 @@
               </a:defRPr>
             </a:pPr>
             <a:r>
-              <a:rPr sz="4400" b="1">
+              <a:rPr lang="zh-CN" sz="4400" b="1">
                 <a:latin typeface="FZKai-Z03"/>
               </a:rPr>
               <a:t>6. 爱的真谛是真实相爱的内容</a:t>
@@ -3835,7 +3835,7 @@
               </a:defRPr>
             </a:pPr>
             <a:r>
-              <a:rPr sz="4400" b="1">
+              <a:rPr lang="zh-CN" sz="4400" b="1">
                 <a:latin typeface="FZKai-Z03"/>
               </a:rPr>
               <a:t>7. 改变我们的心，活出具彼此相爱行为的生命</a:t>
@@ -3880,7 +3880,7 @@
               </a:defRPr>
             </a:pPr>
             <a:r>
-              <a:rPr sz="2400" b="1">
+              <a:rPr lang="zh-CN" sz="2400" b="1">
                 <a:latin typeface="FZKai-Z03"/>
               </a:rPr>
               <a:t>我们要彼此相爱（约翰一书第 3 章）</a:t>
@@ -3943,7 +3943,7 @@
               </a:defRPr>
             </a:pPr>
             <a:r>
-              <a:rPr sz="4400" b="1">
+              <a:rPr lang="zh-CN" sz="4400" b="1">
                 <a:latin typeface="FZKai-Z03"/>
               </a:rPr>
               <a:t>经文的理解与应用：</a:t>
@@ -3965,7 +3965,7 @@
               </a:defRPr>
             </a:pPr>
             <a:r>
-              <a:rPr sz="4400" b="1">
+              <a:rPr lang="zh-CN" sz="4400" b="1">
                 <a:latin typeface="FZKai-Z03"/>
               </a:rPr>
               <a:t>1. 我们已经是神的儿女是大前提（3:1）</a:t>
@@ -4010,7 +4010,7 @@
               </a:defRPr>
             </a:pPr>
             <a:r>
-              <a:rPr sz="2400" b="1">
+              <a:rPr lang="zh-CN" sz="2400" b="1">
                 <a:latin typeface="FZKai-Z03"/>
               </a:rPr>
               <a:t>我们要彼此相爱（约翰一书第 3 章）</a:t>
@@ -4073,7 +4073,7 @@
               </a:defRPr>
             </a:pPr>
             <a:r>
-              <a:rPr sz="4400" b="1">
+              <a:rPr lang="zh-CN" sz="4400" b="1">
                 <a:latin typeface="FZKai-Z03"/>
               </a:rPr>
               <a:t>经文的理解与应用：</a:t>
@@ -4095,7 +4095,7 @@
               </a:defRPr>
             </a:pPr>
             <a:r>
-              <a:rPr sz="4400" b="1">
+              <a:rPr lang="zh-CN" sz="4400" b="1">
                 <a:latin typeface="FZKai-Z03"/>
               </a:rPr>
               <a:t>1. 我们已经是神的儿女是大前提（3:1）</a:t>
@@ -4117,7 +4117,7 @@
               </a:defRPr>
             </a:pPr>
             <a:r>
-              <a:rPr sz="4400" b="1">
+              <a:rPr lang="zh-CN" sz="4400" b="1">
                 <a:latin typeface="FZKai-Z03"/>
               </a:rPr>
               <a:t>2. 我们要除灭魔鬼的作为（3:8）</a:t>
@@ -4162,7 +4162,7 @@
               </a:defRPr>
             </a:pPr>
             <a:r>
-              <a:rPr sz="2400" b="1">
+              <a:rPr lang="zh-CN" sz="2400" b="1">
                 <a:latin typeface="FZKai-Z03"/>
               </a:rPr>
               <a:t>我们要彼此相爱（约翰一书第 3 章）</a:t>
@@ -4225,7 +4225,7 @@
               </a:defRPr>
             </a:pPr>
             <a:r>
-              <a:rPr sz="4400" b="1">
+              <a:rPr lang="zh-CN" sz="4400" b="1">
                 <a:latin typeface="FZKai-Z03"/>
               </a:rPr>
               <a:t>经文的理解与应用：</a:t>
@@ -4247,7 +4247,7 @@
               </a:defRPr>
             </a:pPr>
             <a:r>
-              <a:rPr sz="4400" b="1">
+              <a:rPr lang="zh-CN" sz="4400" b="1">
                 <a:latin typeface="FZKai-Z03"/>
               </a:rPr>
               <a:t>1. 我们已经是神的儿女是大前提（3:1）</a:t>
@@ -4269,7 +4269,7 @@
               </a:defRPr>
             </a:pPr>
             <a:r>
-              <a:rPr sz="4400" b="1">
+              <a:rPr lang="zh-CN" sz="4400" b="1">
                 <a:latin typeface="FZKai-Z03"/>
               </a:rPr>
               <a:t>2. 我们要除灭魔鬼的作为（3:8）</a:t>
@@ -4291,7 +4291,7 @@
               </a:defRPr>
             </a:pPr>
             <a:r>
-              <a:rPr sz="4400" b="1">
+              <a:rPr lang="zh-CN" sz="4400" b="1">
                 <a:latin typeface="FZKai-Z03"/>
               </a:rPr>
               <a:t>3. 要显出谁是神的儿女（3:10）</a:t>
@@ -4336,7 +4336,7 @@
               </a:defRPr>
             </a:pPr>
             <a:r>
-              <a:rPr sz="2400" b="1">
+              <a:rPr lang="zh-CN" sz="2400" b="1">
                 <a:latin typeface="FZKai-Z03"/>
               </a:rPr>
               <a:t>我们要彼此相爱（约翰一书第 3 章）</a:t>
@@ -4399,7 +4399,7 @@
               </a:defRPr>
             </a:pPr>
             <a:r>
-              <a:rPr sz="4400" b="1">
+              <a:rPr lang="zh-CN" sz="4400" b="1">
                 <a:latin typeface="FZKai-Z03"/>
               </a:rPr>
               <a:t>经文的理解与应用：</a:t>
@@ -4421,7 +4421,7 @@
               </a:defRPr>
             </a:pPr>
             <a:r>
-              <a:rPr sz="4400" b="1">
+              <a:rPr lang="zh-CN" sz="4400" b="1">
                 <a:latin typeface="FZKai-Z03"/>
               </a:rPr>
               <a:t>1. 我们已经是神的儿女是大前提（3:1）</a:t>
@@ -4443,7 +4443,7 @@
               </a:defRPr>
             </a:pPr>
             <a:r>
-              <a:rPr sz="4400" b="1">
+              <a:rPr lang="zh-CN" sz="4400" b="1">
                 <a:latin typeface="FZKai-Z03"/>
               </a:rPr>
               <a:t>2. 我们要除灭魔鬼的作为（3:8）</a:t>
@@ -4465,7 +4465,7 @@
               </a:defRPr>
             </a:pPr>
             <a:r>
-              <a:rPr sz="4400" b="1">
+              <a:rPr lang="zh-CN" sz="4400" b="1">
                 <a:latin typeface="FZKai-Z03"/>
               </a:rPr>
               <a:t>3. 要显出谁是神的儿女（3:10）</a:t>
@@ -4487,7 +4487,7 @@
               </a:defRPr>
             </a:pPr>
             <a:r>
-              <a:rPr sz="4400" b="1">
+              <a:rPr lang="zh-CN" sz="4400" b="1">
                 <a:latin typeface="FZKai-Z03"/>
               </a:rPr>
               <a:t>4. 不要恨（杀）弟兄，当爱弟兄为他舍命</a:t>
@@ -4532,7 +4532,7 @@
               </a:defRPr>
             </a:pPr>
             <a:r>
-              <a:rPr sz="2400" b="1">
+              <a:rPr lang="zh-CN" sz="2400" b="1">
                 <a:latin typeface="FZKai-Z03"/>
               </a:rPr>
               <a:t>我们要彼此相爱（约翰一书第 3 章）</a:t>
@@ -4595,7 +4595,7 @@
               </a:defRPr>
             </a:pPr>
             <a:r>
-              <a:rPr sz="4400" b="1">
+              <a:rPr lang="zh-CN" sz="4400" b="1">
                 <a:latin typeface="FZKai-Z03"/>
               </a:rPr>
               <a:t>经文的理解与应用：</a:t>
@@ -4617,7 +4617,7 @@
               </a:defRPr>
             </a:pPr>
             <a:r>
-              <a:rPr sz="4400" b="1">
+              <a:rPr lang="zh-CN" sz="4400" b="1">
                 <a:latin typeface="FZKai-Z03"/>
               </a:rPr>
               <a:t>5. 在世财物上，怜恤穷乏的弟兄</a:t>
@@ -4662,7 +4662,7 @@
               </a:defRPr>
             </a:pPr>
             <a:r>
-              <a:rPr sz="2400" b="1">
+              <a:rPr lang="zh-CN" sz="2400" b="1">
                 <a:latin typeface="FZKai-Z03"/>
               </a:rPr>
               <a:t>我们要彼此相爱（约翰一书第 3 章）</a:t>
@@ -4725,7 +4725,7 @@
               </a:defRPr>
             </a:pPr>
             <a:r>
-              <a:rPr sz="4400" b="1">
+              <a:rPr lang="zh-CN" sz="4400" b="1">
                 <a:latin typeface="FZKai-Z03"/>
               </a:rPr>
               <a:t>经文的理解与应用：</a:t>
@@ -4747,7 +4747,7 @@
               </a:defRPr>
             </a:pPr>
             <a:r>
-              <a:rPr sz="4400" b="1">
+              <a:rPr lang="zh-CN" sz="4400" b="1">
                 <a:latin typeface="FZKai-Z03"/>
               </a:rPr>
               <a:t>5. 在世财物上，怜恤穷乏的弟兄</a:t>
@@ -4769,7 +4769,7 @@
               </a:defRPr>
             </a:pPr>
             <a:r>
-              <a:rPr sz="4400" b="1">
+              <a:rPr lang="zh-CN" sz="4400" b="1">
                 <a:latin typeface="FZKai-Z03"/>
               </a:rPr>
               <a:t>6. 我们相爱要在行为和诚实上</a:t>
@@ -4814,7 +4814,7 @@
               </a:defRPr>
             </a:pPr>
             <a:r>
-              <a:rPr sz="2400" b="1">
+              <a:rPr lang="zh-CN" sz="2400" b="1">
                 <a:latin typeface="FZKai-Z03"/>
               </a:rPr>
               <a:t>我们要彼此相爱（约翰一书第 3 章）</a:t>
@@ -4877,7 +4877,7 @@
               </a:defRPr>
             </a:pPr>
             <a:r>
-              <a:rPr sz="4400" b="1">
+              <a:rPr lang="zh-CN" sz="4400" b="1">
                 <a:latin typeface="FZKai-Z03"/>
               </a:rPr>
               <a:t>经文的理解与应用：</a:t>
@@ -4899,7 +4899,7 @@
               </a:defRPr>
             </a:pPr>
             <a:r>
-              <a:rPr sz="4400" b="1">
+              <a:rPr lang="zh-CN" sz="4400" b="1">
                 <a:latin typeface="FZKai-Z03"/>
               </a:rPr>
               <a:t>5. 在世财物上，怜恤穷乏的弟兄</a:t>
@@ -4921,7 +4921,7 @@
               </a:defRPr>
             </a:pPr>
             <a:r>
-              <a:rPr sz="4400" b="1">
+              <a:rPr lang="zh-CN" sz="4400" b="1">
                 <a:latin typeface="FZKai-Z03"/>
               </a:rPr>
               <a:t>6. 我们相爱要在行为和诚实上</a:t>
@@ -4943,7 +4943,7 @@
               </a:defRPr>
             </a:pPr>
             <a:r>
-              <a:rPr sz="4400" b="1">
+              <a:rPr lang="zh-CN" sz="4400" b="1">
                 <a:latin typeface="FZKai-Z03"/>
               </a:rPr>
               <a:t>7. 我们的心可以安稳，不受内心的责备，圣灵告诉我们，神就住在我们里面</a:t>
@@ -4988,7 +4988,7 @@
               </a:defRPr>
             </a:pPr>
             <a:r>
-              <a:rPr sz="2400" b="1">
+              <a:rPr lang="zh-CN" sz="2400" b="1">
                 <a:latin typeface="FZKai-Z03"/>
               </a:rPr>
               <a:t>我们要彼此相爱（约翰一书第 3 章）</a:t>
@@ -5051,7 +5051,7 @@
               </a:defRPr>
             </a:pPr>
             <a:r>
-              <a:rPr sz="4400" b="1">
+              <a:rPr lang="zh-CN" sz="4400" b="1">
                 <a:latin typeface="FZKai-Z03"/>
               </a:rPr>
               <a:t>2. 为乌尔姆团契的慕道友和初信的弟兄姐妹祷告，求神赐给他们更大的信心，让他们在团契中不断的学习　神的话语；</a:t>
@@ -5096,7 +5096,7 @@
               </a:defRPr>
             </a:pPr>
             <a:r>
-              <a:rPr sz="2400" b="1">
+              <a:rPr lang="zh-CN" sz="2400" b="1">
                 <a:latin typeface="FZKai-Z03"/>
               </a:rPr>
               <a:t>代祷事项</a:t>
@@ -5159,7 +5159,7 @@
               </a:defRPr>
             </a:pPr>
             <a:r>
-              <a:rPr sz="4400" b="1" i="1">
+              <a:rPr lang="zh-CN" sz="4400" b="1" i="1">
                 <a:latin typeface="FZKai-Z03"/>
               </a:rPr>
               <a:t>总结：</a:t>
@@ -5181,7 +5181,7 @@
               </a:defRPr>
             </a:pPr>
             <a:r>
-              <a:rPr sz="4400" b="1" i="1">
+              <a:rPr lang="zh-CN" sz="4400" b="1" i="1">
                 <a:latin typeface="FZKai-Z03"/>
               </a:rPr>
               <a:t>以行动作彼此相爱的总结：</a:t>
@@ -5226,7 +5226,7 @@
               </a:defRPr>
             </a:pPr>
             <a:r>
-              <a:rPr sz="2400" b="1">
+              <a:rPr lang="zh-CN" sz="2400" b="1">
                 <a:latin typeface="FZKai-Z03"/>
               </a:rPr>
               <a:t>我们要彼此相爱（约翰一书第 3 章）</a:t>
@@ -5289,7 +5289,7 @@
               </a:defRPr>
             </a:pPr>
             <a:r>
-              <a:rPr sz="4400" b="1" i="1">
+              <a:rPr lang="zh-CN" sz="4400" b="1" i="1">
                 <a:latin typeface="FZKai-Z03"/>
               </a:rPr>
               <a:t>总结：</a:t>
@@ -5311,7 +5311,7 @@
               </a:defRPr>
             </a:pPr>
             <a:r>
-              <a:rPr sz="4400" b="1" i="1">
+              <a:rPr lang="zh-CN" sz="4400" b="1" i="1">
                 <a:latin typeface="FZKai-Z03"/>
               </a:rPr>
               <a:t>以行动作彼此相爱的总结：</a:t>
@@ -5333,7 +5333,7 @@
               </a:defRPr>
             </a:pPr>
             <a:r>
-              <a:rPr sz="4400" b="1" i="1">
+              <a:rPr lang="zh-CN" sz="4400" b="1" i="1">
                 <a:latin typeface="FZKai-Z03"/>
               </a:rPr>
               <a:t>要珍惜</a:t>
@@ -5378,7 +5378,7 @@
               </a:defRPr>
             </a:pPr>
             <a:r>
-              <a:rPr sz="2400" b="1">
+              <a:rPr lang="zh-CN" sz="2400" b="1">
                 <a:latin typeface="FZKai-Z03"/>
               </a:rPr>
               <a:t>我们要彼此相爱（约翰一书第 3 章）</a:t>
@@ -5441,7 +5441,7 @@
               </a:defRPr>
             </a:pPr>
             <a:r>
-              <a:rPr sz="4400" b="1" i="1">
+              <a:rPr lang="zh-CN" sz="4400" b="1" i="1">
                 <a:latin typeface="FZKai-Z03"/>
               </a:rPr>
               <a:t>总结：</a:t>
@@ -5463,7 +5463,7 @@
               </a:defRPr>
             </a:pPr>
             <a:r>
-              <a:rPr sz="4400" b="1" i="1">
+              <a:rPr lang="zh-CN" sz="4400" b="1" i="1">
                 <a:latin typeface="FZKai-Z03"/>
               </a:rPr>
               <a:t>以行动作彼此相爱的总结：</a:t>
@@ -5485,7 +5485,7 @@
               </a:defRPr>
             </a:pPr>
             <a:r>
-              <a:rPr sz="4400" b="1" i="1">
+              <a:rPr lang="zh-CN" sz="4400" b="1" i="1">
                 <a:latin typeface="FZKai-Z03"/>
               </a:rPr>
               <a:t>要珍惜</a:t>
@@ -5507,7 +5507,7 @@
               </a:defRPr>
             </a:pPr>
             <a:r>
-              <a:rPr sz="4400" b="1" i="1">
+              <a:rPr lang="zh-CN" sz="4400" b="1" i="1">
                 <a:latin typeface="FZKai-Z03"/>
               </a:rPr>
               <a:t>要牺牲</a:t>
@@ -5552,7 +5552,7 @@
               </a:defRPr>
             </a:pPr>
             <a:r>
-              <a:rPr sz="2400" b="1">
+              <a:rPr lang="zh-CN" sz="2400" b="1">
                 <a:latin typeface="FZKai-Z03"/>
               </a:rPr>
               <a:t>我们要彼此相爱（约翰一书第 3 章）</a:t>
@@ -5615,7 +5615,7 @@
               </a:defRPr>
             </a:pPr>
             <a:r>
-              <a:rPr sz="4400" b="1" i="1">
+              <a:rPr lang="zh-CN" sz="4400" b="1" i="1">
                 <a:latin typeface="FZKai-Z03"/>
               </a:rPr>
               <a:t>总结：</a:t>
@@ -5637,7 +5637,7 @@
               </a:defRPr>
             </a:pPr>
             <a:r>
-              <a:rPr sz="4400" b="1" i="1">
+              <a:rPr lang="zh-CN" sz="4400" b="1" i="1">
                 <a:latin typeface="FZKai-Z03"/>
               </a:rPr>
               <a:t>以行动作彼此相爱的总结：</a:t>
@@ -5659,7 +5659,7 @@
               </a:defRPr>
             </a:pPr>
             <a:r>
-              <a:rPr sz="4400" b="1" i="1">
+              <a:rPr lang="zh-CN" sz="4400" b="1" i="1">
                 <a:latin typeface="FZKai-Z03"/>
               </a:rPr>
               <a:t>要珍惜</a:t>
@@ -5681,7 +5681,7 @@
               </a:defRPr>
             </a:pPr>
             <a:r>
-              <a:rPr sz="4400" b="1" i="1">
+              <a:rPr lang="zh-CN" sz="4400" b="1" i="1">
                 <a:latin typeface="FZKai-Z03"/>
               </a:rPr>
               <a:t>要牺牲</a:t>
@@ -5703,7 +5703,7 @@
               </a:defRPr>
             </a:pPr>
             <a:r>
-              <a:rPr sz="4400" b="1" i="1">
+              <a:rPr lang="zh-CN" sz="4400" b="1" i="1">
                 <a:latin typeface="FZKai-Z03"/>
               </a:rPr>
               <a:t>要宽容</a:t>
@@ -5748,7 +5748,7 @@
               </a:defRPr>
             </a:pPr>
             <a:r>
-              <a:rPr sz="2400" b="1">
+              <a:rPr lang="zh-CN" sz="2400" b="1">
                 <a:latin typeface="FZKai-Z03"/>
               </a:rPr>
               <a:t>我们要彼此相爱（约翰一书第 3 章）</a:t>
@@ -5811,7 +5811,7 @@
               </a:defRPr>
             </a:pPr>
             <a:r>
-              <a:rPr sz="4400" b="1" i="1">
+              <a:rPr lang="zh-CN" sz="4400" b="1" i="1">
                 <a:latin typeface="FZKai-Z03"/>
               </a:rPr>
               <a:t>总结：</a:t>
@@ -5833,7 +5833,7 @@
               </a:defRPr>
             </a:pPr>
             <a:r>
-              <a:rPr sz="4400" b="1" i="1">
+              <a:rPr lang="zh-CN" sz="4400" b="1" i="1">
                 <a:latin typeface="FZKai-Z03"/>
               </a:rPr>
               <a:t>以行动作彼此相爱的总结：</a:t>
@@ -5855,7 +5855,7 @@
               </a:defRPr>
             </a:pPr>
             <a:r>
-              <a:rPr sz="4400" b="1" i="1">
+              <a:rPr lang="zh-CN" sz="4400" b="1" i="1">
                 <a:latin typeface="FZKai-Z03"/>
               </a:rPr>
               <a:t>要珍惜</a:t>
@@ -5877,7 +5877,7 @@
               </a:defRPr>
             </a:pPr>
             <a:r>
-              <a:rPr sz="4400" b="1" i="1">
+              <a:rPr lang="zh-CN" sz="4400" b="1" i="1">
                 <a:latin typeface="FZKai-Z03"/>
               </a:rPr>
               <a:t>要牺牲</a:t>
@@ -5899,7 +5899,7 @@
               </a:defRPr>
             </a:pPr>
             <a:r>
-              <a:rPr sz="4400" b="1" i="1">
+              <a:rPr lang="zh-CN" sz="4400" b="1" i="1">
                 <a:latin typeface="FZKai-Z03"/>
               </a:rPr>
               <a:t>要宽容</a:t>
@@ -5921,7 +5921,7 @@
               </a:defRPr>
             </a:pPr>
             <a:r>
-              <a:rPr sz="4400" b="1" i="1">
+              <a:rPr lang="zh-CN" sz="4400" b="1" i="1">
                 <a:latin typeface="FZKai-Z03"/>
               </a:rPr>
               <a:t>要忍耐</a:t>
@@ -5966,7 +5966,7 @@
               </a:defRPr>
             </a:pPr>
             <a:r>
-              <a:rPr sz="2400" b="1">
+              <a:rPr lang="zh-CN" sz="2400" b="1">
                 <a:latin typeface="FZKai-Z03"/>
               </a:rPr>
               <a:t>我们要彼此相爱（约翰一书第 3 章）</a:t>
@@ -6029,7 +6029,7 @@
               </a:defRPr>
             </a:pPr>
             <a:r>
-              <a:rPr sz="4400" b="1" i="1">
+              <a:rPr lang="zh-CN" sz="4400" b="1" i="1">
                 <a:latin typeface="FZKai-Z03"/>
               </a:rPr>
               <a:t>总结：</a:t>
@@ -6051,7 +6051,7 @@
               </a:defRPr>
             </a:pPr>
             <a:r>
-              <a:rPr sz="4400" b="1" i="1">
+              <a:rPr lang="zh-CN" sz="4400" b="1" i="1">
                 <a:latin typeface="FZKai-Z03"/>
               </a:rPr>
               <a:t>以行动作彼此相爱的总结：</a:t>
@@ -6073,7 +6073,7 @@
               </a:defRPr>
             </a:pPr>
             <a:r>
-              <a:rPr sz="4400" b="1" i="1">
+              <a:rPr lang="zh-CN" sz="4400" b="1" i="1">
                 <a:latin typeface="FZKai-Z03"/>
               </a:rPr>
               <a:t>要珍惜</a:t>
@@ -6095,7 +6095,7 @@
               </a:defRPr>
             </a:pPr>
             <a:r>
-              <a:rPr sz="4400" b="1" i="1">
+              <a:rPr lang="zh-CN" sz="4400" b="1" i="1">
                 <a:latin typeface="FZKai-Z03"/>
               </a:rPr>
               <a:t>要牺牲</a:t>
@@ -6117,7 +6117,7 @@
               </a:defRPr>
             </a:pPr>
             <a:r>
-              <a:rPr sz="4400" b="1" i="1">
+              <a:rPr lang="zh-CN" sz="4400" b="1" i="1">
                 <a:latin typeface="FZKai-Z03"/>
               </a:rPr>
               <a:t>要宽容</a:t>
@@ -6139,7 +6139,7 @@
               </a:defRPr>
             </a:pPr>
             <a:r>
-              <a:rPr sz="4400" b="1" i="1">
+              <a:rPr lang="zh-CN" sz="4400" b="1" i="1">
                 <a:latin typeface="FZKai-Z03"/>
               </a:rPr>
               <a:t>要忍耐</a:t>
@@ -6161,7 +6161,7 @@
               </a:defRPr>
             </a:pPr>
             <a:r>
-              <a:rPr sz="4400" b="1" i="1">
+              <a:rPr lang="zh-CN" sz="4400" b="1" i="1">
                 <a:latin typeface="FZKai-Z03"/>
               </a:rPr>
               <a:t>要真诚</a:t>
@@ -6206,7 +6206,7 @@
               </a:defRPr>
             </a:pPr>
             <a:r>
-              <a:rPr sz="2400" b="1">
+              <a:rPr lang="zh-CN" sz="2400" b="1">
                 <a:latin typeface="FZKai-Z03"/>
               </a:rPr>
               <a:t>我们要彼此相爱（约翰一书第 3 章）</a:t>
@@ -6269,7 +6269,7 @@
               </a:defRPr>
             </a:pPr>
             <a:r>
-              <a:rPr sz="4400" b="1" i="1">
+              <a:rPr lang="zh-CN" sz="4400" b="1" i="1">
                 <a:latin typeface="FZKai-Z03"/>
               </a:rPr>
               <a:t>总结：</a:t>
@@ -6291,7 +6291,7 @@
               </a:defRPr>
             </a:pPr>
             <a:r>
-              <a:rPr sz="4400" b="1" i="1">
+              <a:rPr lang="zh-CN" sz="4400" b="1" i="1">
                 <a:latin typeface="FZKai-Z03"/>
               </a:rPr>
               <a:t>以行动作彼此相爱的总结：</a:t>
@@ -6313,7 +6313,7 @@
               </a:defRPr>
             </a:pPr>
             <a:r>
-              <a:rPr sz="4400" b="1" i="1">
+              <a:rPr lang="zh-CN" sz="4400" b="1" i="1">
                 <a:latin typeface="FZKai-Z03"/>
               </a:rPr>
               <a:t>要珍惜</a:t>
@@ -6335,7 +6335,7 @@
               </a:defRPr>
             </a:pPr>
             <a:r>
-              <a:rPr sz="4400" b="1" i="1">
+              <a:rPr lang="zh-CN" sz="4400" b="1" i="1">
                 <a:latin typeface="FZKai-Z03"/>
               </a:rPr>
               <a:t>要牺牲</a:t>
@@ -6357,7 +6357,7 @@
               </a:defRPr>
             </a:pPr>
             <a:r>
-              <a:rPr sz="4400" b="1" i="1">
+              <a:rPr lang="zh-CN" sz="4400" b="1" i="1">
                 <a:latin typeface="FZKai-Z03"/>
               </a:rPr>
               <a:t>要宽容</a:t>
@@ -6379,7 +6379,7 @@
               </a:defRPr>
             </a:pPr>
             <a:r>
-              <a:rPr sz="4400" b="1" i="1">
+              <a:rPr lang="zh-CN" sz="4400" b="1" i="1">
                 <a:latin typeface="FZKai-Z03"/>
               </a:rPr>
               <a:t>要忍耐</a:t>
@@ -6401,7 +6401,7 @@
               </a:defRPr>
             </a:pPr>
             <a:r>
-              <a:rPr sz="4400" b="1" i="1">
+              <a:rPr lang="zh-CN" sz="4400" b="1" i="1">
                 <a:latin typeface="FZKai-Z03"/>
               </a:rPr>
               <a:t>要真诚</a:t>
@@ -6423,7 +6423,7 @@
               </a:defRPr>
             </a:pPr>
             <a:r>
-              <a:rPr sz="4400" b="1" i="1">
+              <a:rPr lang="zh-CN" sz="4400" b="1" i="1">
                 <a:latin typeface="FZKai-Z03"/>
               </a:rPr>
               <a:t>要恩慈</a:t>
@@ -6468,7 +6468,7 @@
               </a:defRPr>
             </a:pPr>
             <a:r>
-              <a:rPr sz="2400" b="1">
+              <a:rPr lang="zh-CN" sz="2400" b="1">
                 <a:latin typeface="FZKai-Z03"/>
               </a:rPr>
               <a:t>我们要彼此相爱（约翰一书第 3 章）</a:t>
@@ -6531,7 +6531,7 @@
               </a:defRPr>
             </a:pPr>
             <a:r>
-              <a:rPr sz="4400" b="1" i="1">
+              <a:rPr lang="zh-CN" sz="4400" b="1" i="1">
                 <a:latin typeface="FZKai-Z03"/>
               </a:rPr>
               <a:t>总结：</a:t>
@@ -6553,7 +6553,7 @@
               </a:defRPr>
             </a:pPr>
             <a:r>
-              <a:rPr sz="4400" b="1" i="1">
+              <a:rPr lang="zh-CN" sz="4400" b="1" i="1">
                 <a:latin typeface="FZKai-Z03"/>
               </a:rPr>
               <a:t>以行动作彼此相爱的总结：</a:t>
@@ -6575,7 +6575,7 @@
               </a:defRPr>
             </a:pPr>
             <a:r>
-              <a:rPr sz="4400" b="1" i="1">
+              <a:rPr lang="zh-CN" sz="4400" b="1" i="1">
                 <a:latin typeface="FZKai-Z03"/>
               </a:rPr>
               <a:t>要珍惜</a:t>
@@ -6597,7 +6597,7 @@
               </a:defRPr>
             </a:pPr>
             <a:r>
-              <a:rPr sz="4400" b="1" i="1">
+              <a:rPr lang="zh-CN" sz="4400" b="1" i="1">
                 <a:latin typeface="FZKai-Z03"/>
               </a:rPr>
               <a:t>要牺牲</a:t>
@@ -6619,7 +6619,7 @@
               </a:defRPr>
             </a:pPr>
             <a:r>
-              <a:rPr sz="4400" b="1" i="1">
+              <a:rPr lang="zh-CN" sz="4400" b="1" i="1">
                 <a:latin typeface="FZKai-Z03"/>
               </a:rPr>
               <a:t>要宽容</a:t>
@@ -6641,7 +6641,7 @@
               </a:defRPr>
             </a:pPr>
             <a:r>
-              <a:rPr sz="4400" b="1" i="1">
+              <a:rPr lang="zh-CN" sz="4400" b="1" i="1">
                 <a:latin typeface="FZKai-Z03"/>
               </a:rPr>
               <a:t>要忍耐</a:t>
@@ -6663,7 +6663,7 @@
               </a:defRPr>
             </a:pPr>
             <a:r>
-              <a:rPr sz="4400" b="1" i="1">
+              <a:rPr lang="zh-CN" sz="4400" b="1" i="1">
                 <a:latin typeface="FZKai-Z03"/>
               </a:rPr>
               <a:t>要真诚</a:t>
@@ -6685,7 +6685,7 @@
               </a:defRPr>
             </a:pPr>
             <a:r>
-              <a:rPr sz="4400" b="1" i="1">
+              <a:rPr lang="zh-CN" sz="4400" b="1" i="1">
                 <a:latin typeface="FZKai-Z03"/>
               </a:rPr>
               <a:t>要恩慈</a:t>
@@ -6707,7 +6707,7 @@
               </a:defRPr>
             </a:pPr>
             <a:r>
-              <a:rPr sz="4400" b="1" i="1">
+              <a:rPr lang="zh-CN" sz="4400" b="1" i="1">
                 <a:latin typeface="FZKai-Z03"/>
               </a:rPr>
               <a:t>要恒久</a:t>
@@ -6752,7 +6752,7 @@
               </a:defRPr>
             </a:pPr>
             <a:r>
-              <a:rPr sz="2400" b="1">
+              <a:rPr lang="zh-CN" sz="2400" b="1">
                 <a:latin typeface="FZKai-Z03"/>
               </a:rPr>
               <a:t>我们要彼此相爱（约翰一书第 3 章）</a:t>
@@ -6857,7 +6857,7 @@
               </a:defRPr>
             </a:pPr>
             <a:r>
-              <a:rPr sz="6600" b="1">
+              <a:rPr lang="zh-CN" sz="6600" b="1">
                 <a:latin typeface="FZKai-Z03"/>
               </a:rPr>
               <a:t>在耶稣里彼此相爱</a:t>
@@ -6902,7 +6902,7 @@
               </a:defRPr>
             </a:pPr>
             <a:r>
-              <a:rPr sz="4000" b="1">
+              <a:rPr lang="zh-CN" sz="4000" b="1">
                 <a:latin typeface="FZKai-Z03"/>
               </a:rPr>
               <a:t>回应诗歌</a:t>
@@ -6947,7 +6947,7 @@
               </a:defRPr>
             </a:pPr>
             <a:r>
-              <a:rPr sz="4000" b="0">
+              <a:rPr lang="zh-CN" sz="4000" b="0">
                 <a:latin typeface="FZZhunYuan-M02"/>
               </a:rPr>
               <a:t>赞美之泉《I believe》</a:t>
@@ -7010,7 +7010,7 @@
               </a:defRPr>
             </a:pPr>
             <a:r>
-              <a:rPr sz="4400" b="1">
+              <a:rPr lang="zh-CN" sz="4400" b="1">
                 <a:latin typeface="FZKai-Z03"/>
               </a:rPr>
               <a:t>3. 为乌尔姆团契的同工祷告，同心合意为主侍奉，更多的奉献自己，蒙　神的喜悦和祝福。</a:t>
@@ -7055,7 +7055,7 @@
               </a:defRPr>
             </a:pPr>
             <a:r>
-              <a:rPr sz="2400" b="1">
+              <a:rPr lang="zh-CN" sz="2400" b="1">
                 <a:latin typeface="FZKai-Z03"/>
               </a:rPr>
               <a:t>代祷事项</a:t>
@@ -7118,7 +7118,7 @@
               </a:defRPr>
             </a:pPr>
             <a:r>
-              <a:rPr sz="4800" b="0">
+              <a:rPr lang="zh-CN" sz="4800" b="0">
                 <a:latin typeface="FZZhunYuan-M02"/>
               </a:rPr>
               <a:t>我们和睦同居</a:t>
@@ -7140,7 +7140,7 @@
               </a:defRPr>
             </a:pPr>
             <a:r>
-              <a:rPr sz="4800" b="0">
+              <a:rPr lang="zh-CN" sz="4800" b="0">
                 <a:latin typeface="FZZhunYuan-M02"/>
               </a:rPr>
               <a:t>何等地美善</a:t>
@@ -7162,7 +7162,7 @@
               </a:defRPr>
             </a:pPr>
             <a:r>
-              <a:rPr sz="4800" b="0">
+              <a:rPr lang="zh-CN" sz="4800" b="0">
                 <a:latin typeface="FZZhunYuan-M02"/>
               </a:rPr>
               <a:t>凡事谦虚　温柔　忍耐</a:t>
@@ -7184,7 +7184,7 @@
               </a:defRPr>
             </a:pPr>
             <a:r>
-              <a:rPr sz="4800" b="0">
+              <a:rPr lang="zh-CN" sz="4800" b="0">
                 <a:latin typeface="FZZhunYuan-M02"/>
               </a:rPr>
               <a:t>竭力保守圣灵赐合一的心</a:t>
@@ -7206,7 +7206,7 @@
               </a:defRPr>
             </a:pPr>
             <a:r>
-              <a:rPr sz="4800" b="0">
+              <a:rPr lang="zh-CN" sz="4800" b="0">
                 <a:latin typeface="FZZhunYuan-M02"/>
               </a:rPr>
               <a:t>凡事恩慈怜悯相待</a:t>
@@ -7251,7 +7251,7 @@
               </a:defRPr>
             </a:pPr>
             <a:r>
-              <a:rPr sz="2400" b="0">
+              <a:rPr lang="zh-CN" sz="2400" b="0">
                 <a:latin typeface="FZKai-Z03"/>
               </a:rPr>
               <a:t>在耶稣里彼此相爱 1/6</a:t>
@@ -7314,7 +7314,7 @@
               </a:defRPr>
             </a:pPr>
             <a:r>
-              <a:rPr sz="4800" b="0">
+              <a:rPr lang="zh-CN" sz="4800" b="0">
                 <a:latin typeface="FZZhunYuan-M02"/>
               </a:rPr>
               <a:t>在耶稣里彼此相爱</a:t>
@@ -7336,7 +7336,7 @@
               </a:defRPr>
             </a:pPr>
             <a:r>
-              <a:rPr sz="4800" b="0">
+              <a:rPr lang="zh-CN" sz="4800" b="0">
                 <a:latin typeface="FZZhunYuan-M02"/>
               </a:rPr>
               <a:t>在耶稣里彼此相爱</a:t>
@@ -7358,7 +7358,7 @@
               </a:defRPr>
             </a:pPr>
             <a:r>
-              <a:rPr sz="4800" b="0">
+              <a:rPr lang="zh-CN" sz="4800" b="0">
                 <a:latin typeface="FZZhunYuan-M02"/>
               </a:rPr>
               <a:t>少嫉妒论断</a:t>
@@ -7380,7 +7380,7 @@
               </a:defRPr>
             </a:pPr>
             <a:r>
-              <a:rPr sz="4800" b="0">
+              <a:rPr lang="zh-CN" sz="4800" b="0">
                 <a:latin typeface="FZZhunYuan-M02"/>
               </a:rPr>
               <a:t>多饶恕关爱</a:t>
@@ -7402,7 +7402,7 @@
               </a:defRPr>
             </a:pPr>
             <a:r>
-              <a:rPr sz="4800" b="0">
+              <a:rPr lang="zh-CN" sz="4800" b="0">
                 <a:latin typeface="FZZhunYuan-M02"/>
               </a:rPr>
               <a:t>我们爱　因为神就是爱</a:t>
@@ -7447,7 +7447,7 @@
               </a:defRPr>
             </a:pPr>
             <a:r>
-              <a:rPr sz="2400" b="0">
+              <a:rPr lang="zh-CN" sz="2400" b="0">
                 <a:latin typeface="FZKai-Z03"/>
               </a:rPr>
               <a:t>在耶稣里彼此相爱 2/6</a:t>
@@ -7510,7 +7510,7 @@
               </a:defRPr>
             </a:pPr>
             <a:r>
-              <a:rPr sz="4800" b="0">
+              <a:rPr lang="zh-CN" sz="4800" b="0">
                 <a:latin typeface="FZZhunYuan-M02"/>
               </a:rPr>
               <a:t>我们和睦同居</a:t>
@@ -7532,7 +7532,7 @@
               </a:defRPr>
             </a:pPr>
             <a:r>
-              <a:rPr sz="4800" b="0">
+              <a:rPr lang="zh-CN" sz="4800" b="0">
                 <a:latin typeface="FZZhunYuan-M02"/>
               </a:rPr>
               <a:t>何等地美善</a:t>
@@ -7554,7 +7554,7 @@
               </a:defRPr>
             </a:pPr>
             <a:r>
-              <a:rPr sz="4800" b="0">
+              <a:rPr lang="zh-CN" sz="4800" b="0">
                 <a:latin typeface="FZZhunYuan-M02"/>
               </a:rPr>
               <a:t>凡事谦虚　温柔　忍耐</a:t>
@@ -7576,7 +7576,7 @@
               </a:defRPr>
             </a:pPr>
             <a:r>
-              <a:rPr sz="4800" b="0">
+              <a:rPr lang="zh-CN" sz="4800" b="0">
                 <a:latin typeface="FZZhunYuan-M02"/>
               </a:rPr>
               <a:t>竭力保守圣灵赐合一的心</a:t>
@@ -7598,7 +7598,7 @@
               </a:defRPr>
             </a:pPr>
             <a:r>
-              <a:rPr sz="4800" b="0">
+              <a:rPr lang="zh-CN" sz="4800" b="0">
                 <a:latin typeface="FZZhunYuan-M02"/>
               </a:rPr>
               <a:t>凡事恩慈怜悯相待</a:t>
@@ -7643,7 +7643,7 @@
               </a:defRPr>
             </a:pPr>
             <a:r>
-              <a:rPr sz="2400" b="0">
+              <a:rPr lang="zh-CN" sz="2400" b="0">
                 <a:latin typeface="FZKai-Z03"/>
               </a:rPr>
               <a:t>在耶稣里彼此相爱 3/6</a:t>
@@ -7706,7 +7706,7 @@
               </a:defRPr>
             </a:pPr>
             <a:r>
-              <a:rPr sz="4800" b="0">
+              <a:rPr lang="zh-CN" sz="4800" b="0">
                 <a:latin typeface="FZZhunYuan-M02"/>
               </a:rPr>
               <a:t>在耶稣里彼此相爱</a:t>
@@ -7728,7 +7728,7 @@
               </a:defRPr>
             </a:pPr>
             <a:r>
-              <a:rPr sz="4800" b="0">
+              <a:rPr lang="zh-CN" sz="4800" b="0">
                 <a:latin typeface="FZZhunYuan-M02"/>
               </a:rPr>
               <a:t>在耶稣里彼此相爱</a:t>
@@ -7750,7 +7750,7 @@
               </a:defRPr>
             </a:pPr>
             <a:r>
-              <a:rPr sz="4800" b="0">
+              <a:rPr lang="zh-CN" sz="4800" b="0">
                 <a:latin typeface="FZZhunYuan-M02"/>
               </a:rPr>
               <a:t>少嫉妒论断</a:t>
@@ -7772,7 +7772,7 @@
               </a:defRPr>
             </a:pPr>
             <a:r>
-              <a:rPr sz="4800" b="0">
+              <a:rPr lang="zh-CN" sz="4800" b="0">
                 <a:latin typeface="FZZhunYuan-M02"/>
               </a:rPr>
               <a:t>多饶恕关爱</a:t>
@@ -7794,7 +7794,7 @@
               </a:defRPr>
             </a:pPr>
             <a:r>
-              <a:rPr sz="4800" b="0">
+              <a:rPr lang="zh-CN" sz="4800" b="0">
                 <a:latin typeface="FZZhunYuan-M02"/>
               </a:rPr>
               <a:t>我们爱　因为神就是爱</a:t>
@@ -7839,7 +7839,7 @@
               </a:defRPr>
             </a:pPr>
             <a:r>
-              <a:rPr sz="2400" b="0">
+              <a:rPr lang="zh-CN" sz="2400" b="0">
                 <a:latin typeface="FZKai-Z03"/>
               </a:rPr>
               <a:t>在耶稣里彼此相爱 4/6</a:t>
@@ -7902,7 +7902,7 @@
               </a:defRPr>
             </a:pPr>
             <a:r>
-              <a:rPr sz="4800" b="0">
+              <a:rPr lang="zh-CN" sz="4800" b="0">
                 <a:latin typeface="FZZhunYuan-M02"/>
               </a:rPr>
               <a:t>在耶稣里彼此相爱</a:t>
@@ -7924,7 +7924,7 @@
               </a:defRPr>
             </a:pPr>
             <a:r>
-              <a:rPr sz="4800" b="0">
+              <a:rPr lang="zh-CN" sz="4800" b="0">
                 <a:latin typeface="FZZhunYuan-M02"/>
               </a:rPr>
               <a:t>在耶稣里彼此相爱</a:t>
@@ -7946,7 +7946,7 @@
               </a:defRPr>
             </a:pPr>
             <a:r>
-              <a:rPr sz="4800" b="0">
+              <a:rPr lang="zh-CN" sz="4800" b="0">
                 <a:latin typeface="FZZhunYuan-M02"/>
               </a:rPr>
               <a:t>少嫉妒论断</a:t>
@@ -7968,7 +7968,7 @@
               </a:defRPr>
             </a:pPr>
             <a:r>
-              <a:rPr sz="4800" b="0">
+              <a:rPr lang="zh-CN" sz="4800" b="0">
                 <a:latin typeface="FZZhunYuan-M02"/>
               </a:rPr>
               <a:t>多饶恕关爱</a:t>
@@ -7990,7 +7990,7 @@
               </a:defRPr>
             </a:pPr>
             <a:r>
-              <a:rPr sz="4800" b="0">
+              <a:rPr lang="zh-CN" sz="4800" b="0">
                 <a:latin typeface="FZZhunYuan-M02"/>
               </a:rPr>
               <a:t>我们爱　因为神就是爱</a:t>
@@ -8035,7 +8035,7 @@
               </a:defRPr>
             </a:pPr>
             <a:r>
-              <a:rPr sz="2400" b="0">
+              <a:rPr lang="zh-CN" sz="2400" b="0">
                 <a:latin typeface="FZKai-Z03"/>
               </a:rPr>
               <a:t>在耶稣里彼此相爱 5/6</a:t>
@@ -8098,7 +8098,7 @@
               </a:defRPr>
             </a:pPr>
             <a:r>
-              <a:rPr sz="4800" b="0">
+              <a:rPr lang="zh-CN" sz="4800" b="0">
                 <a:latin typeface="FZZhunYuan-M02"/>
               </a:rPr>
               <a:t>在耶稣里彼此相爱</a:t>
@@ -8120,7 +8120,7 @@
               </a:defRPr>
             </a:pPr>
             <a:r>
-              <a:rPr sz="4800" b="0">
+              <a:rPr lang="zh-CN" sz="4800" b="0">
                 <a:latin typeface="FZZhunYuan-M02"/>
               </a:rPr>
               <a:t>在耶稣里彼此相爱</a:t>
@@ -8142,7 +8142,7 @@
               </a:defRPr>
             </a:pPr>
             <a:r>
-              <a:rPr sz="4800" b="0">
+              <a:rPr lang="zh-CN" sz="4800" b="0">
                 <a:latin typeface="FZZhunYuan-M02"/>
               </a:rPr>
               <a:t>少嫉妒论断</a:t>
@@ -8164,7 +8164,7 @@
               </a:defRPr>
             </a:pPr>
             <a:r>
-              <a:rPr sz="4800" b="0">
+              <a:rPr lang="zh-CN" sz="4800" b="0">
                 <a:latin typeface="FZZhunYuan-M02"/>
               </a:rPr>
               <a:t>多饶恕关爱</a:t>
@@ -8186,7 +8186,7 @@
               </a:defRPr>
             </a:pPr>
             <a:r>
-              <a:rPr sz="4800" b="0">
+              <a:rPr lang="zh-CN" sz="4800" b="0">
                 <a:latin typeface="FZZhunYuan-M02"/>
               </a:rPr>
               <a:t>我们爱　因为神就是爱</a:t>
@@ -8208,7 +8208,7 @@
               </a:defRPr>
             </a:pPr>
             <a:r>
-              <a:rPr sz="4800" b="0">
+              <a:rPr lang="zh-CN" sz="4800" b="0">
                 <a:latin typeface="FZZhunYuan-M02"/>
               </a:rPr>
               <a:t>我们爱　因为神　祂就是爱</a:t>
@@ -8253,7 +8253,7 @@
               </a:defRPr>
             </a:pPr>
             <a:r>
-              <a:rPr sz="2400" b="0">
+              <a:rPr lang="zh-CN" sz="2400" b="0">
                 <a:latin typeface="FZKai-Z03"/>
               </a:rPr>
               <a:t>在耶稣里彼此相爱 6/6</a:t>
@@ -8460,7 +8460,7 @@
               </a:defRPr>
             </a:pPr>
             <a:r>
-              <a:rPr sz="4400" b="1">
+              <a:rPr lang="zh-CN" sz="4400" b="1">
                 <a:latin typeface="FZKai-Z03"/>
               </a:rPr>
               <a:t>狼堡华人团契 (Wolfsburg)</a:t>
@@ -8482,7 +8482,7 @@
               </a:defRPr>
             </a:pPr>
             <a:r>
-              <a:rPr sz="4400" b="1">
+              <a:rPr lang="zh-CN" sz="4400" b="1">
                 <a:latin typeface="FZKai-Z03"/>
               </a:rPr>
               <a:t>全年平均聚会人数：18 人</a:t>
@@ -8504,7 +8504,7 @@
               </a:defRPr>
             </a:pPr>
             <a:r>
-              <a:rPr sz="4400" b="1">
+              <a:rPr lang="zh-CN" sz="4400" b="1">
                 <a:latin typeface="FZKai-Z03"/>
               </a:rPr>
               <a:t>1. 有更多的弟兄姐妹能建立每天灵修习惯（读经、祷告），并愿意按照　神的话去行，使　神的话语成为每天生活的指引。</a:t>
@@ -8549,7 +8549,7 @@
               </a:defRPr>
             </a:pPr>
             <a:r>
-              <a:rPr sz="2400" b="1">
+              <a:rPr lang="zh-CN" sz="2400" b="1">
                 <a:latin typeface="FZKai-Z03"/>
               </a:rPr>
               <a:t>代祷事项</a:t>
@@ -8756,7 +8756,7 @@
               </a:defRPr>
             </a:pPr>
             <a:r>
-              <a:rPr sz="4400" b="1">
+              <a:rPr lang="zh-CN" sz="4400" b="1">
                 <a:latin typeface="FZKai-Z03"/>
               </a:rPr>
               <a:t>9 月 3 日（日）、 10 日（日）、 17 日（日） 成人主日学的主题是《使徒行传》，由吴牧师带领。9月24日（日）休息一次。欢迎大家积极参加。</a:t>
@@ -8801,7 +8801,7 @@
               </a:defRPr>
             </a:pPr>
             <a:r>
-              <a:rPr sz="2400" b="1">
+              <a:rPr lang="zh-CN" sz="2400" b="1">
                 <a:latin typeface="FZKai-Z03"/>
               </a:rPr>
               <a:t>活动报告</a:t>
@@ -8864,7 +8864,7 @@
               </a:defRPr>
             </a:pPr>
             <a:r>
-              <a:rPr sz="4400" b="1">
+              <a:rPr lang="zh-CN" sz="4400" b="1">
                 <a:latin typeface="FZKai-Z03"/>
               </a:rPr>
               <a:t>9 月 10 日（日）主日爱宴后，诗班将进行练唱。请诗班成员和有意参与的弟兄姊妹预留时间。</a:t>
@@ -8909,7 +8909,7 @@
               </a:defRPr>
             </a:pPr>
             <a:r>
-              <a:rPr sz="2400" b="1">
+              <a:rPr lang="zh-CN" sz="2400" b="1">
                 <a:latin typeface="FZKai-Z03"/>
               </a:rPr>
               <a:t>活动报告</a:t>
@@ -8972,7 +8972,7 @@
               </a:defRPr>
             </a:pPr>
             <a:r>
-              <a:rPr sz="4400" b="1">
+              <a:rPr lang="zh-CN" sz="4400" b="1">
                 <a:latin typeface="FZKai-Z03"/>
               </a:rPr>
               <a:t>9 月青年团契活动安排如下：</a:t>
@@ -8994,7 +8994,7 @@
               </a:defRPr>
             </a:pPr>
             <a:r>
-              <a:rPr sz="4400" b="1">
+              <a:rPr lang="zh-CN" sz="4400" b="1">
                 <a:latin typeface="FZKai-Z03"/>
               </a:rPr>
               <a:t>9 月 9 日：花园日；</a:t>
@@ -9016,7 +9016,7 @@
               </a:defRPr>
             </a:pPr>
             <a:r>
-              <a:rPr sz="4400" b="1">
+              <a:rPr lang="zh-CN" sz="4400" b="1">
                 <a:latin typeface="FZKai-Z03"/>
               </a:rPr>
               <a:t>9 月 23 日：月饼工坊</a:t>
@@ -9061,7 +9061,7 @@
               </a:defRPr>
             </a:pPr>
             <a:r>
-              <a:rPr sz="2400" b="1">
+              <a:rPr lang="zh-CN" sz="2400" b="1">
                 <a:latin typeface="FZKai-Z03"/>
               </a:rPr>
               <a:t>活动报告</a:t>
@@ -9124,7 +9124,7 @@
               </a:defRPr>
             </a:pPr>
             <a:r>
-              <a:rPr sz="4400" b="1">
+              <a:rPr lang="zh-CN" sz="4400" b="1">
                 <a:latin typeface="FZKai-Z03"/>
               </a:rPr>
               <a:t>9 月伉俪团契活动安排如下：</a:t>
@@ -9146,7 +9146,7 @@
               </a:defRPr>
             </a:pPr>
             <a:r>
-              <a:rPr sz="4400" b="1">
+              <a:rPr lang="zh-CN" sz="4400" b="1">
                 <a:latin typeface="FZKai-Z03"/>
               </a:rPr>
               <a:t>9 月 9 日：花园日；</a:t>
@@ -9168,7 +9168,7 @@
               </a:defRPr>
             </a:pPr>
             <a:r>
-              <a:rPr sz="4400" b="1">
+              <a:rPr lang="zh-CN" sz="4400" b="1">
                 <a:latin typeface="FZKai-Z03"/>
               </a:rPr>
               <a:t>9 月 23 日：三个团契联合月饼工坊庆中秋活动。</a:t>
@@ -9213,7 +9213,7 @@
               </a:defRPr>
             </a:pPr>
             <a:r>
-              <a:rPr sz="2400" b="1">
+              <a:rPr lang="zh-CN" sz="2400" b="1">
                 <a:latin typeface="FZKai-Z03"/>
               </a:rPr>
               <a:t>活动报告</a:t>
@@ -9276,7 +9276,7 @@
               </a:defRPr>
             </a:pPr>
             <a:r>
-              <a:rPr sz="4400" b="1">
+              <a:rPr lang="zh-CN" sz="4400" b="1">
                 <a:latin typeface="FZKai-Z03"/>
               </a:rPr>
               <a:t>9 月 9 日（六）是教会花园日，将进行一系列维护和美化工作，包括修复教堂住宅、修复大堂楼顶漏水和维护清理花园等。如果您有任何疑问或建议，请联系王榛弟兄。</a:t>
@@ -9321,7 +9321,7 @@
               </a:defRPr>
             </a:pPr>
             <a:r>
-              <a:rPr sz="2400" b="1">
+              <a:rPr lang="zh-CN" sz="2400" b="1">
                 <a:latin typeface="FZKai-Z03"/>
               </a:rPr>
               <a:t>活动报告</a:t>
@@ -9384,7 +9384,7 @@
               </a:defRPr>
             </a:pPr>
             <a:r>
-              <a:rPr sz="4400" b="1">
+              <a:rPr lang="zh-CN" sz="4400" b="1">
                 <a:latin typeface="FZKai-Z03"/>
               </a:rPr>
               <a:t>9 月 16 日（六）下午两点将举行管惠萍传道按牧典礼，邀请弟兄姊妹一起观礼见证。</a:t>
@@ -9429,7 +9429,7 @@
               </a:defRPr>
             </a:pPr>
             <a:r>
-              <a:rPr sz="2400" b="1">
+              <a:rPr lang="zh-CN" sz="2400" b="1">
                 <a:latin typeface="FZKai-Z03"/>
               </a:rPr>
               <a:t>活动报告</a:t>
@@ -9492,7 +9492,7 @@
               </a:defRPr>
             </a:pPr>
             <a:r>
-              <a:rPr sz="4400" b="1">
+              <a:rPr lang="zh-CN" sz="4400" b="1">
                 <a:latin typeface="FZKai-Z03"/>
               </a:rPr>
               <a:t>2. 为我们所接触到的慕道朋友信主代祷，特别为弟兄姐妹尚未信主的家人代祷。</a:t>
@@ -9514,7 +9514,7 @@
               </a:defRPr>
             </a:pPr>
             <a:r>
-              <a:rPr sz="4400" b="1">
+              <a:rPr lang="zh-CN" sz="4400" b="1">
                 <a:latin typeface="FZKai-Z03"/>
               </a:rPr>
               <a:t>3. 为我们所在的德国教会Stadtmission代祷；为教会的三位牧师代祷，他们分别负责全面事工，儿童青少年事工及华人事工。</a:t>
@@ -9559,7 +9559,7 @@
               </a:defRPr>
             </a:pPr>
             <a:r>
-              <a:rPr sz="2400" b="1">
+              <a:rPr lang="zh-CN" sz="2400" b="1">
                 <a:latin typeface="FZKai-Z03"/>
               </a:rPr>
               <a:t>代祷事项</a:t>
@@ -9622,7 +9622,7 @@
               </a:defRPr>
             </a:pPr>
             <a:r>
-              <a:rPr sz="4400" b="1">
+              <a:rPr lang="zh-CN" sz="4400" b="1">
                 <a:latin typeface="FZKai-Z03"/>
               </a:rPr>
               <a:t>9 月 23 日（六）下午两点，青年、伉俪、长青团契将联合举办月饼工坊庆中秋活动。我们也诚挚邀请弟兄姊妹们一家一菜，共同享受晚餐。</a:t>
@@ -9667,7 +9667,7 @@
               </a:defRPr>
             </a:pPr>
             <a:r>
-              <a:rPr sz="2400" b="1">
+              <a:rPr lang="zh-CN" sz="2400" b="1">
                 <a:latin typeface="FZKai-Z03"/>
               </a:rPr>
               <a:t>活动报告</a:t>
@@ -9730,7 +9730,7 @@
               </a:defRPr>
             </a:pPr>
             <a:r>
-              <a:rPr sz="4400" b="1">
+              <a:rPr lang="zh-CN" sz="4400" b="1">
                 <a:latin typeface="FZKai-Z03"/>
               </a:rPr>
               <a:t>9 月 24 日（日）主日聚会有每月祷告会，请大家预留时间参加。</a:t>
@@ -9775,7 +9775,7 @@
               </a:defRPr>
             </a:pPr>
             <a:r>
-              <a:rPr sz="2400" b="1">
+              <a:rPr lang="zh-CN" sz="2400" b="1">
                 <a:latin typeface="FZKai-Z03"/>
               </a:rPr>
               <a:t>活动报告</a:t>
@@ -9838,7 +9838,7 @@
               </a:defRPr>
             </a:pPr>
             <a:r>
-              <a:rPr sz="4400" b="1">
+              <a:rPr lang="zh-CN" sz="4400" b="1">
                 <a:latin typeface="FZKai-Z03"/>
               </a:rPr>
               <a:t>9 月 29 日（五）- 10 月 1 日（日）汉堡教会培灵会主题为《事奉 • 我 • 我的家》，由管惠萍牧师主讲，邀请信徒踊跃参加。内容如下：</a:t>
@@ -9860,7 +9860,7 @@
               </a:defRPr>
             </a:pPr>
             <a:r>
-              <a:rPr sz="4400" b="1">
+              <a:rPr lang="zh-CN" sz="4400" b="1">
                 <a:latin typeface="FZKai-Z03"/>
               </a:rPr>
               <a:t>- 9 月 29 日（五）19:00 爱宴，19:30 培灵会（1）「事奉与我」；</a:t>
@@ -9882,7 +9882,7 @@
               </a:defRPr>
             </a:pPr>
             <a:r>
-              <a:rPr sz="4400" b="1">
+              <a:rPr lang="zh-CN" sz="4400" b="1">
                 <a:latin typeface="FZKai-Z03"/>
               </a:rPr>
               <a:t>- 9 月 30 日（六）13:00 爱宴，14:00 培灵会（2）「事奉与我的家」；</a:t>
@@ -9904,7 +9904,7 @@
               </a:defRPr>
             </a:pPr>
             <a:r>
-              <a:rPr sz="4400" b="1">
+              <a:rPr lang="zh-CN" sz="4400" b="1">
                 <a:latin typeface="FZKai-Z03"/>
               </a:rPr>
               <a:t>- 10 月 1 日（日）10:30 圣餐主日敬拜内，培灵会（3）「事奉 • 我 • 我的家」</a:t>
@@ -9949,7 +9949,7 @@
               </a:defRPr>
             </a:pPr>
             <a:r>
-              <a:rPr sz="2400" b="1">
+              <a:rPr lang="zh-CN" sz="2400" b="1">
                 <a:latin typeface="FZKai-Z03"/>
               </a:rPr>
               <a:t>活动报告</a:t>
@@ -10012,7 +10012,7 @@
               </a:defRPr>
             </a:pPr>
             <a:r>
-              <a:rPr sz="4400" b="1">
+              <a:rPr lang="zh-CN" sz="4400" b="1">
                 <a:latin typeface="FZKai-Z03"/>
               </a:rPr>
               <a:t>本月寿星：吴振忠、胡钰、卢玲娜、赵桂龙、周斌、蔡文彦、沈嘉禾、李渊、施予暄（Hannah）、陈怡琳（Joella）、张起恩、邵羲之（吱吱）、Yan Esther Xie（燕燕）、暞荣（Tomai）。愿神赐福你们！</a:t>
@@ -10057,7 +10057,7 @@
               </a:defRPr>
             </a:pPr>
             <a:r>
-              <a:rPr sz="2400" b="1">
+              <a:rPr lang="zh-CN" sz="2400" b="1">
                 <a:latin typeface="FZKai-Z03"/>
               </a:rPr>
               <a:t>活动报告</a:t>
@@ -10204,13 +10204,13 @@
               </a:defRPr>
             </a:pPr>
             <a:r>
-              <a:rPr sz="3200" b="1">
+              <a:rPr lang="zh-CN" sz="3200" b="1">
                 <a:latin typeface="FZKai-Z03"/>
               </a:rPr>
               <a:t>主题：常作准备</a:t>
             </a:r>
             <a:r>
-              <a:rPr sz="2400" b="1">
+              <a:rPr lang="zh-CN" sz="2400" b="1">
                 <a:latin typeface="FZKai-Z03"/>
               </a:rPr>
               <a:t>彼得前书 3:13-18</a:t>
@@ -10232,7 +10232,7 @@
               </a:defRPr>
             </a:pPr>
             <a:r>
-              <a:rPr sz="3200" b="1">
+              <a:rPr lang="zh-CN" sz="3200" b="1">
                 <a:latin typeface="FZKai-Z03"/>
               </a:rPr>
               <a:t>证道：吴雨洁传道</a:t>
@@ -10254,7 +10254,7 @@
               </a:defRPr>
             </a:pPr>
             <a:r>
-              <a:rPr sz="3200" b="1">
+              <a:rPr lang="zh-CN" sz="3200" b="1">
                 <a:latin typeface="FZKai-Z03"/>
               </a:rPr>
               <a:t>司会：徐圣佳姊妹</a:t>
@@ -10276,7 +10276,7 @@
               </a:defRPr>
             </a:pPr>
             <a:r>
-              <a:rPr sz="3200" b="1">
+              <a:rPr lang="zh-CN" sz="3200" b="1">
                 <a:latin typeface="FZKai-Z03"/>
               </a:rPr>
               <a:t>司琴：莊雅玲姊妹</a:t>
@@ -10298,7 +10298,7 @@
               </a:defRPr>
             </a:pPr>
             <a:r>
-              <a:rPr sz="3200" b="1">
+              <a:rPr lang="zh-CN" sz="3200" b="1">
                 <a:latin typeface="FZKai-Z03"/>
               </a:rPr>
               <a:t>领唱：陈明艳姊妹、刘朗朗弟兄</a:t>
@@ -10320,7 +10320,7 @@
               </a:defRPr>
             </a:pPr>
             <a:r>
-              <a:rPr sz="3200" b="1">
+              <a:rPr lang="zh-CN" sz="3200" b="1">
                 <a:latin typeface="FZKai-Z03"/>
               </a:rPr>
               <a:t>主领执事：王泽宇弟兄</a:t>
@@ -10342,7 +10342,7 @@
               </a:defRPr>
             </a:pPr>
             <a:r>
-              <a:rPr sz="3200" b="1">
+              <a:rPr lang="zh-CN" sz="3200" b="1">
                 <a:latin typeface="FZKai-Z03"/>
               </a:rPr>
               <a:t>少年主日学：施　逸弟兄</a:t>
@@ -10364,7 +10364,7 @@
               </a:defRPr>
             </a:pPr>
             <a:r>
-              <a:rPr sz="3200" b="1">
+              <a:rPr lang="zh-CN" sz="3200" b="1">
                 <a:latin typeface="FZKai-Z03"/>
               </a:rPr>
               <a:t>少儿主日学：尤晨雪姊妹、赵海静姊妹</a:t>
@@ -10386,7 +10386,7 @@
               </a:defRPr>
             </a:pPr>
             <a:r>
-              <a:rPr sz="3200" b="1">
+              <a:rPr lang="zh-CN" sz="3200" b="1">
                 <a:latin typeface="FZKai-Z03"/>
               </a:rPr>
               <a:t>幼儿主日学：傅祥芸姊妹、蔡文彦姊妹</a:t>
@@ -10408,7 +10408,7 @@
               </a:defRPr>
             </a:pPr>
             <a:r>
-              <a:rPr sz="3200" b="1">
+              <a:rPr lang="zh-CN" sz="3200" b="1">
                 <a:latin typeface="FZKai-Z03"/>
               </a:rPr>
               <a:t>PPT制作播放：郑　炜弟兄、邵　颢弟兄</a:t>
@@ -10453,7 +10453,7 @@
               </a:defRPr>
             </a:pPr>
             <a:r>
-              <a:rPr sz="2400" b="1">
+              <a:rPr lang="zh-CN" sz="2400" b="1">
                 <a:latin typeface="FZKai-Z03"/>
               </a:rPr>
               <a:t>2023 年 9 月 10 日主日服事表</a:t>
@@ -11080,13 +11080,13 @@
               </a:defRPr>
             </a:pPr>
             <a:r>
-              <a:rPr sz="3200" b="1">
+              <a:rPr lang="zh-CN" sz="3200" b="1">
                 <a:latin typeface="FZKai-Z03"/>
               </a:rPr>
               <a:t>主题：我们要彼此相爱</a:t>
             </a:r>
             <a:r>
-              <a:rPr sz="2400" b="1">
+              <a:rPr lang="zh-CN" sz="2400" b="1">
                 <a:latin typeface="FZKai-Z03"/>
               </a:rPr>
               <a:t>约翰一书第 3 章</a:t>
@@ -11108,7 +11108,7 @@
               </a:defRPr>
             </a:pPr>
             <a:r>
-              <a:rPr sz="3200" b="1">
+              <a:rPr lang="zh-CN" sz="3200" b="1">
                 <a:latin typeface="FZKai-Z03"/>
               </a:rPr>
               <a:t>证道：吴振忠牧师</a:t>
@@ -11130,7 +11130,7 @@
               </a:defRPr>
             </a:pPr>
             <a:r>
-              <a:rPr sz="3200" b="1">
+              <a:rPr lang="zh-CN" sz="3200" b="1">
                 <a:latin typeface="FZKai-Z03"/>
               </a:rPr>
               <a:t>司会：刘朗朗弟兄</a:t>
@@ -11152,7 +11152,7 @@
               </a:defRPr>
             </a:pPr>
             <a:r>
-              <a:rPr sz="3200" b="1">
+              <a:rPr lang="zh-CN" sz="3200" b="1">
                 <a:latin typeface="FZKai-Z03"/>
               </a:rPr>
               <a:t>司琴：李　帆弟兄</a:t>
@@ -11174,7 +11174,7 @@
               </a:defRPr>
             </a:pPr>
             <a:r>
-              <a:rPr sz="3200" b="1">
+              <a:rPr lang="zh-CN" sz="3200" b="1">
                 <a:latin typeface="FZKai-Z03"/>
               </a:rPr>
               <a:t>领唱：周诚英姊妹、袁家辉弟兄</a:t>
@@ -11196,7 +11196,7 @@
               </a:defRPr>
             </a:pPr>
             <a:r>
-              <a:rPr sz="3200" b="1">
+              <a:rPr lang="zh-CN" sz="3200" b="1">
                 <a:latin typeface="FZKai-Z03"/>
               </a:rPr>
               <a:t>主领执事：施　逸弟兄</a:t>
@@ -11218,7 +11218,7 @@
               </a:defRPr>
             </a:pPr>
             <a:r>
-              <a:rPr sz="3200" b="1">
+              <a:rPr lang="zh-CN" sz="3200" b="1">
                 <a:latin typeface="FZKai-Z03"/>
               </a:rPr>
               <a:t>少年主日学：黄罗佳弟兄</a:t>
@@ -11240,7 +11240,7 @@
               </a:defRPr>
             </a:pPr>
             <a:r>
-              <a:rPr sz="3200" b="1">
+              <a:rPr lang="zh-CN" sz="3200" b="1">
                 <a:latin typeface="FZKai-Z03"/>
               </a:rPr>
               <a:t>少儿主日学：周向荣姊妹、徐　蔚姊妹</a:t>
@@ -11262,7 +11262,7 @@
               </a:defRPr>
             </a:pPr>
             <a:r>
-              <a:rPr sz="3200" b="1">
+              <a:rPr lang="zh-CN" sz="3200" b="1">
                 <a:latin typeface="FZKai-Z03"/>
               </a:rPr>
               <a:t>幼儿主日学：王　娜姊妹、邵　凯弟兄</a:t>
@@ -11284,7 +11284,7 @@
               </a:defRPr>
             </a:pPr>
             <a:r>
-              <a:rPr sz="3200" b="1">
+              <a:rPr lang="zh-CN" sz="3200" b="1">
                 <a:latin typeface="FZKai-Z03"/>
               </a:rPr>
               <a:t>PPT制作播放：丘灿荣弟兄、邱奕洲弟兄</a:t>
@@ -11329,7 +11329,7 @@
               </a:defRPr>
             </a:pPr>
             <a:r>
-              <a:rPr sz="2400" b="1">
+              <a:rPr lang="zh-CN" sz="2400" b="1">
                 <a:latin typeface="FZKai-Z03"/>
               </a:rPr>
               <a:t>2023 年 9 月 3 日主日服事表</a:t>
@@ -11878,7 +11878,7 @@
               </a:defRPr>
             </a:pPr>
             <a:r>
-              <a:rPr sz="3300" b="1">
+              <a:rPr lang="zh-CN" sz="3300" b="1">
                 <a:latin typeface="FZKai-Z03"/>
               </a:rPr>
               <a:t>2023 年 09 月 03 日</a:t>
@@ -12007,7 +12007,7 @@
               </a:defRPr>
             </a:pPr>
             <a:r>
-              <a:rPr sz="3600" b="1">
+              <a:rPr lang="zh-CN" sz="3600" b="1">
                 <a:latin typeface="FZKai-Z03"/>
               </a:rPr>
               <a:t>2023 年 09 月 03 日</a:t>
@@ -12136,7 +12136,7 @@
               </a:defRPr>
             </a:pPr>
             <a:r>
-              <a:rPr sz="7200" b="1">
+              <a:rPr lang="zh-CN" sz="7200" b="1">
                 <a:latin typeface="FZKai-Z03"/>
               </a:rPr>
               <a:t>诗篇第 136 章（1-9,23-26）</a:t>
@@ -12158,7 +12158,7 @@
               </a:defRPr>
             </a:pPr>
             <a:r>
-              <a:rPr sz="7200" b="1">
+              <a:rPr lang="zh-CN" sz="7200" b="1">
                 <a:latin typeface="FZKai-Z03"/>
               </a:rPr>
               <a:t/>
@@ -12203,7 +12203,7 @@
               </a:defRPr>
             </a:pPr>
             <a:r>
-              <a:rPr sz="4000" b="1">
+              <a:rPr lang="zh-CN" sz="4000" b="1">
                 <a:latin typeface="FZKai-Z03"/>
               </a:rPr>
               <a:t>宣  召</a:t>
@@ -12266,13 +12266,13 @@
               </a:defRPr>
             </a:pPr>
             <a:r>
-              <a:rPr baseline="30000" sz="4400" b="1">
+              <a:rPr baseline="30000" lang="zh-CN" sz="4400" b="1">
                 <a:latin typeface="FZKai-Z03"/>
               </a:rPr>
               <a:t>1 </a:t>
             </a:r>
             <a:r>
-              <a:rPr sz="4400" b="1">
+              <a:rPr lang="zh-CN" sz="4400" b="1">
                 <a:latin typeface="FZKai-Z03"/>
               </a:rPr>
               <a:t>你们要称谢耶和华，因他本为善。他的慈爱永远长存。</a:t>
@@ -12294,13 +12294,13 @@
               </a:defRPr>
             </a:pPr>
             <a:r>
-              <a:rPr baseline="30000" sz="4400" b="1">
+              <a:rPr baseline="30000" lang="zh-CN" sz="4400" b="1">
                 <a:latin typeface="FZKai-Z03"/>
               </a:rPr>
               <a:t>2 </a:t>
             </a:r>
             <a:r>
-              <a:rPr sz="4400" b="1">
+              <a:rPr lang="zh-CN" sz="4400" b="1">
                 <a:latin typeface="FZKai-Z03"/>
               </a:rPr>
               <a:t>你们要称谢万神之神，因他的慈爱永远长存。</a:t>
@@ -12322,13 +12322,13 @@
               </a:defRPr>
             </a:pPr>
             <a:r>
-              <a:rPr baseline="30000" sz="4400" b="1">
+              <a:rPr baseline="30000" lang="zh-CN" sz="4400" b="1">
                 <a:latin typeface="FZKai-Z03"/>
               </a:rPr>
               <a:t>3 </a:t>
             </a:r>
             <a:r>
-              <a:rPr sz="4400" b="1">
+              <a:rPr lang="zh-CN" sz="4400" b="1">
                 <a:latin typeface="FZKai-Z03"/>
               </a:rPr>
               <a:t>你们要称谢万主之主，因他的慈爱永远长存。</a:t>
@@ -12373,7 +12373,7 @@
               </a:defRPr>
             </a:pPr>
             <a:r>
-              <a:rPr sz="2400" b="1">
+              <a:rPr lang="zh-CN" sz="2400" b="1">
                 <a:latin typeface="FZKai-Z03"/>
               </a:rPr>
               <a:t>诗篇第 136 章（1-9,23-26）</a:t>
@@ -12436,13 +12436,13 @@
               </a:defRPr>
             </a:pPr>
             <a:r>
-              <a:rPr baseline="30000" sz="4400" b="1">
+              <a:rPr baseline="30000" lang="zh-CN" sz="4400" b="1">
                 <a:latin typeface="FZKai-Z03"/>
               </a:rPr>
               <a:t>4 </a:t>
             </a:r>
             <a:r>
-              <a:rPr sz="4400" b="1">
+              <a:rPr lang="zh-CN" sz="4400" b="1">
                 <a:latin typeface="FZKai-Z03"/>
               </a:rPr>
               <a:t>称谢那独行大奇事的，因他的慈爱永远长存。</a:t>
@@ -12464,13 +12464,13 @@
               </a:defRPr>
             </a:pPr>
             <a:r>
-              <a:rPr baseline="30000" sz="4400" b="1">
+              <a:rPr baseline="30000" lang="zh-CN" sz="4400" b="1">
                 <a:latin typeface="FZKai-Z03"/>
               </a:rPr>
               <a:t>5 </a:t>
             </a:r>
             <a:r>
-              <a:rPr sz="4400" b="1">
+              <a:rPr lang="zh-CN" sz="4400" b="1">
                 <a:latin typeface="FZKai-Z03"/>
               </a:rPr>
               <a:t>称谢那用智慧造天的，因他的慈爱永远长存。</a:t>
@@ -12492,13 +12492,13 @@
               </a:defRPr>
             </a:pPr>
             <a:r>
-              <a:rPr baseline="30000" sz="4400" b="1">
+              <a:rPr baseline="30000" lang="zh-CN" sz="4400" b="1">
                 <a:latin typeface="FZKai-Z03"/>
               </a:rPr>
               <a:t>6 </a:t>
             </a:r>
             <a:r>
-              <a:rPr sz="4400" b="1">
+              <a:rPr lang="zh-CN" sz="4400" b="1">
                 <a:latin typeface="FZKai-Z03"/>
               </a:rPr>
               <a:t>称谢那铺地在水以上的，因他的慈爱永远长存。</a:t>
@@ -12543,7 +12543,7 @@
               </a:defRPr>
             </a:pPr>
             <a:r>
-              <a:rPr sz="2400" b="1">
+              <a:rPr lang="zh-CN" sz="2400" b="1">
                 <a:latin typeface="FZKai-Z03"/>
               </a:rPr>
               <a:t>诗篇第 136 章（1-9,23-26）</a:t>
@@ -12606,13 +12606,13 @@
               </a:defRPr>
             </a:pPr>
             <a:r>
-              <a:rPr baseline="30000" sz="4400" b="1">
+              <a:rPr baseline="30000" lang="zh-CN" sz="4400" b="1">
                 <a:latin typeface="FZKai-Z03"/>
               </a:rPr>
               <a:t>7 </a:t>
             </a:r>
             <a:r>
-              <a:rPr sz="4400" b="1">
+              <a:rPr lang="zh-CN" sz="4400" b="1">
                 <a:latin typeface="FZKai-Z03"/>
               </a:rPr>
               <a:t>称谢那造成大光的，因他的慈爱永远长存。</a:t>
@@ -12634,13 +12634,13 @@
               </a:defRPr>
             </a:pPr>
             <a:r>
-              <a:rPr baseline="30000" sz="4400" b="1">
+              <a:rPr baseline="30000" lang="zh-CN" sz="4400" b="1">
                 <a:latin typeface="FZKai-Z03"/>
               </a:rPr>
               <a:t>8 </a:t>
             </a:r>
             <a:r>
-              <a:rPr sz="4400" b="1">
+              <a:rPr lang="zh-CN" sz="4400" b="1">
                 <a:latin typeface="FZKai-Z03"/>
               </a:rPr>
               <a:t>他造日头管白昼，因他的慈爱永远长存。</a:t>
@@ -12662,13 +12662,13 @@
               </a:defRPr>
             </a:pPr>
             <a:r>
-              <a:rPr baseline="30000" sz="4400" b="1">
+              <a:rPr baseline="30000" lang="zh-CN" sz="4400" b="1">
                 <a:latin typeface="FZKai-Z03"/>
               </a:rPr>
               <a:t>9 </a:t>
             </a:r>
             <a:r>
-              <a:rPr sz="4400" b="1">
+              <a:rPr lang="zh-CN" sz="4400" b="1">
                 <a:latin typeface="FZKai-Z03"/>
               </a:rPr>
               <a:t>他造月亮星宿管黑夜，因他的慈爱永远长存。</a:t>
@@ -12690,13 +12690,13 @@
               </a:defRPr>
             </a:pPr>
             <a:r>
-              <a:rPr baseline="30000" sz="4400" b="1">
+              <a:rPr baseline="30000" lang="zh-CN" sz="4400" b="1">
                 <a:latin typeface="FZKai-Z03"/>
               </a:rPr>
               <a:t>23 </a:t>
             </a:r>
             <a:r>
-              <a:rPr sz="4400" b="1">
+              <a:rPr lang="zh-CN" sz="4400" b="1">
                 <a:latin typeface="FZKai-Z03"/>
               </a:rPr>
               <a:t>他顾念我们在卑微的地步，因他的慈爱永远长存。</a:t>
@@ -12741,7 +12741,7 @@
               </a:defRPr>
             </a:pPr>
             <a:r>
-              <a:rPr sz="2400" b="1">
+              <a:rPr lang="zh-CN" sz="2400" b="1">
                 <a:latin typeface="FZKai-Z03"/>
               </a:rPr>
               <a:t>诗篇第 136 章（1-9,23-26）</a:t>
@@ -12804,13 +12804,13 @@
               </a:defRPr>
             </a:pPr>
             <a:r>
-              <a:rPr baseline="30000" sz="4400" b="1">
+              <a:rPr baseline="30000" lang="zh-CN" sz="4400" b="1">
                 <a:latin typeface="FZKai-Z03"/>
               </a:rPr>
               <a:t>24 </a:t>
             </a:r>
             <a:r>
-              <a:rPr sz="4400" b="1">
+              <a:rPr lang="zh-CN" sz="4400" b="1">
                 <a:latin typeface="FZKai-Z03"/>
               </a:rPr>
               <a:t>他救拔我们脱离敌人，因他的慈爱永远长存。</a:t>
@@ -12832,13 +12832,13 @@
               </a:defRPr>
             </a:pPr>
             <a:r>
-              <a:rPr baseline="30000" sz="4400" b="1">
+              <a:rPr baseline="30000" lang="zh-CN" sz="4400" b="1">
                 <a:latin typeface="FZKai-Z03"/>
               </a:rPr>
               <a:t>25 </a:t>
             </a:r>
             <a:r>
-              <a:rPr sz="4400" b="1">
+              <a:rPr lang="zh-CN" sz="4400" b="1">
                 <a:latin typeface="FZKai-Z03"/>
               </a:rPr>
               <a:t>他赐粮食给凡有血气的，因他的慈爱永远长存。</a:t>
@@ -12860,13 +12860,13 @@
               </a:defRPr>
             </a:pPr>
             <a:r>
-              <a:rPr baseline="30000" sz="4400" b="1">
+              <a:rPr baseline="30000" lang="zh-CN" sz="4400" b="1">
                 <a:latin typeface="FZKai-Z03"/>
               </a:rPr>
               <a:t>26 </a:t>
             </a:r>
             <a:r>
-              <a:rPr sz="4400" b="1">
+              <a:rPr lang="zh-CN" sz="4400" b="1">
                 <a:latin typeface="FZKai-Z03"/>
               </a:rPr>
               <a:t>你们要称谢天上的神，因他的慈爱永远长存。</a:t>
@@ -12911,7 +12911,7 @@
               </a:defRPr>
             </a:pPr>
             <a:r>
-              <a:rPr sz="2400" b="1">
+              <a:rPr lang="zh-CN" sz="2400" b="1">
                 <a:latin typeface="FZKai-Z03"/>
               </a:rPr>
               <a:t>诗篇第 136 章（1-9,23-26）</a:t>
@@ -13016,7 +13016,7 @@
               </a:defRPr>
             </a:pPr>
             <a:r>
-              <a:rPr sz="6600" b="1">
+              <a:rPr lang="zh-CN" sz="6600" b="1">
                 <a:latin typeface="FZKai-Z03"/>
               </a:rPr>
               <a:t>宣信</a:t>
@@ -13038,7 +13038,7 @@
               </a:defRPr>
             </a:pPr>
             <a:r>
-              <a:rPr sz="6600" b="1">
+              <a:rPr lang="zh-CN" sz="6600" b="1">
                 <a:latin typeface="FZKai-Z03"/>
               </a:rPr>
               <a:t>无价至宝</a:t>
@@ -13060,7 +13060,7 @@
               </a:defRPr>
             </a:pPr>
             <a:r>
-              <a:rPr sz="6600" b="1">
+              <a:rPr lang="zh-CN" sz="6600" b="1">
                 <a:latin typeface="FZKai-Z03"/>
               </a:rPr>
               <a:t>有一道河</a:t>
@@ -13105,7 +13105,7 @@
               </a:defRPr>
             </a:pPr>
             <a:r>
-              <a:rPr sz="4000" b="1">
+              <a:rPr lang="zh-CN" sz="4000" b="1">
                 <a:latin typeface="FZKai-Z03"/>
               </a:rPr>
               <a:t>诗歌赞美</a:t>
@@ -13168,7 +13168,7 @@
               </a:defRPr>
             </a:pPr>
             <a:r>
-              <a:rPr sz="8000" b="0">
+              <a:rPr lang="zh-CN" sz="8000" b="0">
                 <a:latin typeface="FZZhunYuan-M02"/>
               </a:rPr>
               <a:t>宣信</a:t>
@@ -13213,7 +13213,7 @@
               </a:defRPr>
             </a:pPr>
             <a:r>
-              <a:rPr sz="4000" b="0">
+              <a:rPr lang="zh-CN" sz="4000" b="0">
                 <a:latin typeface="FZZhunYuan-M02"/>
               </a:rPr>
               <a:t>新心音乐事工《敬拜权能主》</a:t>
@@ -13276,7 +13276,7 @@
               </a:defRPr>
             </a:pPr>
             <a:r>
-              <a:rPr sz="4800" b="0">
+              <a:rPr lang="zh-CN" sz="4800" b="0">
                 <a:latin typeface="FZZhunYuan-M02"/>
               </a:rPr>
               <a:t>我相信上帝　全能的圣天父</a:t>
@@ -13298,7 +13298,7 @@
               </a:defRPr>
             </a:pPr>
             <a:r>
-              <a:rPr sz="4800" b="0">
+              <a:rPr lang="zh-CN" sz="4800" b="0">
                 <a:latin typeface="FZZhunYuan-M02"/>
               </a:rPr>
               <a:t>我相信圣子耶稣基督</a:t>
@@ -13320,7 +13320,7 @@
               </a:defRPr>
             </a:pPr>
             <a:r>
-              <a:rPr sz="4800" b="0">
+              <a:rPr lang="zh-CN" sz="4800" b="0">
                 <a:latin typeface="FZZhunYuan-M02"/>
               </a:rPr>
               <a:t>我相信圣灵　永远同在保护</a:t>
@@ -13342,7 +13342,7 @@
               </a:defRPr>
             </a:pPr>
             <a:r>
-              <a:rPr sz="4800" b="0">
+              <a:rPr lang="zh-CN" sz="4800" b="0">
                 <a:latin typeface="FZZhunYuan-M02"/>
               </a:rPr>
               <a:t>三一真神我们敬拜俯伏</a:t>
@@ -13387,7 +13387,7 @@
               </a:defRPr>
             </a:pPr>
             <a:r>
-              <a:rPr sz="2400" b="0">
+              <a:rPr lang="zh-CN" sz="2400" b="0">
                 <a:latin typeface="FZKai-Z03"/>
               </a:rPr>
               <a:t>宣信 1/9</a:t>
@@ -13450,7 +13450,7 @@
               </a:defRPr>
             </a:pPr>
             <a:r>
-              <a:rPr sz="4400" b="1">
+              <a:rPr lang="zh-CN" sz="4400" b="1">
                 <a:latin typeface="FZKai-Z03"/>
               </a:rPr>
               <a:t>为中国及其他国家的政府领导人祷告，求主赐给他们公正和智慧，让他们能够管理好国家的事务，并保障人民的权益。走在　神的心意里面。</a:t>
@@ -13495,7 +13495,7 @@
               </a:defRPr>
             </a:pPr>
             <a:r>
-              <a:rPr sz="2400" b="1">
+              <a:rPr lang="zh-CN" sz="2400" b="1">
                 <a:latin typeface="FZKai-Z03"/>
               </a:rPr>
               <a:t>代祷事项</a:t>
@@ -13558,7 +13558,7 @@
               </a:defRPr>
             </a:pPr>
             <a:r>
-              <a:rPr sz="4800" b="0">
+              <a:rPr lang="zh-CN" sz="4800" b="0">
                 <a:latin typeface="FZZhunYuan-M02"/>
               </a:rPr>
               <a:t>是谁　铺张宇宙万物</a:t>
@@ -13580,7 +13580,7 @@
               </a:defRPr>
             </a:pPr>
             <a:r>
-              <a:rPr sz="4800" b="0">
+              <a:rPr lang="zh-CN" sz="4800" b="0">
                 <a:latin typeface="FZZhunYuan-M02"/>
               </a:rPr>
               <a:t>点燃星辰无数　照亮我道路</a:t>
@@ -13602,7 +13602,7 @@
               </a:defRPr>
             </a:pPr>
             <a:r>
-              <a:rPr sz="4800" b="0">
+              <a:rPr lang="zh-CN" sz="4800" b="0">
                 <a:latin typeface="FZZhunYuan-M02"/>
               </a:rPr>
               <a:t>是谁　护理山川大海</a:t>
@@ -13624,7 +13624,7 @@
               </a:defRPr>
             </a:pPr>
             <a:r>
-              <a:rPr sz="4800" b="0">
+              <a:rPr lang="zh-CN" sz="4800" b="0">
                 <a:latin typeface="FZZhunYuan-M02"/>
               </a:rPr>
               <a:t>走兽与飞鸟祂一一看顾</a:t>
@@ -13669,7 +13669,7 @@
               </a:defRPr>
             </a:pPr>
             <a:r>
-              <a:rPr sz="2400" b="0">
+              <a:rPr lang="zh-CN" sz="2400" b="0">
                 <a:latin typeface="FZKai-Z03"/>
               </a:rPr>
               <a:t>宣信 2/9</a:t>
@@ -13732,7 +13732,7 @@
               </a:defRPr>
             </a:pPr>
             <a:r>
-              <a:rPr sz="4800" b="0">
+              <a:rPr lang="zh-CN" sz="4800" b="0">
                 <a:latin typeface="FZZhunYuan-M02"/>
               </a:rPr>
               <a:t>我相信上帝　全能的圣天父</a:t>
@@ -13754,7 +13754,7 @@
               </a:defRPr>
             </a:pPr>
             <a:r>
-              <a:rPr sz="4800" b="0">
+              <a:rPr lang="zh-CN" sz="4800" b="0">
                 <a:latin typeface="FZZhunYuan-M02"/>
               </a:rPr>
               <a:t>我相信圣子耶稣基督</a:t>
@@ -13776,7 +13776,7 @@
               </a:defRPr>
             </a:pPr>
             <a:r>
-              <a:rPr sz="4800" b="0">
+              <a:rPr lang="zh-CN" sz="4800" b="0">
                 <a:latin typeface="FZZhunYuan-M02"/>
               </a:rPr>
               <a:t>我相信圣灵　永远同在保护</a:t>
@@ -13798,7 +13798,7 @@
               </a:defRPr>
             </a:pPr>
             <a:r>
-              <a:rPr sz="4800" b="0">
+              <a:rPr lang="zh-CN" sz="4800" b="0">
                 <a:latin typeface="FZZhunYuan-M02"/>
               </a:rPr>
               <a:t>三一真神我们敬拜俯伏</a:t>
@@ -13843,7 +13843,7 @@
               </a:defRPr>
             </a:pPr>
             <a:r>
-              <a:rPr sz="2400" b="0">
+              <a:rPr lang="zh-CN" sz="2400" b="0">
                 <a:latin typeface="FZKai-Z03"/>
               </a:rPr>
               <a:t>宣信 3/9</a:t>
@@ -13906,7 +13906,7 @@
               </a:defRPr>
             </a:pPr>
             <a:r>
-              <a:rPr sz="4800" b="0">
+              <a:rPr lang="zh-CN" sz="4800" b="0">
                 <a:latin typeface="FZZhunYuan-M02"/>
               </a:rPr>
               <a:t>是谁　离开荣耀宝座</a:t>
@@ -13928,7 +13928,7 @@
               </a:defRPr>
             </a:pPr>
             <a:r>
-              <a:rPr sz="4800" b="0">
+              <a:rPr lang="zh-CN" sz="4800" b="0">
                 <a:latin typeface="FZZhunYuan-M02"/>
               </a:rPr>
               <a:t>降生成为人子走十架的路</a:t>
@@ -13950,7 +13950,7 @@
               </a:defRPr>
             </a:pPr>
             <a:r>
-              <a:rPr sz="4800" b="0">
+              <a:rPr lang="zh-CN" sz="4800" b="0">
                 <a:latin typeface="FZZhunYuan-M02"/>
               </a:rPr>
               <a:t>是谁　担当我们罪愆</a:t>
@@ -13972,7 +13972,7 @@
               </a:defRPr>
             </a:pPr>
             <a:r>
-              <a:rPr sz="4800" b="0">
+              <a:rPr lang="zh-CN" sz="4800" b="0">
                 <a:latin typeface="FZZhunYuan-M02"/>
               </a:rPr>
               <a:t>死里复活是我们救赎主</a:t>
@@ -14017,7 +14017,7 @@
               </a:defRPr>
             </a:pPr>
             <a:r>
-              <a:rPr sz="2400" b="0">
+              <a:rPr lang="zh-CN" sz="2400" b="0">
                 <a:latin typeface="FZKai-Z03"/>
               </a:rPr>
               <a:t>宣信 4/9</a:t>
@@ -14080,7 +14080,7 @@
               </a:defRPr>
             </a:pPr>
             <a:r>
-              <a:rPr sz="4800" b="0">
+              <a:rPr lang="zh-CN" sz="4800" b="0">
                 <a:latin typeface="FZZhunYuan-M02"/>
               </a:rPr>
               <a:t>我相信上帝　全能的圣天父</a:t>
@@ -14102,7 +14102,7 @@
               </a:defRPr>
             </a:pPr>
             <a:r>
-              <a:rPr sz="4800" b="0">
+              <a:rPr lang="zh-CN" sz="4800" b="0">
                 <a:latin typeface="FZZhunYuan-M02"/>
               </a:rPr>
               <a:t>我相信圣子耶稣基督</a:t>
@@ -14124,7 +14124,7 @@
               </a:defRPr>
             </a:pPr>
             <a:r>
-              <a:rPr sz="4800" b="0">
+              <a:rPr lang="zh-CN" sz="4800" b="0">
                 <a:latin typeface="FZZhunYuan-M02"/>
               </a:rPr>
               <a:t>我相信圣灵　永远同在保护</a:t>
@@ -14146,7 +14146,7 @@
               </a:defRPr>
             </a:pPr>
             <a:r>
-              <a:rPr sz="4800" b="0">
+              <a:rPr lang="zh-CN" sz="4800" b="0">
                 <a:latin typeface="FZZhunYuan-M02"/>
               </a:rPr>
               <a:t>三一真神我们敬拜俯伏</a:t>
@@ -14191,7 +14191,7 @@
               </a:defRPr>
             </a:pPr>
             <a:r>
-              <a:rPr sz="2400" b="0">
+              <a:rPr lang="zh-CN" sz="2400" b="0">
                 <a:latin typeface="FZKai-Z03"/>
               </a:rPr>
               <a:t>宣信 5/9</a:t>
@@ -14254,7 +14254,7 @@
               </a:defRPr>
             </a:pPr>
             <a:r>
-              <a:rPr sz="4800" b="0">
+              <a:rPr lang="zh-CN" sz="4800" b="0">
                 <a:latin typeface="FZZhunYuan-M02"/>
               </a:rPr>
               <a:t>是谁　住在我们心里</a:t>
@@ -14276,7 +14276,7 @@
               </a:defRPr>
             </a:pPr>
             <a:r>
-              <a:rPr sz="4800" b="0">
+              <a:rPr lang="zh-CN" sz="4800" b="0">
                 <a:latin typeface="FZZhunYuan-M02"/>
               </a:rPr>
               <a:t>更新引导证明我是神儿女</a:t>
@@ -14298,7 +14298,7 @@
               </a:defRPr>
             </a:pPr>
             <a:r>
-              <a:rPr sz="4800" b="0">
+              <a:rPr lang="zh-CN" sz="4800" b="0">
                 <a:latin typeface="FZZhunYuan-M02"/>
               </a:rPr>
               <a:t>是谁　为我叹息祈求</a:t>
@@ -14320,7 +14320,7 @@
               </a:defRPr>
             </a:pPr>
             <a:r>
-              <a:rPr sz="4800" b="0">
+              <a:rPr lang="zh-CN" sz="4800" b="0">
                 <a:latin typeface="FZZhunYuan-M02"/>
               </a:rPr>
               <a:t>改造我生命更像主耶稣</a:t>
@@ -14365,7 +14365,7 @@
               </a:defRPr>
             </a:pPr>
             <a:r>
-              <a:rPr sz="2400" b="0">
+              <a:rPr lang="zh-CN" sz="2400" b="0">
                 <a:latin typeface="FZKai-Z03"/>
               </a:rPr>
               <a:t>宣信 6/9</a:t>
@@ -14428,7 +14428,7 @@
               </a:defRPr>
             </a:pPr>
             <a:r>
-              <a:rPr sz="4800" b="0">
+              <a:rPr lang="zh-CN" sz="4800" b="0">
                 <a:latin typeface="FZZhunYuan-M02"/>
               </a:rPr>
               <a:t>我相信上帝　全能的圣天父</a:t>
@@ -14450,7 +14450,7 @@
               </a:defRPr>
             </a:pPr>
             <a:r>
-              <a:rPr sz="4800" b="0">
+              <a:rPr lang="zh-CN" sz="4800" b="0">
                 <a:latin typeface="FZZhunYuan-M02"/>
               </a:rPr>
               <a:t>我相信圣子耶稣基督</a:t>
@@ -14472,7 +14472,7 @@
               </a:defRPr>
             </a:pPr>
             <a:r>
-              <a:rPr sz="4800" b="0">
+              <a:rPr lang="zh-CN" sz="4800" b="0">
                 <a:latin typeface="FZZhunYuan-M02"/>
               </a:rPr>
               <a:t>我相信圣灵　永远同在保护</a:t>
@@ -14494,7 +14494,7 @@
               </a:defRPr>
             </a:pPr>
             <a:r>
-              <a:rPr sz="4800" b="0">
+              <a:rPr lang="zh-CN" sz="4800" b="0">
                 <a:latin typeface="FZZhunYuan-M02"/>
               </a:rPr>
               <a:t>三一真神我们敬拜俯伏</a:t>
@@ -14539,7 +14539,7 @@
               </a:defRPr>
             </a:pPr>
             <a:r>
-              <a:rPr sz="2400" b="0">
+              <a:rPr lang="zh-CN" sz="2400" b="0">
                 <a:latin typeface="FZKai-Z03"/>
               </a:rPr>
               <a:t>宣信 7/9</a:t>
@@ -14602,7 +14602,7 @@
               </a:defRPr>
             </a:pPr>
             <a:r>
-              <a:rPr sz="4800" b="0">
+              <a:rPr lang="zh-CN" sz="4800" b="0">
                 <a:latin typeface="FZZhunYuan-M02"/>
               </a:rPr>
               <a:t>生命中的幽谷　生活中的痛苦</a:t>
@@ -14624,7 +14624,7 @@
               </a:defRPr>
             </a:pPr>
             <a:r>
-              <a:rPr sz="4800" b="0">
+              <a:rPr lang="zh-CN" sz="4800" b="0">
                 <a:latin typeface="FZZhunYuan-M02"/>
               </a:rPr>
               <a:t>祢必牵我手与我同渡</a:t>
@@ -14646,7 +14646,7 @@
               </a:defRPr>
             </a:pPr>
             <a:r>
-              <a:rPr sz="4800" b="0">
+              <a:rPr lang="zh-CN" sz="4800" b="0">
                 <a:latin typeface="FZZhunYuan-M02"/>
               </a:rPr>
               <a:t>试探中的挣扎　罪恶中的枷锁</a:t>
@@ -14668,7 +14668,7 @@
               </a:defRPr>
             </a:pPr>
             <a:r>
-              <a:rPr sz="4800" b="0">
+              <a:rPr lang="zh-CN" sz="4800" b="0">
                 <a:latin typeface="FZZhunYuan-M02"/>
               </a:rPr>
               <a:t>祢的恩典使我能胜过</a:t>
@@ -14713,7 +14713,7 @@
               </a:defRPr>
             </a:pPr>
             <a:r>
-              <a:rPr sz="2400" b="0">
+              <a:rPr lang="zh-CN" sz="2400" b="0">
                 <a:latin typeface="FZKai-Z03"/>
               </a:rPr>
               <a:t>宣信 8/9</a:t>
@@ -14776,7 +14776,7 @@
               </a:defRPr>
             </a:pPr>
             <a:r>
-              <a:rPr sz="4800" b="0">
+              <a:rPr lang="zh-CN" sz="4800" b="0">
                 <a:latin typeface="FZZhunYuan-M02"/>
               </a:rPr>
               <a:t>我相信上帝　全能的圣天父</a:t>
@@ -14798,7 +14798,7 @@
               </a:defRPr>
             </a:pPr>
             <a:r>
-              <a:rPr sz="4800" b="0">
+              <a:rPr lang="zh-CN" sz="4800" b="0">
                 <a:latin typeface="FZZhunYuan-M02"/>
               </a:rPr>
               <a:t>我相信圣子耶稣基督</a:t>
@@ -14820,7 +14820,7 @@
               </a:defRPr>
             </a:pPr>
             <a:r>
-              <a:rPr sz="4800" b="0">
+              <a:rPr lang="zh-CN" sz="4800" b="0">
                 <a:latin typeface="FZZhunYuan-M02"/>
               </a:rPr>
               <a:t>我相信圣灵　永远同在保护</a:t>
@@ -14842,7 +14842,7 @@
               </a:defRPr>
             </a:pPr>
             <a:r>
-              <a:rPr sz="4800" b="0">
+              <a:rPr lang="zh-CN" sz="4800" b="0">
                 <a:latin typeface="FZZhunYuan-M02"/>
               </a:rPr>
               <a:t>三一真神我们敬拜俯伏</a:t>
@@ -14864,7 +14864,7 @@
               </a:defRPr>
             </a:pPr>
             <a:r>
-              <a:rPr sz="4800" b="0">
+              <a:rPr lang="zh-CN" sz="4800" b="0">
                 <a:latin typeface="FZZhunYuan-M02"/>
               </a:rPr>
               <a:t>三一真神我们敬拜俯伏</a:t>
@@ -14909,7 +14909,7 @@
               </a:defRPr>
             </a:pPr>
             <a:r>
-              <a:rPr sz="2400" b="0">
+              <a:rPr lang="zh-CN" sz="2400" b="0">
                 <a:latin typeface="FZKai-Z03"/>
               </a:rPr>
               <a:t>宣信 9/9</a:t>
@@ -14990,7 +14990,7 @@
               </a:defRPr>
             </a:pPr>
             <a:r>
-              <a:rPr sz="8000" b="0">
+              <a:rPr lang="zh-CN" sz="8000" b="0">
                 <a:latin typeface="FZZhunYuan-M02"/>
               </a:rPr>
               <a:t>无价至宝</a:t>
@@ -15035,7 +15035,7 @@
               </a:defRPr>
             </a:pPr>
             <a:r>
-              <a:rPr sz="4000" b="0">
+              <a:rPr lang="zh-CN" sz="4000" b="0">
                 <a:latin typeface="FZZhunYuan-M02"/>
               </a:rPr>
               <a:t>约书亚乐团《大卫帐幕的荣耀专辑 - 恢复荣耀》</a:t>
@@ -15098,7 +15098,7 @@
               </a:defRPr>
             </a:pPr>
             <a:r>
-              <a:rPr sz="4400" b="1">
+              <a:rPr lang="zh-CN" sz="4400" b="1">
                 <a:latin typeface="FZKai-Z03"/>
               </a:rPr>
               <a:t>为身体抱恙或年长的弟兄姊妹祷告，求主医治他们的创伤和疾病，赐给他们信心和安慰，经历主的恩典。</a:t>
@@ -15143,7 +15143,7 @@
               </a:defRPr>
             </a:pPr>
             <a:r>
-              <a:rPr sz="2400" b="1">
+              <a:rPr lang="zh-CN" sz="2400" b="1">
                 <a:latin typeface="FZKai-Z03"/>
               </a:rPr>
               <a:t>代祷事项</a:t>
@@ -15206,7 +15206,7 @@
               </a:defRPr>
             </a:pPr>
             <a:r>
-              <a:rPr sz="4800" b="0">
+              <a:rPr lang="zh-CN" sz="4800" b="0">
                 <a:latin typeface="FZZhunYuan-M02"/>
               </a:rPr>
               <a:t>我的名字刻划在你心中</a:t>
@@ -15228,7 +15228,7 @@
               </a:defRPr>
             </a:pPr>
             <a:r>
-              <a:rPr sz="4800" b="0">
+              <a:rPr lang="zh-CN" sz="4800" b="0">
                 <a:latin typeface="FZZhunYuan-M02"/>
               </a:rPr>
               <a:t>我的脸孔深映在你眼中</a:t>
@@ -15250,7 +15250,7 @@
               </a:defRPr>
             </a:pPr>
             <a:r>
-              <a:rPr sz="4800" b="0">
+              <a:rPr lang="zh-CN" sz="4800" b="0">
                 <a:latin typeface="FZZhunYuan-M02"/>
               </a:rPr>
               <a:t>不是因为我势力才能</a:t>
@@ -15272,7 +15272,7 @@
               </a:defRPr>
             </a:pPr>
             <a:r>
-              <a:rPr sz="4800" b="0">
+              <a:rPr lang="zh-CN" sz="4800" b="0">
                 <a:latin typeface="FZZhunYuan-M02"/>
               </a:rPr>
               <a:t>乃是因着你奇妙宽容恩典</a:t>
@@ -15317,7 +15317,7 @@
               </a:defRPr>
             </a:pPr>
             <a:r>
-              <a:rPr sz="2400" b="0">
+              <a:rPr lang="zh-CN" sz="2400" b="0">
                 <a:latin typeface="FZKai-Z03"/>
               </a:rPr>
               <a:t>无价至宝 1/9</a:t>
@@ -15380,7 +15380,7 @@
               </a:defRPr>
             </a:pPr>
             <a:r>
-              <a:rPr sz="4800" b="0">
+              <a:rPr lang="zh-CN" sz="4800" b="0">
                 <a:latin typeface="FZZhunYuan-M02"/>
               </a:rPr>
               <a:t>虽然有时我会跌倒软弱</a:t>
@@ -15402,7 +15402,7 @@
               </a:defRPr>
             </a:pPr>
             <a:r>
-              <a:rPr sz="4800" b="0">
+              <a:rPr lang="zh-CN" sz="4800" b="0">
                 <a:latin typeface="FZZhunYuan-M02"/>
               </a:rPr>
               <a:t>你却一直包容不放弃我</a:t>
@@ -15424,7 +15424,7 @@
               </a:defRPr>
             </a:pPr>
             <a:r>
-              <a:rPr sz="4800" b="0">
+              <a:rPr lang="zh-CN" sz="4800" b="0">
                 <a:latin typeface="FZZhunYuan-M02"/>
               </a:rPr>
               <a:t>用你慈爱紧紧的拥抱</a:t>
@@ -15446,7 +15446,7 @@
               </a:defRPr>
             </a:pPr>
             <a:r>
-              <a:rPr sz="4800" b="0">
+              <a:rPr lang="zh-CN" sz="4800" b="0">
                 <a:latin typeface="FZZhunYuan-M02"/>
               </a:rPr>
               <a:t>我赞美你宝贵奇妙大爱</a:t>
@@ -15491,7 +15491,7 @@
               </a:defRPr>
             </a:pPr>
             <a:r>
-              <a:rPr sz="2400" b="0">
+              <a:rPr lang="zh-CN" sz="2400" b="0">
                 <a:latin typeface="FZKai-Z03"/>
               </a:rPr>
               <a:t>无价至宝 2/9</a:t>
@@ -15554,7 +15554,7 @@
               </a:defRPr>
             </a:pPr>
             <a:r>
-              <a:rPr sz="4800" b="0">
+              <a:rPr lang="zh-CN" sz="4800" b="0">
                 <a:latin typeface="FZZhunYuan-M02"/>
               </a:rPr>
               <a:t>唯有你配得所有的赞美</a:t>
@@ -15576,7 +15576,7 @@
               </a:defRPr>
             </a:pPr>
             <a:r>
-              <a:rPr sz="4800" b="0">
+              <a:rPr lang="zh-CN" sz="4800" b="0">
                 <a:latin typeface="FZZhunYuan-M02"/>
               </a:rPr>
               <a:t>一切尊贵荣耀</a:t>
@@ -15598,7 +15598,7 @@
               </a:defRPr>
             </a:pPr>
             <a:r>
-              <a:rPr sz="4800" b="0">
+              <a:rPr lang="zh-CN" sz="4800" b="0">
                 <a:latin typeface="FZZhunYuan-M02"/>
               </a:rPr>
               <a:t>主你的十架是无价至宝</a:t>
@@ -15620,7 +15620,7 @@
               </a:defRPr>
             </a:pPr>
             <a:r>
-              <a:rPr sz="4800" b="0">
+              <a:rPr lang="zh-CN" sz="4800" b="0">
                 <a:latin typeface="FZZhunYuan-M02"/>
               </a:rPr>
               <a:t>你是我尊贵的主</a:t>
@@ -15665,7 +15665,7 @@
               </a:defRPr>
             </a:pPr>
             <a:r>
-              <a:rPr sz="2400" b="0">
+              <a:rPr lang="zh-CN" sz="2400" b="0">
                 <a:latin typeface="FZKai-Z03"/>
               </a:rPr>
               <a:t>无价至宝 3/9</a:t>
@@ -15728,7 +15728,7 @@
               </a:defRPr>
             </a:pPr>
             <a:r>
-              <a:rPr sz="4800" b="0">
+              <a:rPr lang="zh-CN" sz="4800" b="0">
                 <a:latin typeface="FZZhunYuan-M02"/>
               </a:rPr>
               <a:t>唯有你配得所有的赞美</a:t>
@@ -15750,7 +15750,7 @@
               </a:defRPr>
             </a:pPr>
             <a:r>
-              <a:rPr sz="4800" b="0">
+              <a:rPr lang="zh-CN" sz="4800" b="0">
                 <a:latin typeface="FZZhunYuan-M02"/>
               </a:rPr>
               <a:t>一切尊贵荣耀</a:t>
@@ -15772,7 +15772,7 @@
               </a:defRPr>
             </a:pPr>
             <a:r>
-              <a:rPr sz="4800" b="0">
+              <a:rPr lang="zh-CN" sz="4800" b="0">
                 <a:latin typeface="FZZhunYuan-M02"/>
               </a:rPr>
               <a:t>主你的十架是无价至宝</a:t>
@@ -15794,7 +15794,7 @@
               </a:defRPr>
             </a:pPr>
             <a:r>
-              <a:rPr sz="4800" b="0">
+              <a:rPr lang="zh-CN" sz="4800" b="0">
                 <a:latin typeface="FZZhunYuan-M02"/>
               </a:rPr>
               <a:t>你是我尊贵的主　耶稣</a:t>
@@ -15839,7 +15839,7 @@
               </a:defRPr>
             </a:pPr>
             <a:r>
-              <a:rPr sz="2400" b="0">
+              <a:rPr lang="zh-CN" sz="2400" b="0">
                 <a:latin typeface="FZKai-Z03"/>
               </a:rPr>
               <a:t>无价至宝 4/9</a:t>
@@ -15902,7 +15902,7 @@
               </a:defRPr>
             </a:pPr>
             <a:r>
-              <a:rPr sz="4800" b="0">
+              <a:rPr lang="zh-CN" sz="4800" b="0">
                 <a:latin typeface="FZZhunYuan-M02"/>
               </a:rPr>
               <a:t>我的名字刻划在你心中</a:t>
@@ -15924,7 +15924,7 @@
               </a:defRPr>
             </a:pPr>
             <a:r>
-              <a:rPr sz="4800" b="0">
+              <a:rPr lang="zh-CN" sz="4800" b="0">
                 <a:latin typeface="FZZhunYuan-M02"/>
               </a:rPr>
               <a:t>我的脸孔深映在你眼中</a:t>
@@ -15946,7 +15946,7 @@
               </a:defRPr>
             </a:pPr>
             <a:r>
-              <a:rPr sz="4800" b="0">
+              <a:rPr lang="zh-CN" sz="4800" b="0">
                 <a:latin typeface="FZZhunYuan-M02"/>
               </a:rPr>
               <a:t>不是因为我势力才能</a:t>
@@ -15968,7 +15968,7 @@
               </a:defRPr>
             </a:pPr>
             <a:r>
-              <a:rPr sz="4800" b="0">
+              <a:rPr lang="zh-CN" sz="4800" b="0">
                 <a:latin typeface="FZZhunYuan-M02"/>
               </a:rPr>
               <a:t>乃是因着你奇妙宽容恩典</a:t>
@@ -16013,7 +16013,7 @@
               </a:defRPr>
             </a:pPr>
             <a:r>
-              <a:rPr sz="2400" b="0">
+              <a:rPr lang="zh-CN" sz="2400" b="0">
                 <a:latin typeface="FZKai-Z03"/>
               </a:rPr>
               <a:t>无价至宝 5/9</a:t>
@@ -16076,7 +16076,7 @@
               </a:defRPr>
             </a:pPr>
             <a:r>
-              <a:rPr sz="4800" b="0">
+              <a:rPr lang="zh-CN" sz="4800" b="0">
                 <a:latin typeface="FZZhunYuan-M02"/>
               </a:rPr>
               <a:t>虽然有时我会跌倒软弱</a:t>
@@ -16098,7 +16098,7 @@
               </a:defRPr>
             </a:pPr>
             <a:r>
-              <a:rPr sz="4800" b="0">
+              <a:rPr lang="zh-CN" sz="4800" b="0">
                 <a:latin typeface="FZZhunYuan-M02"/>
               </a:rPr>
               <a:t>你却一直包容不放弃我</a:t>
@@ -16120,7 +16120,7 @@
               </a:defRPr>
             </a:pPr>
             <a:r>
-              <a:rPr sz="4800" b="0">
+              <a:rPr lang="zh-CN" sz="4800" b="0">
                 <a:latin typeface="FZZhunYuan-M02"/>
               </a:rPr>
               <a:t>用你慈爱紧紧的拥抱</a:t>
@@ -16142,7 +16142,7 @@
               </a:defRPr>
             </a:pPr>
             <a:r>
-              <a:rPr sz="4800" b="0">
+              <a:rPr lang="zh-CN" sz="4800" b="0">
                 <a:latin typeface="FZZhunYuan-M02"/>
               </a:rPr>
               <a:t>我赞美你宝贵奇妙大爱</a:t>
@@ -16187,7 +16187,7 @@
               </a:defRPr>
             </a:pPr>
             <a:r>
-              <a:rPr sz="2400" b="0">
+              <a:rPr lang="zh-CN" sz="2400" b="0">
                 <a:latin typeface="FZKai-Z03"/>
               </a:rPr>
               <a:t>无价至宝 6/9</a:t>
@@ -16250,7 +16250,7 @@
               </a:defRPr>
             </a:pPr>
             <a:r>
-              <a:rPr sz="4800" b="0">
+              <a:rPr lang="zh-CN" sz="4800" b="0">
                 <a:latin typeface="FZZhunYuan-M02"/>
               </a:rPr>
               <a:t>唯有你配得所有的赞美</a:t>
@@ -16272,7 +16272,7 @@
               </a:defRPr>
             </a:pPr>
             <a:r>
-              <a:rPr sz="4800" b="0">
+              <a:rPr lang="zh-CN" sz="4800" b="0">
                 <a:latin typeface="FZZhunYuan-M02"/>
               </a:rPr>
               <a:t>一切尊贵荣耀</a:t>
@@ -16294,7 +16294,7 @@
               </a:defRPr>
             </a:pPr>
             <a:r>
-              <a:rPr sz="4800" b="0">
+              <a:rPr lang="zh-CN" sz="4800" b="0">
                 <a:latin typeface="FZZhunYuan-M02"/>
               </a:rPr>
               <a:t>主你的十架是无价至宝</a:t>
@@ -16316,7 +16316,7 @@
               </a:defRPr>
             </a:pPr>
             <a:r>
-              <a:rPr sz="4800" b="0">
+              <a:rPr lang="zh-CN" sz="4800" b="0">
                 <a:latin typeface="FZZhunYuan-M02"/>
               </a:rPr>
               <a:t>你是我尊贵的主</a:t>
@@ -16361,7 +16361,7 @@
               </a:defRPr>
             </a:pPr>
             <a:r>
-              <a:rPr sz="2400" b="0">
+              <a:rPr lang="zh-CN" sz="2400" b="0">
                 <a:latin typeface="FZKai-Z03"/>
               </a:rPr>
               <a:t>无价至宝 7/9</a:t>
@@ -16424,7 +16424,7 @@
               </a:defRPr>
             </a:pPr>
             <a:r>
-              <a:rPr sz="4800" b="0">
+              <a:rPr lang="zh-CN" sz="4800" b="0">
                 <a:latin typeface="FZZhunYuan-M02"/>
               </a:rPr>
               <a:t>唯有你配得所有的赞美</a:t>
@@ -16446,7 +16446,7 @@
               </a:defRPr>
             </a:pPr>
             <a:r>
-              <a:rPr sz="4800" b="0">
+              <a:rPr lang="zh-CN" sz="4800" b="0">
                 <a:latin typeface="FZZhunYuan-M02"/>
               </a:rPr>
               <a:t>一切尊贵荣耀</a:t>
@@ -16468,7 +16468,7 @@
               </a:defRPr>
             </a:pPr>
             <a:r>
-              <a:rPr sz="4800" b="0">
+              <a:rPr lang="zh-CN" sz="4800" b="0">
                 <a:latin typeface="FZZhunYuan-M02"/>
               </a:rPr>
               <a:t>主你的十架是无价至宝</a:t>
@@ -16490,7 +16490,7 @@
               </a:defRPr>
             </a:pPr>
             <a:r>
-              <a:rPr sz="4800" b="0">
+              <a:rPr lang="zh-CN" sz="4800" b="0">
                 <a:latin typeface="FZZhunYuan-M02"/>
               </a:rPr>
               <a:t>你是我尊贵的主</a:t>
@@ -16535,7 +16535,7 @@
               </a:defRPr>
             </a:pPr>
             <a:r>
-              <a:rPr sz="2400" b="0">
+              <a:rPr lang="zh-CN" sz="2400" b="0">
                 <a:latin typeface="FZKai-Z03"/>
               </a:rPr>
               <a:t>无价至宝 8/9</a:t>
@@ -16598,7 +16598,7 @@
               </a:defRPr>
             </a:pPr>
             <a:r>
-              <a:rPr sz="4800" b="0">
+              <a:rPr lang="zh-CN" sz="4800" b="0">
                 <a:latin typeface="FZZhunYuan-M02"/>
               </a:rPr>
               <a:t>唯有你配得所有的赞美</a:t>
@@ -16620,7 +16620,7 @@
               </a:defRPr>
             </a:pPr>
             <a:r>
-              <a:rPr sz="4800" b="0">
+              <a:rPr lang="zh-CN" sz="4800" b="0">
                 <a:latin typeface="FZZhunYuan-M02"/>
               </a:rPr>
               <a:t>一切尊贵荣耀</a:t>
@@ -16642,7 +16642,7 @@
               </a:defRPr>
             </a:pPr>
             <a:r>
-              <a:rPr sz="4800" b="0">
+              <a:rPr lang="zh-CN" sz="4800" b="0">
                 <a:latin typeface="FZZhunYuan-M02"/>
               </a:rPr>
               <a:t>主你的十架是无价至宝</a:t>
@@ -16664,7 +16664,7 @@
               </a:defRPr>
             </a:pPr>
             <a:r>
-              <a:rPr sz="4800" b="0">
+              <a:rPr lang="zh-CN" sz="4800" b="0">
                 <a:latin typeface="FZZhunYuan-M02"/>
               </a:rPr>
               <a:t>你是我尊贵的主　耶稣</a:t>
@@ -16709,7 +16709,7 @@
               </a:defRPr>
             </a:pPr>
             <a:r>
-              <a:rPr sz="2400" b="0">
+              <a:rPr lang="zh-CN" sz="2400" b="0">
                 <a:latin typeface="FZKai-Z03"/>
               </a:rPr>
               <a:t>无价至宝 9/9</a:t>
@@ -16790,7 +16790,7 @@
               </a:defRPr>
             </a:pPr>
             <a:r>
-              <a:rPr sz="4400" b="1">
+              <a:rPr lang="zh-CN" sz="4400" b="1">
                 <a:latin typeface="FZKai-Z03"/>
               </a:rPr>
               <a:t>感恩　神的恩典让越来越多的华人来到汉堡，为教会的成长以及在生命中更加看重耶稣的恩典和更多的经历他毫无保留长阔高深的爱而求告　神。</a:t>
@@ -16835,7 +16835,7 @@
               </a:defRPr>
             </a:pPr>
             <a:r>
-              <a:rPr sz="2400" b="1">
+              <a:rPr lang="zh-CN" sz="2400" b="1">
                 <a:latin typeface="FZKai-Z03"/>
               </a:rPr>
               <a:t>代祷事项</a:t>
@@ -16898,7 +16898,7 @@
               </a:defRPr>
             </a:pPr>
             <a:r>
-              <a:rPr sz="8000" b="0">
+              <a:rPr lang="zh-CN" sz="8000" b="0">
                 <a:latin typeface="FZZhunYuan-M02"/>
               </a:rPr>
               <a:t>有一道河</a:t>
@@ -16943,7 +16943,7 @@
               </a:defRPr>
             </a:pPr>
             <a:r>
-              <a:rPr sz="4000" b="0">
+              <a:rPr lang="zh-CN" sz="4000" b="0">
                 <a:latin typeface="FZZhunYuan-M02"/>
               </a:rPr>
               <a:t>小羊诗歌《一粒麦子》</a:t>
@@ -17006,7 +17006,7 @@
               </a:defRPr>
             </a:pPr>
             <a:r>
-              <a:rPr sz="4800" b="0">
+              <a:rPr lang="zh-CN" sz="4800" b="0">
                 <a:latin typeface="FZZhunYuan-M02"/>
               </a:rPr>
               <a:t>有一道河　这河的分汊</a:t>
@@ -17028,7 +17028,7 @@
               </a:defRPr>
             </a:pPr>
             <a:r>
-              <a:rPr sz="4800" b="0">
+              <a:rPr lang="zh-CN" sz="4800" b="0">
                 <a:latin typeface="FZZhunYuan-M02"/>
               </a:rPr>
               <a:t>使神的城　欢喜</a:t>
@@ -17050,7 +17050,7 @@
               </a:defRPr>
             </a:pPr>
             <a:r>
-              <a:rPr sz="4800" b="0">
+              <a:rPr lang="zh-CN" sz="4800" b="0">
                 <a:latin typeface="FZZhunYuan-M02"/>
               </a:rPr>
               <a:t>有一道河　从宝座流出</a:t>
@@ -17072,7 +17072,7 @@
               </a:defRPr>
             </a:pPr>
             <a:r>
-              <a:rPr sz="4800" b="0">
+              <a:rPr lang="zh-CN" sz="4800" b="0">
                 <a:latin typeface="FZZhunYuan-M02"/>
               </a:rPr>
               <a:t>带来医治生命</a:t>
@@ -17117,7 +17117,7 @@
               </a:defRPr>
             </a:pPr>
             <a:r>
-              <a:rPr sz="2400" b="0">
+              <a:rPr lang="zh-CN" sz="2400" b="0">
                 <a:latin typeface="FZKai-Z03"/>
               </a:rPr>
               <a:t>有一道河 1/15</a:t>
@@ -17180,7 +17180,7 @@
               </a:defRPr>
             </a:pPr>
             <a:r>
-              <a:rPr sz="4800" b="0">
+              <a:rPr lang="zh-CN" sz="4800" b="0">
                 <a:latin typeface="FZZhunYuan-M02"/>
               </a:rPr>
               <a:t>这一道河　它所到之处</a:t>
@@ -17202,7 +17202,7 @@
               </a:defRPr>
             </a:pPr>
             <a:r>
-              <a:rPr sz="4800" b="0">
+              <a:rPr lang="zh-CN" sz="4800" b="0">
                 <a:latin typeface="FZZhunYuan-M02"/>
               </a:rPr>
               <a:t>万物生生不息</a:t>
@@ -17224,7 +17224,7 @@
               </a:defRPr>
             </a:pPr>
             <a:r>
-              <a:rPr sz="4800" b="0">
+              <a:rPr lang="zh-CN" sz="4800" b="0">
                 <a:latin typeface="FZZhunYuan-M02"/>
               </a:rPr>
               <a:t>神的江河　就在这里</a:t>
@@ -17246,7 +17246,7 @@
               </a:defRPr>
             </a:pPr>
             <a:r>
-              <a:rPr sz="4800" b="0">
+              <a:rPr lang="zh-CN" sz="4800" b="0">
                 <a:latin typeface="FZZhunYuan-M02"/>
               </a:rPr>
               <a:t>赐下生命能力</a:t>
@@ -17291,7 +17291,7 @@
               </a:defRPr>
             </a:pPr>
             <a:r>
-              <a:rPr sz="2400" b="0">
+              <a:rPr lang="zh-CN" sz="2400" b="0">
                 <a:latin typeface="FZKai-Z03"/>
               </a:rPr>
               <a:t>有一道河 2/15</a:t>
@@ -17354,7 +17354,7 @@
               </a:defRPr>
             </a:pPr>
             <a:r>
-              <a:rPr sz="4800" b="0">
+              <a:rPr lang="zh-CN" sz="4800" b="0">
                 <a:latin typeface="FZZhunYuan-M02"/>
               </a:rPr>
               <a:t>能使瞎眼重见光明</a:t>
@@ -17376,7 +17376,7 @@
               </a:defRPr>
             </a:pPr>
             <a:r>
-              <a:rPr sz="4800" b="0">
+              <a:rPr lang="zh-CN" sz="4800" b="0">
                 <a:latin typeface="FZZhunYuan-M02"/>
               </a:rPr>
               <a:t>聋子听主声音</a:t>
@@ -17398,7 +17398,7 @@
               </a:defRPr>
             </a:pPr>
             <a:r>
-              <a:rPr sz="4800" b="0">
+              <a:rPr lang="zh-CN" sz="4800" b="0">
                 <a:latin typeface="FZZhunYuan-M02"/>
               </a:rPr>
               <a:t>瘸腿者起来行走</a:t>
@@ -17420,7 +17420,7 @@
               </a:defRPr>
             </a:pPr>
             <a:r>
-              <a:rPr sz="4800" b="0">
+              <a:rPr lang="zh-CN" sz="4800" b="0">
                 <a:latin typeface="FZZhunYuan-M02"/>
               </a:rPr>
               <a:t>受压制的得自由</a:t>
@@ -17465,7 +17465,7 @@
               </a:defRPr>
             </a:pPr>
             <a:r>
-              <a:rPr sz="2400" b="0">
+              <a:rPr lang="zh-CN" sz="2400" b="0">
                 <a:latin typeface="FZKai-Z03"/>
               </a:rPr>
               <a:t>有一道河 3/15</a:t>
@@ -17528,7 +17528,7 @@
               </a:defRPr>
             </a:pPr>
             <a:r>
-              <a:rPr sz="4800" b="0">
+              <a:rPr lang="zh-CN" sz="4800" b="0">
                 <a:latin typeface="FZZhunYuan-M02"/>
               </a:rPr>
               <a:t>主赐华冠代替灰尘</a:t>
@@ -17550,7 +17550,7 @@
               </a:defRPr>
             </a:pPr>
             <a:r>
-              <a:rPr sz="4800" b="0">
+              <a:rPr lang="zh-CN" sz="4800" b="0">
                 <a:latin typeface="FZZhunYuan-M02"/>
               </a:rPr>
               <a:t>喜乐油代替悲哀</a:t>
@@ -17572,7 +17572,7 @@
               </a:defRPr>
             </a:pPr>
             <a:r>
-              <a:rPr sz="4800" b="0">
+              <a:rPr lang="zh-CN" sz="4800" b="0">
                 <a:latin typeface="FZZhunYuan-M02"/>
               </a:rPr>
               <a:t>赞美衣代替忧伤的灵</a:t>
@@ -17594,7 +17594,7 @@
               </a:defRPr>
             </a:pPr>
             <a:r>
-              <a:rPr sz="4800" b="0">
+              <a:rPr lang="zh-CN" sz="4800" b="0">
                 <a:latin typeface="FZZhunYuan-M02"/>
               </a:rPr>
               <a:t>为荣耀神的名</a:t>
@@ -17639,7 +17639,7 @@
               </a:defRPr>
             </a:pPr>
             <a:r>
-              <a:rPr sz="2400" b="0">
+              <a:rPr lang="zh-CN" sz="2400" b="0">
                 <a:latin typeface="FZKai-Z03"/>
               </a:rPr>
               <a:t>有一道河 4/15</a:t>
@@ -17702,7 +17702,7 @@
               </a:defRPr>
             </a:pPr>
             <a:r>
-              <a:rPr sz="4800" b="0">
+              <a:rPr lang="zh-CN" sz="4800" b="0">
                 <a:latin typeface="FZZhunYuan-M02"/>
               </a:rPr>
               <a:t>有一道河　这河的分汊</a:t>
@@ -17724,7 +17724,7 @@
               </a:defRPr>
             </a:pPr>
             <a:r>
-              <a:rPr sz="4800" b="0">
+              <a:rPr lang="zh-CN" sz="4800" b="0">
                 <a:latin typeface="FZZhunYuan-M02"/>
               </a:rPr>
               <a:t>使神的城　欢喜</a:t>
@@ -17746,7 +17746,7 @@
               </a:defRPr>
             </a:pPr>
             <a:r>
-              <a:rPr sz="4800" b="0">
+              <a:rPr lang="zh-CN" sz="4800" b="0">
                 <a:latin typeface="FZZhunYuan-M02"/>
               </a:rPr>
               <a:t>有一道河　从宝座流出</a:t>
@@ -17768,7 +17768,7 @@
               </a:defRPr>
             </a:pPr>
             <a:r>
-              <a:rPr sz="4800" b="0">
+              <a:rPr lang="zh-CN" sz="4800" b="0">
                 <a:latin typeface="FZZhunYuan-M02"/>
               </a:rPr>
               <a:t>带来医治生命</a:t>
@@ -17813,7 +17813,7 @@
               </a:defRPr>
             </a:pPr>
             <a:r>
-              <a:rPr sz="2400" b="0">
+              <a:rPr lang="zh-CN" sz="2400" b="0">
                 <a:latin typeface="FZKai-Z03"/>
               </a:rPr>
               <a:t>有一道河 5/15</a:t>
@@ -17876,7 +17876,7 @@
               </a:defRPr>
             </a:pPr>
             <a:r>
-              <a:rPr sz="4800" b="0">
+              <a:rPr lang="zh-CN" sz="4800" b="0">
                 <a:latin typeface="FZZhunYuan-M02"/>
               </a:rPr>
               <a:t>这一道河　它所到之处</a:t>
@@ -17898,7 +17898,7 @@
               </a:defRPr>
             </a:pPr>
             <a:r>
-              <a:rPr sz="4800" b="0">
+              <a:rPr lang="zh-CN" sz="4800" b="0">
                 <a:latin typeface="FZZhunYuan-M02"/>
               </a:rPr>
               <a:t>万物生生不息</a:t>
@@ -17920,7 +17920,7 @@
               </a:defRPr>
             </a:pPr>
             <a:r>
-              <a:rPr sz="4800" b="0">
+              <a:rPr lang="zh-CN" sz="4800" b="0">
                 <a:latin typeface="FZZhunYuan-M02"/>
               </a:rPr>
               <a:t>神的江河　就在这里</a:t>
@@ -17942,7 +17942,7 @@
               </a:defRPr>
             </a:pPr>
             <a:r>
-              <a:rPr sz="4800" b="0">
+              <a:rPr lang="zh-CN" sz="4800" b="0">
                 <a:latin typeface="FZZhunYuan-M02"/>
               </a:rPr>
               <a:t>赐下生命能力</a:t>
@@ -17987,7 +17987,7 @@
               </a:defRPr>
             </a:pPr>
             <a:r>
-              <a:rPr sz="2400" b="0">
+              <a:rPr lang="zh-CN" sz="2400" b="0">
                 <a:latin typeface="FZKai-Z03"/>
               </a:rPr>
               <a:t>有一道河 6/15</a:t>
@@ -18050,7 +18050,7 @@
               </a:defRPr>
             </a:pPr>
             <a:r>
-              <a:rPr sz="4800" b="0">
+              <a:rPr lang="zh-CN" sz="4800" b="0">
                 <a:latin typeface="FZZhunYuan-M02"/>
               </a:rPr>
               <a:t>能使瞎眼重见光明</a:t>
@@ -18072,7 +18072,7 @@
               </a:defRPr>
             </a:pPr>
             <a:r>
-              <a:rPr sz="4800" b="0">
+              <a:rPr lang="zh-CN" sz="4800" b="0">
                 <a:latin typeface="FZZhunYuan-M02"/>
               </a:rPr>
               <a:t>聋子听主声音</a:t>
@@ -18094,7 +18094,7 @@
               </a:defRPr>
             </a:pPr>
             <a:r>
-              <a:rPr sz="4800" b="0">
+              <a:rPr lang="zh-CN" sz="4800" b="0">
                 <a:latin typeface="FZZhunYuan-M02"/>
               </a:rPr>
               <a:t>瘸腿者起来行走</a:t>
@@ -18116,7 +18116,7 @@
               </a:defRPr>
             </a:pPr>
             <a:r>
-              <a:rPr sz="4800" b="0">
+              <a:rPr lang="zh-CN" sz="4800" b="0">
                 <a:latin typeface="FZZhunYuan-M02"/>
               </a:rPr>
               <a:t>受压制的得自由</a:t>
@@ -18161,7 +18161,7 @@
               </a:defRPr>
             </a:pPr>
             <a:r>
-              <a:rPr sz="2400" b="0">
+              <a:rPr lang="zh-CN" sz="2400" b="0">
                 <a:latin typeface="FZKai-Z03"/>
               </a:rPr>
               <a:t>有一道河 7/15</a:t>
@@ -18224,7 +18224,7 @@
               </a:defRPr>
             </a:pPr>
             <a:r>
-              <a:rPr sz="4800" b="0">
+              <a:rPr lang="zh-CN" sz="4800" b="0">
                 <a:latin typeface="FZZhunYuan-M02"/>
               </a:rPr>
               <a:t>主赐华冠代替灰尘</a:t>
@@ -18246,7 +18246,7 @@
               </a:defRPr>
             </a:pPr>
             <a:r>
-              <a:rPr sz="4800" b="0">
+              <a:rPr lang="zh-CN" sz="4800" b="0">
                 <a:latin typeface="FZZhunYuan-M02"/>
               </a:rPr>
               <a:t>喜乐油代替悲哀</a:t>
@@ -18268,7 +18268,7 @@
               </a:defRPr>
             </a:pPr>
             <a:r>
-              <a:rPr sz="4800" b="0">
+              <a:rPr lang="zh-CN" sz="4800" b="0">
                 <a:latin typeface="FZZhunYuan-M02"/>
               </a:rPr>
               <a:t>赞美衣代替忧伤的灵</a:t>
@@ -18290,7 +18290,7 @@
               </a:defRPr>
             </a:pPr>
             <a:r>
-              <a:rPr sz="4800" b="0">
+              <a:rPr lang="zh-CN" sz="4800" b="0">
                 <a:latin typeface="FZZhunYuan-M02"/>
               </a:rPr>
               <a:t>为荣耀神的名</a:t>
@@ -18335,7 +18335,7 @@
               </a:defRPr>
             </a:pPr>
             <a:r>
-              <a:rPr sz="2400" b="0">
+              <a:rPr lang="zh-CN" sz="2400" b="0">
                 <a:latin typeface="FZKai-Z03"/>
               </a:rPr>
               <a:t>有一道河 8/15</a:t>
@@ -18398,7 +18398,7 @@
               </a:defRPr>
             </a:pPr>
             <a:r>
-              <a:rPr sz="4800" b="0">
+              <a:rPr lang="zh-CN" sz="4800" b="0">
                 <a:latin typeface="FZZhunYuan-M02"/>
               </a:rPr>
               <a:t>能使瞎眼重见光明</a:t>
@@ -18420,7 +18420,7 @@
               </a:defRPr>
             </a:pPr>
             <a:r>
-              <a:rPr sz="4800" b="0">
+              <a:rPr lang="zh-CN" sz="4800" b="0">
                 <a:latin typeface="FZZhunYuan-M02"/>
               </a:rPr>
               <a:t>聋子听主声音</a:t>
@@ -18442,7 +18442,7 @@
               </a:defRPr>
             </a:pPr>
             <a:r>
-              <a:rPr sz="4800" b="0">
+              <a:rPr lang="zh-CN" sz="4800" b="0">
                 <a:latin typeface="FZZhunYuan-M02"/>
               </a:rPr>
               <a:t>瘸腿者起来行走</a:t>
@@ -18464,7 +18464,7 @@
               </a:defRPr>
             </a:pPr>
             <a:r>
-              <a:rPr sz="4800" b="0">
+              <a:rPr lang="zh-CN" sz="4800" b="0">
                 <a:latin typeface="FZZhunYuan-M02"/>
               </a:rPr>
               <a:t>受压制的得自由</a:t>
@@ -18509,7 +18509,7 @@
               </a:defRPr>
             </a:pPr>
             <a:r>
-              <a:rPr sz="2400" b="0">
+              <a:rPr lang="zh-CN" sz="2400" b="0">
                 <a:latin typeface="FZKai-Z03"/>
               </a:rPr>
               <a:t>有一道河 9/15</a:t>
@@ -18572,7 +18572,7 @@
               </a:defRPr>
             </a:pPr>
             <a:r>
-              <a:rPr sz="4400" b="1">
+              <a:rPr lang="zh-CN" sz="4400" b="1">
                 <a:latin typeface="FZKai-Z03"/>
               </a:rPr>
               <a:t>感谢主，教会的少年人纷纷决志委身于基督，求主大大感动和引导他们的生命。为教育事工持续祷告，求主使用我们的主日学老师和学生，让他们从小就充满　神的话语，被圣灵引导，坚定走在合乎　神旨意的道路上。</a:t>
@@ -18617,7 +18617,7 @@
               </a:defRPr>
             </a:pPr>
             <a:r>
-              <a:rPr sz="2400" b="1">
+              <a:rPr lang="zh-CN" sz="2400" b="1">
                 <a:latin typeface="FZKai-Z03"/>
               </a:rPr>
               <a:t>代祷事项</a:t>
@@ -18680,7 +18680,7 @@
               </a:defRPr>
             </a:pPr>
             <a:r>
-              <a:rPr sz="4800" b="0">
+              <a:rPr lang="zh-CN" sz="4800" b="0">
                 <a:latin typeface="FZZhunYuan-M02"/>
               </a:rPr>
               <a:t>主赐华冠代替灰尘</a:t>
@@ -18702,7 +18702,7 @@
               </a:defRPr>
             </a:pPr>
             <a:r>
-              <a:rPr sz="4800" b="0">
+              <a:rPr lang="zh-CN" sz="4800" b="0">
                 <a:latin typeface="FZZhunYuan-M02"/>
               </a:rPr>
               <a:t>喜乐油代替悲哀</a:t>
@@ -18724,7 +18724,7 @@
               </a:defRPr>
             </a:pPr>
             <a:r>
-              <a:rPr sz="4800" b="0">
+              <a:rPr lang="zh-CN" sz="4800" b="0">
                 <a:latin typeface="FZZhunYuan-M02"/>
               </a:rPr>
               <a:t>赞美衣代替忧伤的灵</a:t>
@@ -18746,7 +18746,7 @@
               </a:defRPr>
             </a:pPr>
             <a:r>
-              <a:rPr sz="4800" b="0">
+              <a:rPr lang="zh-CN" sz="4800" b="0">
                 <a:latin typeface="FZZhunYuan-M02"/>
               </a:rPr>
               <a:t>为荣耀神的名</a:t>
@@ -18791,7 +18791,7 @@
               </a:defRPr>
             </a:pPr>
             <a:r>
-              <a:rPr sz="2400" b="0">
+              <a:rPr lang="zh-CN" sz="2400" b="0">
                 <a:latin typeface="FZKai-Z03"/>
               </a:rPr>
               <a:t>有一道河 10/15</a:t>
@@ -18854,7 +18854,7 @@
               </a:defRPr>
             </a:pPr>
             <a:r>
-              <a:rPr sz="4800" b="0">
+              <a:rPr lang="zh-CN" sz="4800" b="0">
                 <a:latin typeface="FZZhunYuan-M02"/>
               </a:rPr>
               <a:t>哦让瞎眼重见光明</a:t>
@@ -18876,7 +18876,7 @@
               </a:defRPr>
             </a:pPr>
             <a:r>
-              <a:rPr sz="4800" b="0">
+              <a:rPr lang="zh-CN" sz="4800" b="0">
                 <a:latin typeface="FZZhunYuan-M02"/>
               </a:rPr>
               <a:t>聋子听主声音</a:t>
@@ -18898,7 +18898,7 @@
               </a:defRPr>
             </a:pPr>
             <a:r>
-              <a:rPr sz="4800" b="0">
+              <a:rPr lang="zh-CN" sz="4800" b="0">
                 <a:latin typeface="FZZhunYuan-M02"/>
               </a:rPr>
               <a:t>瘸腿者起来行走</a:t>
@@ -18920,7 +18920,7 @@
               </a:defRPr>
             </a:pPr>
             <a:r>
-              <a:rPr sz="4800" b="0">
+              <a:rPr lang="zh-CN" sz="4800" b="0">
                 <a:latin typeface="FZZhunYuan-M02"/>
               </a:rPr>
               <a:t>受压制的得自由</a:t>
@@ -18965,7 +18965,7 @@
               </a:defRPr>
             </a:pPr>
             <a:r>
-              <a:rPr sz="2400" b="0">
+              <a:rPr lang="zh-CN" sz="2400" b="0">
                 <a:latin typeface="FZKai-Z03"/>
               </a:rPr>
               <a:t>有一道河 11/15</a:t>
@@ -19028,7 +19028,7 @@
               </a:defRPr>
             </a:pPr>
             <a:r>
-              <a:rPr sz="4800" b="0">
+              <a:rPr lang="zh-CN" sz="4800" b="0">
                 <a:latin typeface="FZZhunYuan-M02"/>
               </a:rPr>
               <a:t>主赐华冠代替灰尘</a:t>
@@ -19050,7 +19050,7 @@
               </a:defRPr>
             </a:pPr>
             <a:r>
-              <a:rPr sz="4800" b="0">
+              <a:rPr lang="zh-CN" sz="4800" b="0">
                 <a:latin typeface="FZZhunYuan-M02"/>
               </a:rPr>
               <a:t>喜乐油代替悲哀</a:t>
@@ -19072,7 +19072,7 @@
               </a:defRPr>
             </a:pPr>
             <a:r>
-              <a:rPr sz="4800" b="0">
+              <a:rPr lang="zh-CN" sz="4800" b="0">
                 <a:latin typeface="FZZhunYuan-M02"/>
               </a:rPr>
               <a:t>赞美衣代替忧伤的灵</a:t>
@@ -19094,7 +19094,7 @@
               </a:defRPr>
             </a:pPr>
             <a:r>
-              <a:rPr sz="4800" b="0">
+              <a:rPr lang="zh-CN" sz="4800" b="0">
                 <a:latin typeface="FZZhunYuan-M02"/>
               </a:rPr>
               <a:t>为荣耀神的名</a:t>
@@ -19139,7 +19139,7 @@
               </a:defRPr>
             </a:pPr>
             <a:r>
-              <a:rPr sz="2400" b="0">
+              <a:rPr lang="zh-CN" sz="2400" b="0">
                 <a:latin typeface="FZKai-Z03"/>
               </a:rPr>
               <a:t>有一道河 12/15</a:t>
@@ -19202,7 +19202,7 @@
               </a:defRPr>
             </a:pPr>
             <a:r>
-              <a:rPr sz="4800" b="0">
+              <a:rPr lang="zh-CN" sz="4800" b="0">
                 <a:latin typeface="FZZhunYuan-M02"/>
               </a:rPr>
               <a:t>有一道河　是圣灵的江河</a:t>
@@ -19224,7 +19224,7 @@
               </a:defRPr>
             </a:pPr>
             <a:r>
-              <a:rPr sz="4800" b="0">
+              <a:rPr lang="zh-CN" sz="4800" b="0">
                 <a:latin typeface="FZZhunYuan-M02"/>
               </a:rPr>
               <a:t>有一道河　是圣灵的江河</a:t>
@@ -19246,7 +19246,7 @@
               </a:defRPr>
             </a:pPr>
             <a:r>
-              <a:rPr sz="4800" b="0">
+              <a:rPr lang="zh-CN" sz="4800" b="0">
                 <a:latin typeface="FZZhunYuan-M02"/>
               </a:rPr>
               <a:t>有一道河　是圣灵的江河</a:t>
@@ -19268,7 +19268,7 @@
               </a:defRPr>
             </a:pPr>
             <a:r>
-              <a:rPr sz="4800" b="0">
+              <a:rPr lang="zh-CN" sz="4800" b="0">
                 <a:latin typeface="FZZhunYuan-M02"/>
               </a:rPr>
               <a:t>有一道河　是圣灵的江河</a:t>
@@ -19313,7 +19313,7 @@
               </a:defRPr>
             </a:pPr>
             <a:r>
-              <a:rPr sz="2400" b="0">
+              <a:rPr lang="zh-CN" sz="2400" b="0">
                 <a:latin typeface="FZKai-Z03"/>
               </a:rPr>
               <a:t>有一道河 13/15</a:t>
@@ -19376,7 +19376,7 @@
               </a:defRPr>
             </a:pPr>
             <a:r>
-              <a:rPr sz="4800" b="0">
+              <a:rPr lang="zh-CN" sz="4800" b="0">
                 <a:latin typeface="FZZhunYuan-M02"/>
               </a:rPr>
               <a:t>敞开你的心　让活水涌流</a:t>
@@ -19398,7 +19398,7 @@
               </a:defRPr>
             </a:pPr>
             <a:r>
-              <a:rPr sz="4800" b="0">
+              <a:rPr lang="zh-CN" sz="4800" b="0">
                 <a:latin typeface="FZZhunYuan-M02"/>
               </a:rPr>
               <a:t>敞开你的心　让活水涌流</a:t>
@@ -19443,7 +19443,7 @@
               </a:defRPr>
             </a:pPr>
             <a:r>
-              <a:rPr sz="2400" b="0">
+              <a:rPr lang="zh-CN" sz="2400" b="0">
                 <a:latin typeface="FZKai-Z03"/>
               </a:rPr>
               <a:t>有一道河 14/15</a:t>
@@ -19506,7 +19506,7 @@
               </a:defRPr>
             </a:pPr>
             <a:r>
-              <a:rPr sz="4800" b="0">
+              <a:rPr lang="zh-CN" sz="4800" b="0">
                 <a:latin typeface="FZZhunYuan-M02"/>
               </a:rPr>
               <a:t>荣耀神的名</a:t>
@@ -19551,7 +19551,7 @@
               </a:defRPr>
             </a:pPr>
             <a:r>
-              <a:rPr sz="2400" b="0">
+              <a:rPr lang="zh-CN" sz="2400" b="0">
                 <a:latin typeface="FZKai-Z03"/>
               </a:rPr>
               <a:t>有一道河 15/15</a:t>
@@ -19656,7 +19656,7 @@
               </a:defRPr>
             </a:pPr>
             <a:r>
-              <a:rPr sz="8000" b="1">
+              <a:rPr lang="zh-CN" sz="8000" b="1">
                 <a:solidFill>
                   <a:srgbClr val="FFFF00"/>
                 </a:solidFill>
@@ -19746,7 +19746,7 @@
               </a:defRPr>
             </a:pPr>
             <a:r>
-              <a:rPr sz="4400" b="1">
+              <a:rPr lang="zh-CN" sz="4400" b="1">
                 <a:solidFill>
                   <a:srgbClr val="FFFFFF"/>
                 </a:solidFill>
@@ -19771,7 +19771,7 @@
               </a:defRPr>
             </a:pPr>
             <a:r>
-              <a:rPr sz="4400" b="1">
+              <a:rPr lang="zh-CN" sz="4400" b="1">
                 <a:solidFill>
                   <a:srgbClr val="FFFF00"/>
                 </a:solidFill>
@@ -19819,7 +19819,7 @@
               </a:defRPr>
             </a:pPr>
             <a:r>
-              <a:rPr sz="2400" b="1">
+              <a:rPr lang="zh-CN" sz="2400" b="1">
                 <a:solidFill>
                   <a:srgbClr val="FFFFFF"/>
                 </a:solidFill>
@@ -19909,7 +19909,7 @@
               </a:defRPr>
             </a:pPr>
             <a:r>
-              <a:rPr sz="4400" b="1">
+              <a:rPr lang="zh-CN" sz="4400" b="1">
                 <a:solidFill>
                   <a:srgbClr val="FFFFFF"/>
                 </a:solidFill>
@@ -19934,7 +19934,7 @@
               </a:defRPr>
             </a:pPr>
             <a:r>
-              <a:rPr sz="4400" b="1">
+              <a:rPr lang="zh-CN" sz="4400" b="1">
                 <a:solidFill>
                   <a:srgbClr val="FFFF00"/>
                 </a:solidFill>
@@ -19982,7 +19982,7 @@
               </a:defRPr>
             </a:pPr>
             <a:r>
-              <a:rPr sz="2400" b="1">
+              <a:rPr lang="zh-CN" sz="2400" b="1">
                 <a:solidFill>
                   <a:srgbClr val="FFFFFF"/>
                 </a:solidFill>
@@ -20048,7 +20048,7 @@
               </a:defRPr>
             </a:pPr>
             <a:r>
-              <a:rPr sz="4400" b="1">
+              <a:rPr lang="zh-CN" sz="4400" b="1">
                 <a:latin typeface="FZKai-Z03"/>
               </a:rPr>
               <a:t>请为后疫情时代的福音工作代祷，愿我们不单顾自己的事，更是看到别人的需要，看到身边还未信主的朋友的需要，而勇于开口。</a:t>
@@ -20093,7 +20093,7 @@
               </a:defRPr>
             </a:pPr>
             <a:r>
-              <a:rPr sz="2400" b="1">
+              <a:rPr lang="zh-CN" sz="2400" b="1">
                 <a:latin typeface="FZKai-Z03"/>
               </a:rPr>
               <a:t>代祷事项</a:t>
@@ -20180,7 +20180,7 @@
               </a:defRPr>
             </a:pPr>
             <a:r>
-              <a:rPr sz="4400" b="1">
+              <a:rPr lang="zh-CN" sz="4400" b="1">
                 <a:solidFill>
                   <a:srgbClr val="FFFFFF"/>
                 </a:solidFill>
@@ -20205,7 +20205,7 @@
               </a:defRPr>
             </a:pPr>
             <a:r>
-              <a:rPr sz="4400" b="1">
+              <a:rPr lang="zh-CN" sz="4400" b="1">
                 <a:solidFill>
                   <a:srgbClr val="FFFF00"/>
                 </a:solidFill>
@@ -20253,7 +20253,7 @@
               </a:defRPr>
             </a:pPr>
             <a:r>
-              <a:rPr sz="2400" b="1">
+              <a:rPr lang="zh-CN" sz="2400" b="1">
                 <a:solidFill>
                   <a:srgbClr val="FFFFFF"/>
                 </a:solidFill>
@@ -20343,7 +20343,7 @@
               </a:defRPr>
             </a:pPr>
             <a:r>
-              <a:rPr sz="4400" b="1">
+              <a:rPr lang="zh-CN" sz="4400" b="1">
                 <a:solidFill>
                   <a:srgbClr val="FFFFFF"/>
                 </a:solidFill>
@@ -20368,7 +20368,7 @@
               </a:defRPr>
             </a:pPr>
             <a:r>
-              <a:rPr sz="4400" b="1">
+              <a:rPr lang="zh-CN" sz="4400" b="1">
                 <a:solidFill>
                   <a:srgbClr val="FFFF00"/>
                 </a:solidFill>
@@ -20416,7 +20416,7 @@
               </a:defRPr>
             </a:pPr>
             <a:r>
-              <a:rPr sz="2400" b="1">
+              <a:rPr lang="zh-CN" sz="2400" b="1">
                 <a:solidFill>
                   <a:srgbClr val="FFFFFF"/>
                 </a:solidFill>
@@ -20506,7 +20506,7 @@
               </a:defRPr>
             </a:pPr>
             <a:r>
-              <a:rPr sz="4400" b="1">
+              <a:rPr lang="zh-CN" sz="4400" b="1">
                 <a:solidFill>
                   <a:srgbClr val="FFFFFF"/>
                 </a:solidFill>
@@ -20531,7 +20531,7 @@
               </a:defRPr>
             </a:pPr>
             <a:r>
-              <a:rPr sz="4400" b="1">
+              <a:rPr lang="zh-CN" sz="4400" b="1">
                 <a:solidFill>
                   <a:srgbClr val="FFFF00"/>
                 </a:solidFill>
@@ -20579,7 +20579,7 @@
               </a:defRPr>
             </a:pPr>
             <a:r>
-              <a:rPr sz="2400" b="1">
+              <a:rPr lang="zh-CN" sz="2400" b="1">
                 <a:solidFill>
                   <a:srgbClr val="FFFFFF"/>
                 </a:solidFill>
@@ -20669,7 +20669,7 @@
               </a:defRPr>
             </a:pPr>
             <a:r>
-              <a:rPr sz="4400" b="1">
+              <a:rPr lang="zh-CN" sz="4400" b="1">
                 <a:solidFill>
                   <a:srgbClr val="FFFFFF"/>
                 </a:solidFill>
@@ -20694,7 +20694,7 @@
               </a:defRPr>
             </a:pPr>
             <a:r>
-              <a:rPr sz="4400" b="1">
+              <a:rPr lang="zh-CN" sz="4400" b="1">
                 <a:solidFill>
                   <a:srgbClr val="FFFF00"/>
                 </a:solidFill>
@@ -20742,7 +20742,7 @@
               </a:defRPr>
             </a:pPr>
             <a:r>
-              <a:rPr sz="2400" b="1">
+              <a:rPr lang="zh-CN" sz="2400" b="1">
                 <a:solidFill>
                   <a:srgbClr val="FFFFFF"/>
                 </a:solidFill>
@@ -20832,7 +20832,7 @@
               </a:defRPr>
             </a:pPr>
             <a:r>
-              <a:rPr sz="4400" b="1">
+              <a:rPr lang="zh-CN" sz="4400" b="1">
                 <a:solidFill>
                   <a:srgbClr val="FFFFFF"/>
                 </a:solidFill>
@@ -20857,7 +20857,7 @@
               </a:defRPr>
             </a:pPr>
             <a:r>
-              <a:rPr sz="4400" b="1">
+              <a:rPr lang="zh-CN" sz="4400" b="1">
                 <a:solidFill>
                   <a:srgbClr val="FFFF00"/>
                 </a:solidFill>
@@ -20905,7 +20905,7 @@
               </a:defRPr>
             </a:pPr>
             <a:r>
-              <a:rPr sz="2400" b="1">
+              <a:rPr lang="zh-CN" sz="2400" b="1">
                 <a:solidFill>
                   <a:srgbClr val="FFFFFF"/>
                 </a:solidFill>
@@ -20995,7 +20995,7 @@
               </a:defRPr>
             </a:pPr>
             <a:r>
-              <a:rPr sz="4400" b="1">
+              <a:rPr lang="zh-CN" sz="4400" b="1">
                 <a:solidFill>
                   <a:srgbClr val="FFFFFF"/>
                 </a:solidFill>
@@ -21020,7 +21020,7 @@
               </a:defRPr>
             </a:pPr>
             <a:r>
-              <a:rPr sz="4400" b="1">
+              <a:rPr lang="zh-CN" sz="4400" b="1">
                 <a:solidFill>
                   <a:srgbClr val="FFFF00"/>
                 </a:solidFill>
@@ -21068,7 +21068,7 @@
               </a:defRPr>
             </a:pPr>
             <a:r>
-              <a:rPr sz="2400" b="1">
+              <a:rPr lang="zh-CN" sz="2400" b="1">
                 <a:solidFill>
                   <a:srgbClr val="FFFFFF"/>
                 </a:solidFill>
@@ -21158,7 +21158,7 @@
               </a:defRPr>
             </a:pPr>
             <a:r>
-              <a:rPr sz="4400" b="1">
+              <a:rPr lang="zh-CN" sz="4400" b="1">
                 <a:solidFill>
                   <a:srgbClr val="FFFFFF"/>
                 </a:solidFill>
@@ -21183,7 +21183,7 @@
               </a:defRPr>
             </a:pPr>
             <a:r>
-              <a:rPr sz="4400" b="1">
+              <a:rPr lang="zh-CN" sz="4400" b="1">
                 <a:solidFill>
                   <a:srgbClr val="FFFF00"/>
                 </a:solidFill>
@@ -21231,7 +21231,7 @@
               </a:defRPr>
             </a:pPr>
             <a:r>
-              <a:rPr sz="2400" b="1">
+              <a:rPr lang="zh-CN" sz="2400" b="1">
                 <a:solidFill>
                   <a:srgbClr val="FFFFFF"/>
                 </a:solidFill>
@@ -21423,7 +21423,7 @@
               </a:defRPr>
             </a:pPr>
             <a:r>
-              <a:rPr sz="4400" b="1">
+              <a:rPr lang="zh-CN" sz="4400" b="1">
                 <a:latin typeface="FZKai-Z03"/>
               </a:rPr>
               <a:t>请为吴雨洁传道在德国开展校园事工祷告，求主赐给她智慧、爱心，并与她一同工作的同工同心合意，在事奉中得到力量和鼓励。</a:t>
@@ -21468,7 +21468,7 @@
               </a:defRPr>
             </a:pPr>
             <a:r>
-              <a:rPr sz="2400" b="1">
+              <a:rPr lang="zh-CN" sz="2400" b="1">
                 <a:latin typeface="FZKai-Z03"/>
               </a:rPr>
               <a:t>代祷事项</a:t>
@@ -21573,7 +21573,7 @@
               </a:defRPr>
             </a:pPr>
             <a:r>
-              <a:rPr sz="7200" b="1">
+              <a:rPr lang="zh-CN" sz="7200" b="1">
                 <a:latin typeface="FZKai-Z03"/>
               </a:rPr>
               <a:t>约翰一书第 3 章</a:t>
@@ -21595,7 +21595,7 @@
               </a:defRPr>
             </a:pPr>
             <a:r>
-              <a:rPr sz="7200" b="1">
+              <a:rPr lang="zh-CN" sz="7200" b="1">
                 <a:latin typeface="FZKai-Z03"/>
               </a:rPr>
               <a:t/>
@@ -21640,7 +21640,7 @@
               </a:defRPr>
             </a:pPr>
             <a:r>
-              <a:rPr sz="4000" b="1">
+              <a:rPr lang="zh-CN" sz="4000" b="1">
                 <a:latin typeface="FZKai-Z03"/>
               </a:rPr>
               <a:t>读  经</a:t>
@@ -21703,13 +21703,13 @@
               </a:defRPr>
             </a:pPr>
             <a:r>
-              <a:rPr baseline="30000" sz="4400" b="1">
+              <a:rPr baseline="30000" lang="zh-CN" sz="4400" b="1">
                 <a:latin typeface="FZKai-Z03"/>
               </a:rPr>
               <a:t>1 </a:t>
             </a:r>
             <a:r>
-              <a:rPr sz="4400" b="1">
+              <a:rPr lang="zh-CN" sz="4400" b="1">
                 <a:latin typeface="FZKai-Z03"/>
               </a:rPr>
               <a:t>你看父赐给我们是何等的慈爱，使我们得称为神的儿女。我们也真是他的儿女。世人所以不认识我们，是因未曾认识他。</a:t>
@@ -21731,13 +21731,13 @@
               </a:defRPr>
             </a:pPr>
             <a:r>
-              <a:rPr baseline="30000" sz="4400" b="1">
+              <a:rPr baseline="30000" lang="zh-CN" sz="4400" b="1">
                 <a:latin typeface="FZKai-Z03"/>
               </a:rPr>
               <a:t>2 </a:t>
             </a:r>
             <a:r>
-              <a:rPr sz="4400" b="1">
+              <a:rPr lang="zh-CN" sz="4400" b="1">
                 <a:latin typeface="FZKai-Z03"/>
               </a:rPr>
               <a:t>亲爱的弟兄阿，我们现在是神的儿女，将来如何，还未显明。但我们知道主若显现，我们必要像他。因为必得见他的真体。</a:t>
@@ -21782,7 +21782,7 @@
               </a:defRPr>
             </a:pPr>
             <a:r>
-              <a:rPr sz="2400" b="1">
+              <a:rPr lang="zh-CN" sz="2400" b="1">
                 <a:latin typeface="FZKai-Z03"/>
               </a:rPr>
               <a:t>读经（约翰一书第 3 章）</a:t>
@@ -21845,13 +21845,13 @@
               </a:defRPr>
             </a:pPr>
             <a:r>
-              <a:rPr baseline="30000" sz="4400" b="1">
+              <a:rPr baseline="30000" lang="zh-CN" sz="4400" b="1">
                 <a:latin typeface="FZKai-Z03"/>
               </a:rPr>
               <a:t>3 </a:t>
             </a:r>
             <a:r>
-              <a:rPr sz="4400" b="1">
+              <a:rPr lang="zh-CN" sz="4400" b="1">
                 <a:latin typeface="FZKai-Z03"/>
               </a:rPr>
               <a:t>凡向他有这指望的，就洁净自己，像他洁净一样。</a:t>
@@ -21873,13 +21873,13 @@
               </a:defRPr>
             </a:pPr>
             <a:r>
-              <a:rPr baseline="30000" sz="4400" b="1">
+              <a:rPr baseline="30000" lang="zh-CN" sz="4400" b="1">
                 <a:latin typeface="FZKai-Z03"/>
               </a:rPr>
               <a:t>4 </a:t>
             </a:r>
             <a:r>
-              <a:rPr sz="4400" b="1">
+              <a:rPr lang="zh-CN" sz="4400" b="1">
                 <a:latin typeface="FZKai-Z03"/>
               </a:rPr>
               <a:t>凡犯罪的，就是违背律法。违背律法就是罪。</a:t>
@@ -21901,13 +21901,13 @@
               </a:defRPr>
             </a:pPr>
             <a:r>
-              <a:rPr baseline="30000" sz="4400" b="1">
+              <a:rPr baseline="30000" lang="zh-CN" sz="4400" b="1">
                 <a:latin typeface="FZKai-Z03"/>
               </a:rPr>
               <a:t>5 </a:t>
             </a:r>
             <a:r>
-              <a:rPr sz="4400" b="1">
+              <a:rPr lang="zh-CN" sz="4400" b="1">
                 <a:latin typeface="FZKai-Z03"/>
               </a:rPr>
               <a:t>你们知道主曾显现，是要除掉人的罪。在他并没有罪。</a:t>
@@ -21952,7 +21952,7 @@
               </a:defRPr>
             </a:pPr>
             <a:r>
-              <a:rPr sz="2400" b="1">
+              <a:rPr lang="zh-CN" sz="2400" b="1">
                 <a:latin typeface="FZKai-Z03"/>
               </a:rPr>
               <a:t>读经（约翰一书第 3 章）</a:t>
@@ -22015,13 +22015,13 @@
               </a:defRPr>
             </a:pPr>
             <a:r>
-              <a:rPr baseline="30000" sz="4400" b="1">
+              <a:rPr baseline="30000" lang="zh-CN" sz="4400" b="1">
                 <a:latin typeface="FZKai-Z03"/>
               </a:rPr>
               <a:t>6 </a:t>
             </a:r>
             <a:r>
-              <a:rPr sz="4400" b="1">
+              <a:rPr lang="zh-CN" sz="4400" b="1">
                 <a:latin typeface="FZKai-Z03"/>
               </a:rPr>
               <a:t>凡住在他里面的，就不犯罪。凡犯罪的，是未曾看见他，也未曾认识他。</a:t>
@@ -22043,13 +22043,13 @@
               </a:defRPr>
             </a:pPr>
             <a:r>
-              <a:rPr baseline="30000" sz="4400" b="1">
+              <a:rPr baseline="30000" lang="zh-CN" sz="4400" b="1">
                 <a:latin typeface="FZKai-Z03"/>
               </a:rPr>
               <a:t>7 </a:t>
             </a:r>
             <a:r>
-              <a:rPr sz="4400" b="1">
+              <a:rPr lang="zh-CN" sz="4400" b="1">
                 <a:latin typeface="FZKai-Z03"/>
               </a:rPr>
               <a:t>小子们哪，不要被人诱惑，行义的才是义人。正如主是义的一样。</a:t>
@@ -22094,7 +22094,7 @@
               </a:defRPr>
             </a:pPr>
             <a:r>
-              <a:rPr sz="2400" b="1">
+              <a:rPr lang="zh-CN" sz="2400" b="1">
                 <a:latin typeface="FZKai-Z03"/>
               </a:rPr>
               <a:t>读经（约翰一书第 3 章）</a:t>
@@ -22157,13 +22157,13 @@
               </a:defRPr>
             </a:pPr>
             <a:r>
-              <a:rPr baseline="30000" sz="4400" b="1">
+              <a:rPr baseline="30000" lang="zh-CN" sz="4400" b="1">
                 <a:latin typeface="FZKai-Z03"/>
               </a:rPr>
               <a:t>8 </a:t>
             </a:r>
             <a:r>
-              <a:rPr sz="4400" b="1">
+              <a:rPr lang="zh-CN" sz="4400" b="1">
                 <a:latin typeface="FZKai-Z03"/>
               </a:rPr>
               <a:t>犯罪的是属魔鬼，因为魔鬼从起初就犯罪。神的儿子显现出来，为要除灭魔鬼的作为。</a:t>
@@ -22185,13 +22185,13 @@
               </a:defRPr>
             </a:pPr>
             <a:r>
-              <a:rPr baseline="30000" sz="4400" b="1">
+              <a:rPr baseline="30000" lang="zh-CN" sz="4400" b="1">
                 <a:latin typeface="FZKai-Z03"/>
               </a:rPr>
               <a:t>9 </a:t>
             </a:r>
             <a:r>
-              <a:rPr sz="4400" b="1">
+              <a:rPr lang="zh-CN" sz="4400" b="1">
                 <a:latin typeface="FZKai-Z03"/>
               </a:rPr>
               <a:t>凡从神生的就不犯罪，因神的道（原文作种）存在他心里。他也不能犯罪，因为他是由神生的。</a:t>
@@ -22236,7 +22236,7 @@
               </a:defRPr>
             </a:pPr>
             <a:r>
-              <a:rPr sz="2400" b="1">
+              <a:rPr lang="zh-CN" sz="2400" b="1">
                 <a:latin typeface="FZKai-Z03"/>
               </a:rPr>
               <a:t>读经（约翰一书第 3 章）</a:t>
@@ -22299,13 +22299,13 @@
               </a:defRPr>
             </a:pPr>
             <a:r>
-              <a:rPr baseline="30000" sz="4400" b="1">
+              <a:rPr baseline="30000" lang="zh-CN" sz="4400" b="1">
                 <a:latin typeface="FZKai-Z03"/>
               </a:rPr>
               <a:t>10 </a:t>
             </a:r>
             <a:r>
-              <a:rPr sz="4400" b="1">
+              <a:rPr lang="zh-CN" sz="4400" b="1">
                 <a:latin typeface="FZKai-Z03"/>
               </a:rPr>
               <a:t>从此就显出谁是神的儿女，谁是魔鬼的儿女。凡不行义的，就不属神。不爱弟兄的也是如此。</a:t>
@@ -22327,13 +22327,13 @@
               </a:defRPr>
             </a:pPr>
             <a:r>
-              <a:rPr baseline="30000" sz="4400" b="1">
+              <a:rPr baseline="30000" lang="zh-CN" sz="4400" b="1">
                 <a:latin typeface="FZKai-Z03"/>
               </a:rPr>
               <a:t>11 </a:t>
             </a:r>
             <a:r>
-              <a:rPr sz="4400" b="1">
+              <a:rPr lang="zh-CN" sz="4400" b="1">
                 <a:latin typeface="FZKai-Z03"/>
               </a:rPr>
               <a:t>我们应当彼此相爱。这就是你们从起初所听见的命令。</a:t>
@@ -22378,7 +22378,7 @@
               </a:defRPr>
             </a:pPr>
             <a:r>
-              <a:rPr sz="2400" b="1">
+              <a:rPr lang="zh-CN" sz="2400" b="1">
                 <a:latin typeface="FZKai-Z03"/>
               </a:rPr>
               <a:t>读经（约翰一书第 3 章）</a:t>
@@ -22441,13 +22441,13 @@
               </a:defRPr>
             </a:pPr>
             <a:r>
-              <a:rPr baseline="30000" sz="4400" b="1">
+              <a:rPr baseline="30000" lang="zh-CN" sz="4400" b="1">
                 <a:latin typeface="FZKai-Z03"/>
               </a:rPr>
               <a:t>12 </a:t>
             </a:r>
             <a:r>
-              <a:rPr sz="4400" b="1">
+              <a:rPr lang="zh-CN" sz="4400" b="1">
                 <a:latin typeface="FZKai-Z03"/>
               </a:rPr>
               <a:t>不可像该隐。他是属那恶者，杀了他的兄弟。为什么杀了他呢？因自己的行为是恶的，兄弟的行为是善的。</a:t>
@@ -22469,13 +22469,13 @@
               </a:defRPr>
             </a:pPr>
             <a:r>
-              <a:rPr baseline="30000" sz="4400" b="1">
+              <a:rPr baseline="30000" lang="zh-CN" sz="4400" b="1">
                 <a:latin typeface="FZKai-Z03"/>
               </a:rPr>
               <a:t>13 </a:t>
             </a:r>
             <a:r>
-              <a:rPr sz="4400" b="1">
+              <a:rPr lang="zh-CN" sz="4400" b="1">
                 <a:latin typeface="FZKai-Z03"/>
               </a:rPr>
               <a:t>弟兄们，世人若恨你们，不要以为希奇。</a:t>
@@ -22520,7 +22520,7 @@
               </a:defRPr>
             </a:pPr>
             <a:r>
-              <a:rPr sz="2400" b="1">
+              <a:rPr lang="zh-CN" sz="2400" b="1">
                 <a:latin typeface="FZKai-Z03"/>
               </a:rPr>
               <a:t>读经（约翰一书第 3 章）</a:t>
@@ -22583,13 +22583,13 @@
               </a:defRPr>
             </a:pPr>
             <a:r>
-              <a:rPr baseline="30000" sz="4400" b="1">
+              <a:rPr baseline="30000" lang="zh-CN" sz="4400" b="1">
                 <a:latin typeface="FZKai-Z03"/>
               </a:rPr>
               <a:t>14 </a:t>
             </a:r>
             <a:r>
-              <a:rPr sz="4400" b="1">
+              <a:rPr lang="zh-CN" sz="4400" b="1">
                 <a:latin typeface="FZKai-Z03"/>
               </a:rPr>
               <a:t>我们因为爱弟兄，就晓得是已经出死入生了。没有爱心的，仍住在死中。</a:t>
@@ -22611,13 +22611,13 @@
               </a:defRPr>
             </a:pPr>
             <a:r>
-              <a:rPr baseline="30000" sz="4400" b="1">
+              <a:rPr baseline="30000" lang="zh-CN" sz="4400" b="1">
                 <a:latin typeface="FZKai-Z03"/>
               </a:rPr>
               <a:t>15 </a:t>
             </a:r>
             <a:r>
-              <a:rPr sz="4400" b="1">
+              <a:rPr lang="zh-CN" sz="4400" b="1">
                 <a:latin typeface="FZKai-Z03"/>
               </a:rPr>
               <a:t>凡恨他弟兄的，就是杀人的。你们晓得凡杀人的，没有永生存在他里面。</a:t>
@@ -22662,7 +22662,7 @@
               </a:defRPr>
             </a:pPr>
             <a:r>
-              <a:rPr sz="2400" b="1">
+              <a:rPr lang="zh-CN" sz="2400" b="1">
                 <a:latin typeface="FZKai-Z03"/>
               </a:rPr>
               <a:t>读经（约翰一书第 3 章）</a:t>
@@ -22725,13 +22725,13 @@
               </a:defRPr>
             </a:pPr>
             <a:r>
-              <a:rPr baseline="30000" sz="4400" b="1">
+              <a:rPr baseline="30000" lang="zh-CN" sz="4400" b="1">
                 <a:latin typeface="FZKai-Z03"/>
               </a:rPr>
               <a:t>16 </a:t>
             </a:r>
             <a:r>
-              <a:rPr sz="4400" b="1">
+              <a:rPr lang="zh-CN" sz="4400" b="1">
                 <a:latin typeface="FZKai-Z03"/>
               </a:rPr>
               <a:t>主为我们舍命，我们从此就知道何为爱。我们也当为弟兄舍命。</a:t>
@@ -22753,13 +22753,13 @@
               </a:defRPr>
             </a:pPr>
             <a:r>
-              <a:rPr baseline="30000" sz="4400" b="1">
+              <a:rPr baseline="30000" lang="zh-CN" sz="4400" b="1">
                 <a:latin typeface="FZKai-Z03"/>
               </a:rPr>
               <a:t>17 </a:t>
             </a:r>
             <a:r>
-              <a:rPr sz="4400" b="1">
+              <a:rPr lang="zh-CN" sz="4400" b="1">
                 <a:latin typeface="FZKai-Z03"/>
               </a:rPr>
               <a:t>凡有世上财物的，看见弟兄穷乏，却塞住怜恤的心，爱神的心怎能存在他里面呢？</a:t>
@@ -22804,7 +22804,7 @@
               </a:defRPr>
             </a:pPr>
             <a:r>
-              <a:rPr sz="2400" b="1">
+              <a:rPr lang="zh-CN" sz="2400" b="1">
                 <a:latin typeface="FZKai-Z03"/>
               </a:rPr>
               <a:t>读经（约翰一书第 3 章）</a:t>
@@ -22867,7 +22867,7 @@
               </a:defRPr>
             </a:pPr>
             <a:r>
-              <a:rPr sz="4400" b="1">
+              <a:rPr lang="zh-CN" sz="4400" b="1">
                 <a:latin typeface="FZKai-Z03"/>
               </a:rPr>
               <a:t>求　神赐福保守教会牧者们身体健康、力量充沛、出入平安。</a:t>
@@ -22912,7 +22912,7 @@
               </a:defRPr>
             </a:pPr>
             <a:r>
-              <a:rPr sz="2400" b="1">
+              <a:rPr lang="zh-CN" sz="2400" b="1">
                 <a:latin typeface="FZKai-Z03"/>
               </a:rPr>
               <a:t>代祷事项</a:t>
@@ -22975,13 +22975,13 @@
               </a:defRPr>
             </a:pPr>
             <a:r>
-              <a:rPr baseline="30000" sz="4400" b="1">
+              <a:rPr baseline="30000" lang="zh-CN" sz="4400" b="1">
                 <a:latin typeface="FZKai-Z03"/>
               </a:rPr>
               <a:t>18 </a:t>
             </a:r>
             <a:r>
-              <a:rPr sz="4400" b="1">
+              <a:rPr lang="zh-CN" sz="4400" b="1">
                 <a:latin typeface="FZKai-Z03"/>
               </a:rPr>
               <a:t>小子们哪，我们相爱，不要只在言语和舌头上。总要在行为和诚实上。</a:t>
@@ -23003,13 +23003,13 @@
               </a:defRPr>
             </a:pPr>
             <a:r>
-              <a:rPr baseline="30000" sz="4400" b="1">
+              <a:rPr baseline="30000" lang="zh-CN" sz="4400" b="1">
                 <a:latin typeface="FZKai-Z03"/>
               </a:rPr>
               <a:t>19 </a:t>
             </a:r>
             <a:r>
-              <a:rPr sz="4400" b="1">
+              <a:rPr lang="zh-CN" sz="4400" b="1">
                 <a:latin typeface="FZKai-Z03"/>
               </a:rPr>
               <a:t>从此就知道我们是属真理的，并且我们的心在神面前可以安稳。</a:t>
@@ -23054,7 +23054,7 @@
               </a:defRPr>
             </a:pPr>
             <a:r>
-              <a:rPr sz="2400" b="1">
+              <a:rPr lang="zh-CN" sz="2400" b="1">
                 <a:latin typeface="FZKai-Z03"/>
               </a:rPr>
               <a:t>读经（约翰一书第 3 章）</a:t>
@@ -23117,13 +23117,13 @@
               </a:defRPr>
             </a:pPr>
             <a:r>
-              <a:rPr baseline="30000" sz="4400" b="1">
+              <a:rPr baseline="30000" lang="zh-CN" sz="4400" b="1">
                 <a:latin typeface="FZKai-Z03"/>
               </a:rPr>
               <a:t>20 </a:t>
             </a:r>
             <a:r>
-              <a:rPr sz="4400" b="1">
+              <a:rPr lang="zh-CN" sz="4400" b="1">
                 <a:latin typeface="FZKai-Z03"/>
               </a:rPr>
               <a:t>我们的心若责备我们，神比我们的心大，一切事没有不知道的。</a:t>
@@ -23145,13 +23145,13 @@
               </a:defRPr>
             </a:pPr>
             <a:r>
-              <a:rPr baseline="30000" sz="4400" b="1">
+              <a:rPr baseline="30000" lang="zh-CN" sz="4400" b="1">
                 <a:latin typeface="FZKai-Z03"/>
               </a:rPr>
               <a:t>21 </a:t>
             </a:r>
             <a:r>
-              <a:rPr sz="4400" b="1">
+              <a:rPr lang="zh-CN" sz="4400" b="1">
                 <a:latin typeface="FZKai-Z03"/>
               </a:rPr>
               <a:t>亲爱的弟兄阿，我们的心若不责备我们，就可以向神坦然无惧了。</a:t>
@@ -23196,7 +23196,7 @@
               </a:defRPr>
             </a:pPr>
             <a:r>
-              <a:rPr sz="2400" b="1">
+              <a:rPr lang="zh-CN" sz="2400" b="1">
                 <a:latin typeface="FZKai-Z03"/>
               </a:rPr>
               <a:t>读经（约翰一书第 3 章）</a:t>
@@ -23259,13 +23259,13 @@
               </a:defRPr>
             </a:pPr>
             <a:r>
-              <a:rPr baseline="30000" sz="4400" b="1">
+              <a:rPr baseline="30000" lang="zh-CN" sz="4400" b="1">
                 <a:latin typeface="FZKai-Z03"/>
               </a:rPr>
               <a:t>22 </a:t>
             </a:r>
             <a:r>
-              <a:rPr sz="4400" b="1">
+              <a:rPr lang="zh-CN" sz="4400" b="1">
                 <a:latin typeface="FZKai-Z03"/>
               </a:rPr>
               <a:t>并且我们一切所求的，就从他得着。因为我们遵守他的命令，行他所喜悦的事。</a:t>
@@ -23287,13 +23287,13 @@
               </a:defRPr>
             </a:pPr>
             <a:r>
-              <a:rPr baseline="30000" sz="4400" b="1">
+              <a:rPr baseline="30000" lang="zh-CN" sz="4400" b="1">
                 <a:latin typeface="FZKai-Z03"/>
               </a:rPr>
               <a:t>23 </a:t>
             </a:r>
             <a:r>
-              <a:rPr sz="4400" b="1">
+              <a:rPr lang="zh-CN" sz="4400" b="1">
                 <a:latin typeface="FZKai-Z03"/>
               </a:rPr>
               <a:t>神的命令就是叫我们信他儿子耶稣基督的名，且照他所赐给我们的命令彼此相爱。</a:t>
@@ -23338,7 +23338,7 @@
               </a:defRPr>
             </a:pPr>
             <a:r>
-              <a:rPr sz="2400" b="1">
+              <a:rPr lang="zh-CN" sz="2400" b="1">
                 <a:latin typeface="FZKai-Z03"/>
               </a:rPr>
               <a:t>读经（约翰一书第 3 章）</a:t>
@@ -23401,13 +23401,13 @@
               </a:defRPr>
             </a:pPr>
             <a:r>
-              <a:rPr baseline="30000" sz="4400" b="1">
+              <a:rPr baseline="30000" lang="zh-CN" sz="4400" b="1">
                 <a:latin typeface="FZKai-Z03"/>
               </a:rPr>
               <a:t>24 </a:t>
             </a:r>
             <a:r>
-              <a:rPr sz="4400" b="1">
+              <a:rPr lang="zh-CN" sz="4400" b="1">
                 <a:latin typeface="FZKai-Z03"/>
               </a:rPr>
               <a:t>遵守神命令的，就住在神里面。神也住在他里面。我们所以知道神住在我们里面，是因他所赐给我们的圣灵。</a:t>
@@ -23452,7 +23452,7 @@
               </a:defRPr>
             </a:pPr>
             <a:r>
-              <a:rPr sz="2400" b="1">
+              <a:rPr lang="zh-CN" sz="2400" b="1">
                 <a:latin typeface="FZKai-Z03"/>
               </a:rPr>
               <a:t>读经（约翰一书第 3 章）</a:t>
@@ -23557,7 +23557,7 @@
               </a:defRPr>
             </a:pPr>
             <a:r>
-              <a:rPr sz="6600" b="1">
+              <a:rPr lang="zh-CN" sz="6600" b="1">
                 <a:latin typeface="FZKai-Z03"/>
               </a:rPr>
               <a:t>我们要彼此相爱</a:t>
@@ -23602,7 +23602,7 @@
               </a:defRPr>
             </a:pPr>
             <a:r>
-              <a:rPr sz="4000" b="0">
+              <a:rPr lang="zh-CN" sz="4000" b="0">
                 <a:latin typeface="FZKai-Z03"/>
               </a:rPr>
               <a:t>吴振忠牧师证道</a:t>
@@ -23624,7 +23624,7 @@
               </a:defRPr>
             </a:pPr>
             <a:r>
-              <a:rPr sz="4000" b="0">
+              <a:rPr lang="zh-CN" sz="4000" b="0">
                 <a:latin typeface="FZKai-Z03"/>
               </a:rPr>
               <a:t>约翰一书第 3 章</a:t>
@@ -23687,7 +23687,7 @@
               </a:defRPr>
             </a:pPr>
             <a:r>
-              <a:rPr sz="4400" b="1">
+              <a:rPr lang="zh-CN" sz="4400" b="1">
                 <a:latin typeface="FZKai-Z03"/>
               </a:rPr>
               <a:t>引言：</a:t>
@@ -23709,7 +23709,7 @@
               </a:defRPr>
             </a:pPr>
             <a:r>
-              <a:rPr sz="4400" b="1">
+              <a:rPr lang="zh-CN" sz="4400" b="1">
                 <a:latin typeface="FZKai-Z03"/>
               </a:rPr>
               <a:t>1. 单向爱人与相向彼此相爱的分别</a:t>
@@ -23754,7 +23754,7 @@
               </a:defRPr>
             </a:pPr>
             <a:r>
-              <a:rPr sz="2400" b="1">
+              <a:rPr lang="zh-CN" sz="2400" b="1">
                 <a:latin typeface="FZKai-Z03"/>
               </a:rPr>
               <a:t>我们要彼此相爱（约翰一书第 3 章）</a:t>
@@ -23817,7 +23817,7 @@
               </a:defRPr>
             </a:pPr>
             <a:r>
-              <a:rPr sz="4400" b="1">
+              <a:rPr lang="zh-CN" sz="4400" b="1">
                 <a:latin typeface="FZKai-Z03"/>
               </a:rPr>
               <a:t>引言：</a:t>
@@ -23839,7 +23839,7 @@
               </a:defRPr>
             </a:pPr>
             <a:r>
-              <a:rPr sz="4400" b="1">
+              <a:rPr lang="zh-CN" sz="4400" b="1">
                 <a:latin typeface="FZKai-Z03"/>
               </a:rPr>
               <a:t>1. 单向爱人与相向彼此相爱的分别</a:t>
@@ -23861,7 +23861,7 @@
               </a:defRPr>
             </a:pPr>
             <a:r>
-              <a:rPr sz="4400" b="1">
+              <a:rPr lang="zh-CN" sz="4400" b="1">
                 <a:latin typeface="FZKai-Z03"/>
               </a:rPr>
               <a:t>2. 主耶稣所关切挂心的事</a:t>
@@ -23906,7 +23906,7 @@
               </a:defRPr>
             </a:pPr>
             <a:r>
-              <a:rPr sz="2400" b="1">
+              <a:rPr lang="zh-CN" sz="2400" b="1">
                 <a:latin typeface="FZKai-Z03"/>
               </a:rPr>
               <a:t>我们要彼此相爱（约翰一书第 3 章）</a:t>
@@ -23969,7 +23969,7 @@
               </a:defRPr>
             </a:pPr>
             <a:r>
-              <a:rPr sz="4400" b="1">
+              <a:rPr lang="zh-CN" sz="4400" b="1">
                 <a:latin typeface="FZKai-Z03"/>
               </a:rPr>
               <a:t>引言：</a:t>
@@ -23991,7 +23991,7 @@
               </a:defRPr>
             </a:pPr>
             <a:r>
-              <a:rPr sz="4400" b="1">
+              <a:rPr lang="zh-CN" sz="4400" b="1">
                 <a:latin typeface="FZKai-Z03"/>
               </a:rPr>
               <a:t>1. 单向爱人与相向彼此相爱的分别</a:t>
@@ -24013,7 +24013,7 @@
               </a:defRPr>
             </a:pPr>
             <a:r>
-              <a:rPr sz="4400" b="1">
+              <a:rPr lang="zh-CN" sz="4400" b="1">
                 <a:latin typeface="FZKai-Z03"/>
               </a:rPr>
               <a:t>2. 主耶稣所关切挂心的事</a:t>
@@ -24035,7 +24035,7 @@
               </a:defRPr>
             </a:pPr>
             <a:r>
-              <a:rPr sz="4400" b="1">
+              <a:rPr lang="zh-CN" sz="4400" b="1">
                 <a:latin typeface="FZKai-Z03"/>
               </a:rPr>
               <a:t>3. 老约翰重申“我们要彼此相爱”是主的命令</a:t>
@@ -24080,7 +24080,7 @@
               </a:defRPr>
             </a:pPr>
             <a:r>
-              <a:rPr sz="2400" b="1">
+              <a:rPr lang="zh-CN" sz="2400" b="1">
                 <a:latin typeface="FZKai-Z03"/>
               </a:rPr>
               <a:t>我们要彼此相爱（约翰一书第 3 章）</a:t>
@@ -24143,7 +24143,7 @@
               </a:defRPr>
             </a:pPr>
             <a:r>
-              <a:rPr sz="4400" b="1">
+              <a:rPr lang="zh-CN" sz="4400" b="1">
                 <a:latin typeface="FZKai-Z03"/>
               </a:rPr>
               <a:t>引言：</a:t>
@@ -24165,7 +24165,7 @@
               </a:defRPr>
             </a:pPr>
             <a:r>
-              <a:rPr sz="4400" b="1">
+              <a:rPr lang="zh-CN" sz="4400" b="1">
                 <a:latin typeface="FZKai-Z03"/>
               </a:rPr>
               <a:t>1. 单向爱人与相向彼此相爱的分别</a:t>
@@ -24187,7 +24187,7 @@
               </a:defRPr>
             </a:pPr>
             <a:r>
-              <a:rPr sz="4400" b="1">
+              <a:rPr lang="zh-CN" sz="4400" b="1">
                 <a:latin typeface="FZKai-Z03"/>
               </a:rPr>
               <a:t>2. 主耶稣所关切挂心的事</a:t>
@@ -24209,7 +24209,7 @@
               </a:defRPr>
             </a:pPr>
             <a:r>
-              <a:rPr sz="4400" b="1">
+              <a:rPr lang="zh-CN" sz="4400" b="1">
                 <a:latin typeface="FZKai-Z03"/>
               </a:rPr>
               <a:t>3. 老约翰重申“我们要彼此相爱”是主的命令</a:t>
@@ -24231,7 +24231,7 @@
               </a:defRPr>
             </a:pPr>
             <a:r>
-              <a:rPr sz="4400" b="1">
+              <a:rPr lang="zh-CN" sz="4400" b="1">
                 <a:latin typeface="FZKai-Z03"/>
               </a:rPr>
               <a:t>4. 是属灵的群体、神国的子民、神家里的儿女的事</a:t>
@@ -24276,7 +24276,7 @@
               </a:defRPr>
             </a:pPr>
             <a:r>
-              <a:rPr sz="2400" b="1">
+              <a:rPr lang="zh-CN" sz="2400" b="1">
                 <a:latin typeface="FZKai-Z03"/>
               </a:rPr>
               <a:t>我们要彼此相爱（约翰一书第 3 章）</a:t>

</xml_diff>